<commit_message>
enemy, mario character, better event management
</commit_message>
<xml_diff>
--- a/Design/Mario Rules.pptx
+++ b/Design/Mario Rules.pptx
@@ -13,6 +13,13 @@
     <p:sldId id="259" r:id="rId10"/>
     <p:sldId id="260" r:id="rId11"/>
     <p:sldId id="261" r:id="rId12"/>
+    <p:sldId id="265" r:id="rId13"/>
+    <p:sldId id="266" r:id="rId14"/>
+    <p:sldId id="267" r:id="rId15"/>
+    <p:sldId id="268" r:id="rId16"/>
+    <p:sldId id="271" r:id="rId17"/>
+    <p:sldId id="269" r:id="rId18"/>
+    <p:sldId id="270" r:id="rId19"/>
   </p:sldIdLst>
   <p:sldSz cx="12192000" cy="6858000"/>
   <p:notesSz cx="6858000" cy="9144000"/>
@@ -452,7 +459,7 @@
           <a:p>
             <a:fld id="{846CE7D5-CF57-46EF-B807-FDD0502418D4}" type="datetimeFigureOut">
               <a:rPr lang="en-US" smtClean="0"/>
-              <a:t>5/14/2021</a:t>
+              <a:t>5/21/2021</a:t>
             </a:fld>
             <a:endParaRPr lang="en-US"/>
           </a:p>
@@ -622,7 +629,7 @@
           <a:p>
             <a:fld id="{846CE7D5-CF57-46EF-B807-FDD0502418D4}" type="datetimeFigureOut">
               <a:rPr lang="en-US" smtClean="0"/>
-              <a:t>5/14/2021</a:t>
+              <a:t>5/21/2021</a:t>
             </a:fld>
             <a:endParaRPr lang="en-US"/>
           </a:p>
@@ -802,7 +809,7 @@
           <a:p>
             <a:fld id="{846CE7D5-CF57-46EF-B807-FDD0502418D4}" type="datetimeFigureOut">
               <a:rPr lang="en-US" smtClean="0"/>
-              <a:t>5/14/2021</a:t>
+              <a:t>5/21/2021</a:t>
             </a:fld>
             <a:endParaRPr lang="en-US"/>
           </a:p>
@@ -972,7 +979,7 @@
           <a:p>
             <a:fld id="{846CE7D5-CF57-46EF-B807-FDD0502418D4}" type="datetimeFigureOut">
               <a:rPr lang="en-US" smtClean="0"/>
-              <a:t>5/14/2021</a:t>
+              <a:t>5/21/2021</a:t>
             </a:fld>
             <a:endParaRPr lang="en-US"/>
           </a:p>
@@ -1218,7 +1225,7 @@
           <a:p>
             <a:fld id="{846CE7D5-CF57-46EF-B807-FDD0502418D4}" type="datetimeFigureOut">
               <a:rPr lang="en-US" smtClean="0"/>
-              <a:t>5/14/2021</a:t>
+              <a:t>5/21/2021</a:t>
             </a:fld>
             <a:endParaRPr lang="en-US"/>
           </a:p>
@@ -1450,7 +1457,7 @@
           <a:p>
             <a:fld id="{846CE7D5-CF57-46EF-B807-FDD0502418D4}" type="datetimeFigureOut">
               <a:rPr lang="en-US" smtClean="0"/>
-              <a:t>5/14/2021</a:t>
+              <a:t>5/21/2021</a:t>
             </a:fld>
             <a:endParaRPr lang="en-US"/>
           </a:p>
@@ -1817,7 +1824,7 @@
           <a:p>
             <a:fld id="{846CE7D5-CF57-46EF-B807-FDD0502418D4}" type="datetimeFigureOut">
               <a:rPr lang="en-US" smtClean="0"/>
-              <a:t>5/14/2021</a:t>
+              <a:t>5/21/2021</a:t>
             </a:fld>
             <a:endParaRPr lang="en-US"/>
           </a:p>
@@ -1935,7 +1942,7 @@
           <a:p>
             <a:fld id="{846CE7D5-CF57-46EF-B807-FDD0502418D4}" type="datetimeFigureOut">
               <a:rPr lang="en-US" smtClean="0"/>
-              <a:t>5/14/2021</a:t>
+              <a:t>5/21/2021</a:t>
             </a:fld>
             <a:endParaRPr lang="en-US"/>
           </a:p>
@@ -2030,7 +2037,7 @@
           <a:p>
             <a:fld id="{846CE7D5-CF57-46EF-B807-FDD0502418D4}" type="datetimeFigureOut">
               <a:rPr lang="en-US" smtClean="0"/>
-              <a:t>5/14/2021</a:t>
+              <a:t>5/21/2021</a:t>
             </a:fld>
             <a:endParaRPr lang="en-US"/>
           </a:p>
@@ -2307,7 +2314,7 @@
           <a:p>
             <a:fld id="{846CE7D5-CF57-46EF-B807-FDD0502418D4}" type="datetimeFigureOut">
               <a:rPr lang="en-US" smtClean="0"/>
-              <a:t>5/14/2021</a:t>
+              <a:t>5/21/2021</a:t>
             </a:fld>
             <a:endParaRPr lang="en-US"/>
           </a:p>
@@ -2564,7 +2571,7 @@
           <a:p>
             <a:fld id="{846CE7D5-CF57-46EF-B807-FDD0502418D4}" type="datetimeFigureOut">
               <a:rPr lang="en-US" smtClean="0"/>
-              <a:t>5/14/2021</a:t>
+              <a:t>5/21/2021</a:t>
             </a:fld>
             <a:endParaRPr lang="en-US"/>
           </a:p>
@@ -2777,7 +2784,7 @@
           <a:p>
             <a:fld id="{846CE7D5-CF57-46EF-B807-FDD0502418D4}" type="datetimeFigureOut">
               <a:rPr lang="en-US" smtClean="0"/>
-              <a:t>5/14/2021</a:t>
+              <a:t>5/21/2021</a:t>
             </a:fld>
             <a:endParaRPr lang="en-US"/>
           </a:p>
@@ -3239,6 +3246,1495 @@
 </p:sld>
 </file>
 
+<file path=ppt/slides/slide10.xml><?xml version="1.0" encoding="utf-8"?>
+<p:sld xmlns:a="http://schemas.openxmlformats.org/drawingml/2006/main" xmlns:r="http://schemas.openxmlformats.org/officeDocument/2006/relationships" xmlns:p="http://schemas.openxmlformats.org/presentationml/2006/main">
+  <p:cSld>
+    <p:spTree>
+      <p:nvGrpSpPr>
+        <p:cNvPr id="1" name=""/>
+        <p:cNvGrpSpPr/>
+        <p:nvPr/>
+      </p:nvGrpSpPr>
+      <p:grpSpPr>
+        <a:xfrm>
+          <a:off x="0" y="0"/>
+          <a:ext cx="0" cy="0"/>
+          <a:chOff x="0" y="0"/>
+          <a:chExt cx="0" cy="0"/>
+        </a:xfrm>
+      </p:grpSpPr>
+      <p:sp>
+        <p:nvSpPr>
+          <p:cNvPr id="2" name="Title 1">
+            <a:extLst>
+              <a:ext uri="{FF2B5EF4-FFF2-40B4-BE49-F238E27FC236}">
+                <a16:creationId xmlns:a16="http://schemas.microsoft.com/office/drawing/2014/main" id="{E65736D8-E0BC-49F2-9B64-C240E1FA57AA}"/>
+              </a:ext>
+            </a:extLst>
+          </p:cNvPr>
+          <p:cNvSpPr>
+            <a:spLocks noGrp="1"/>
+          </p:cNvSpPr>
+          <p:nvPr>
+            <p:ph type="title"/>
+          </p:nvPr>
+        </p:nvSpPr>
+        <p:spPr/>
+        <p:txBody>
+          <a:bodyPr/>
+          <a:lstStyle/>
+          <a:p>
+            <a:endParaRPr lang="en-US"/>
+          </a:p>
+        </p:txBody>
+      </p:sp>
+      <p:sp>
+        <p:nvSpPr>
+          <p:cNvPr id="3" name="Content Placeholder 2">
+            <a:extLst>
+              <a:ext uri="{FF2B5EF4-FFF2-40B4-BE49-F238E27FC236}">
+                <a16:creationId xmlns:a16="http://schemas.microsoft.com/office/drawing/2014/main" id="{14B6FC5C-40D2-4ED6-9532-46DBF62A8E1F}"/>
+              </a:ext>
+            </a:extLst>
+          </p:cNvPr>
+          <p:cNvSpPr>
+            <a:spLocks noGrp="1"/>
+          </p:cNvSpPr>
+          <p:nvPr>
+            <p:ph idx="1"/>
+          </p:nvPr>
+        </p:nvSpPr>
+        <p:spPr/>
+        <p:txBody>
+          <a:bodyPr/>
+          <a:lstStyle/>
+          <a:p>
+            <a:endParaRPr lang="en-US"/>
+          </a:p>
+        </p:txBody>
+      </p:sp>
+      <p:sp>
+        <p:nvSpPr>
+          <p:cNvPr id="4" name="Rectangle: Rounded Corners 3">
+            <a:extLst>
+              <a:ext uri="{FF2B5EF4-FFF2-40B4-BE49-F238E27FC236}">
+                <a16:creationId xmlns:a16="http://schemas.microsoft.com/office/drawing/2014/main" id="{6581FE13-5EE0-4A7F-BF00-C7B25525C292}"/>
+              </a:ext>
+            </a:extLst>
+          </p:cNvPr>
+          <p:cNvSpPr/>
+          <p:nvPr/>
+        </p:nvSpPr>
+        <p:spPr>
+          <a:xfrm>
+            <a:off x="586740" y="1059180"/>
+            <a:ext cx="8793480" cy="5006340"/>
+          </a:xfrm>
+          <a:prstGeom prst="roundRect">
+            <a:avLst/>
+          </a:prstGeom>
+        </p:spPr>
+        <p:style>
+          <a:lnRef idx="2">
+            <a:schemeClr val="accent1">
+              <a:shade val="50000"/>
+            </a:schemeClr>
+          </a:lnRef>
+          <a:fillRef idx="1">
+            <a:schemeClr val="accent1"/>
+          </a:fillRef>
+          <a:effectRef idx="0">
+            <a:schemeClr val="accent1"/>
+          </a:effectRef>
+          <a:fontRef idx="minor">
+            <a:schemeClr val="lt1"/>
+          </a:fontRef>
+        </p:style>
+        <p:txBody>
+          <a:bodyPr rtlCol="0" anchor="ctr"/>
+          <a:lstStyle/>
+          <a:p>
+            <a:pPr algn="ctr"/>
+            <a:r>
+              <a:rPr lang="en-US" dirty="0"/>
+              <a:t>The actual game……</a:t>
+            </a:r>
+          </a:p>
+        </p:txBody>
+      </p:sp>
+    </p:spTree>
+    <p:extLst>
+      <p:ext uri="{BB962C8B-B14F-4D97-AF65-F5344CB8AC3E}">
+        <p14:creationId xmlns:p14="http://schemas.microsoft.com/office/powerpoint/2010/main" val="953294602"/>
+      </p:ext>
+    </p:extLst>
+  </p:cSld>
+  <p:clrMapOvr>
+    <a:masterClrMapping/>
+  </p:clrMapOvr>
+</p:sld>
+</file>
+
+<file path=ppt/slides/slide11.xml><?xml version="1.0" encoding="utf-8"?>
+<p:sld xmlns:a="http://schemas.openxmlformats.org/drawingml/2006/main" xmlns:r="http://schemas.openxmlformats.org/officeDocument/2006/relationships" xmlns:p="http://schemas.openxmlformats.org/presentationml/2006/main">
+  <p:cSld>
+    <p:spTree>
+      <p:nvGrpSpPr>
+        <p:cNvPr id="1" name=""/>
+        <p:cNvGrpSpPr/>
+        <p:nvPr/>
+      </p:nvGrpSpPr>
+      <p:grpSpPr>
+        <a:xfrm>
+          <a:off x="0" y="0"/>
+          <a:ext cx="0" cy="0"/>
+          <a:chOff x="0" y="0"/>
+          <a:chExt cx="0" cy="0"/>
+        </a:xfrm>
+      </p:grpSpPr>
+      <p:sp>
+        <p:nvSpPr>
+          <p:cNvPr id="2" name="Title 1">
+            <a:extLst>
+              <a:ext uri="{FF2B5EF4-FFF2-40B4-BE49-F238E27FC236}">
+                <a16:creationId xmlns:a16="http://schemas.microsoft.com/office/drawing/2014/main" id="{13A1538D-67C0-4906-B38B-D202C2A1A9E9}"/>
+              </a:ext>
+            </a:extLst>
+          </p:cNvPr>
+          <p:cNvSpPr>
+            <a:spLocks noGrp="1"/>
+          </p:cNvSpPr>
+          <p:nvPr>
+            <p:ph type="title"/>
+          </p:nvPr>
+        </p:nvSpPr>
+        <p:spPr/>
+        <p:txBody>
+          <a:bodyPr/>
+          <a:lstStyle/>
+          <a:p>
+            <a:endParaRPr lang="en-US"/>
+          </a:p>
+        </p:txBody>
+      </p:sp>
+      <p:sp>
+        <p:nvSpPr>
+          <p:cNvPr id="3" name="Content Placeholder 2">
+            <a:extLst>
+              <a:ext uri="{FF2B5EF4-FFF2-40B4-BE49-F238E27FC236}">
+                <a16:creationId xmlns:a16="http://schemas.microsoft.com/office/drawing/2014/main" id="{3497D6AE-D4B7-4D5D-A952-3EF824F172DE}"/>
+              </a:ext>
+            </a:extLst>
+          </p:cNvPr>
+          <p:cNvSpPr>
+            <a:spLocks noGrp="1"/>
+          </p:cNvSpPr>
+          <p:nvPr>
+            <p:ph idx="1"/>
+          </p:nvPr>
+        </p:nvSpPr>
+        <p:spPr>
+          <a:xfrm>
+            <a:off x="9380220" y="1825625"/>
+            <a:ext cx="2811780" cy="4351338"/>
+          </a:xfrm>
+        </p:spPr>
+        <p:txBody>
+          <a:bodyPr/>
+          <a:lstStyle/>
+          <a:p>
+            <a:r>
+              <a:rPr lang="en-US" dirty="0"/>
+              <a:t>If click RESTART button</a:t>
+            </a:r>
+          </a:p>
+          <a:p>
+            <a:pPr lvl="1"/>
+            <a:r>
+              <a:rPr lang="en-US" dirty="0"/>
+              <a:t>Remove restart screen</a:t>
+            </a:r>
+          </a:p>
+          <a:p>
+            <a:pPr lvl="1"/>
+            <a:r>
+              <a:rPr lang="en-US" dirty="0"/>
+              <a:t>Restart level()</a:t>
+            </a:r>
+          </a:p>
+          <a:p>
+            <a:pPr lvl="1"/>
+            <a:endParaRPr lang="en-US" dirty="0"/>
+          </a:p>
+        </p:txBody>
+      </p:sp>
+      <p:sp>
+        <p:nvSpPr>
+          <p:cNvPr id="4" name="Rectangle: Rounded Corners 3">
+            <a:extLst>
+              <a:ext uri="{FF2B5EF4-FFF2-40B4-BE49-F238E27FC236}">
+                <a16:creationId xmlns:a16="http://schemas.microsoft.com/office/drawing/2014/main" id="{05984947-3055-443A-BAE9-147260E12A4B}"/>
+              </a:ext>
+            </a:extLst>
+          </p:cNvPr>
+          <p:cNvSpPr/>
+          <p:nvPr/>
+        </p:nvSpPr>
+        <p:spPr>
+          <a:xfrm>
+            <a:off x="586740" y="1059180"/>
+            <a:ext cx="8793480" cy="5006340"/>
+          </a:xfrm>
+          <a:prstGeom prst="roundRect">
+            <a:avLst/>
+          </a:prstGeom>
+        </p:spPr>
+        <p:style>
+          <a:lnRef idx="2">
+            <a:schemeClr val="accent1">
+              <a:shade val="50000"/>
+            </a:schemeClr>
+          </a:lnRef>
+          <a:fillRef idx="1">
+            <a:schemeClr val="accent1"/>
+          </a:fillRef>
+          <a:effectRef idx="0">
+            <a:schemeClr val="accent1"/>
+          </a:effectRef>
+          <a:fontRef idx="minor">
+            <a:schemeClr val="lt1"/>
+          </a:fontRef>
+        </p:style>
+        <p:txBody>
+          <a:bodyPr rtlCol="0" anchor="ctr"/>
+          <a:lstStyle/>
+          <a:p>
+            <a:pPr algn="ctr"/>
+            <a:r>
+              <a:rPr lang="en-US" dirty="0" err="1"/>
+              <a:t>Ohhhhh</a:t>
+            </a:r>
+            <a:r>
+              <a:rPr lang="en-US" dirty="0"/>
+              <a:t>, too bad…</a:t>
+            </a:r>
+          </a:p>
+          <a:p>
+            <a:pPr algn="ctr"/>
+            <a:r>
+              <a:rPr lang="en-US" dirty="0"/>
+              <a:t>game over</a:t>
+            </a:r>
+          </a:p>
+          <a:p>
+            <a:pPr algn="ctr"/>
+            <a:endParaRPr lang="en-US" dirty="0"/>
+          </a:p>
+          <a:p>
+            <a:pPr algn="ctr"/>
+            <a:endParaRPr lang="en-US" dirty="0"/>
+          </a:p>
+        </p:txBody>
+      </p:sp>
+      <p:sp>
+        <p:nvSpPr>
+          <p:cNvPr id="5" name="Rectangle: Rounded Corners 4">
+            <a:extLst>
+              <a:ext uri="{FF2B5EF4-FFF2-40B4-BE49-F238E27FC236}">
+                <a16:creationId xmlns:a16="http://schemas.microsoft.com/office/drawing/2014/main" id="{A15271DD-1667-43B3-B03E-37EF4379222B}"/>
+              </a:ext>
+            </a:extLst>
+          </p:cNvPr>
+          <p:cNvSpPr/>
+          <p:nvPr/>
+        </p:nvSpPr>
+        <p:spPr>
+          <a:xfrm>
+            <a:off x="3432810" y="4320540"/>
+            <a:ext cx="3101340" cy="967740"/>
+          </a:xfrm>
+          <a:prstGeom prst="roundRect">
+            <a:avLst/>
+          </a:prstGeom>
+        </p:spPr>
+        <p:style>
+          <a:lnRef idx="2">
+            <a:schemeClr val="accent4">
+              <a:shade val="50000"/>
+            </a:schemeClr>
+          </a:lnRef>
+          <a:fillRef idx="1">
+            <a:schemeClr val="accent4"/>
+          </a:fillRef>
+          <a:effectRef idx="0">
+            <a:schemeClr val="accent4"/>
+          </a:effectRef>
+          <a:fontRef idx="minor">
+            <a:schemeClr val="lt1"/>
+          </a:fontRef>
+        </p:style>
+        <p:txBody>
+          <a:bodyPr rtlCol="0" anchor="ctr"/>
+          <a:lstStyle/>
+          <a:p>
+            <a:pPr algn="ctr"/>
+            <a:r>
+              <a:rPr lang="en-US" dirty="0"/>
+              <a:t>RETRY</a:t>
+            </a:r>
+          </a:p>
+        </p:txBody>
+      </p:sp>
+    </p:spTree>
+    <p:extLst>
+      <p:ext uri="{BB962C8B-B14F-4D97-AF65-F5344CB8AC3E}">
+        <p14:creationId xmlns:p14="http://schemas.microsoft.com/office/powerpoint/2010/main" val="2127941822"/>
+      </p:ext>
+    </p:extLst>
+  </p:cSld>
+  <p:clrMapOvr>
+    <a:masterClrMapping/>
+  </p:clrMapOvr>
+</p:sld>
+</file>
+
+<file path=ppt/slides/slide12.xml><?xml version="1.0" encoding="utf-8"?>
+<p:sld xmlns:a="http://schemas.openxmlformats.org/drawingml/2006/main" xmlns:r="http://schemas.openxmlformats.org/officeDocument/2006/relationships" xmlns:p="http://schemas.openxmlformats.org/presentationml/2006/main">
+  <p:cSld>
+    <p:spTree>
+      <p:nvGrpSpPr>
+        <p:cNvPr id="1" name=""/>
+        <p:cNvGrpSpPr/>
+        <p:nvPr/>
+      </p:nvGrpSpPr>
+      <p:grpSpPr>
+        <a:xfrm>
+          <a:off x="0" y="0"/>
+          <a:ext cx="0" cy="0"/>
+          <a:chOff x="0" y="0"/>
+          <a:chExt cx="0" cy="0"/>
+        </a:xfrm>
+      </p:grpSpPr>
+      <p:sp>
+        <p:nvSpPr>
+          <p:cNvPr id="6" name="Rectangle 5">
+            <a:extLst>
+              <a:ext uri="{FF2B5EF4-FFF2-40B4-BE49-F238E27FC236}">
+                <a16:creationId xmlns:a16="http://schemas.microsoft.com/office/drawing/2014/main" id="{8555B237-9B48-44DB-8051-B29D1D13C831}"/>
+              </a:ext>
+            </a:extLst>
+          </p:cNvPr>
+          <p:cNvSpPr/>
+          <p:nvPr/>
+        </p:nvSpPr>
+        <p:spPr>
+          <a:xfrm>
+            <a:off x="7585441" y="2971797"/>
+            <a:ext cx="439616" cy="413239"/>
+          </a:xfrm>
+          <a:prstGeom prst="rect">
+            <a:avLst/>
+          </a:prstGeom>
+          <a:solidFill>
+            <a:srgbClr val="FF0000"/>
+          </a:solidFill>
+        </p:spPr>
+        <p:style>
+          <a:lnRef idx="2">
+            <a:schemeClr val="accent6">
+              <a:shade val="50000"/>
+            </a:schemeClr>
+          </a:lnRef>
+          <a:fillRef idx="1">
+            <a:schemeClr val="accent6"/>
+          </a:fillRef>
+          <a:effectRef idx="0">
+            <a:schemeClr val="accent6"/>
+          </a:effectRef>
+          <a:fontRef idx="minor">
+            <a:schemeClr val="lt1"/>
+          </a:fontRef>
+        </p:style>
+        <p:txBody>
+          <a:bodyPr rtlCol="0" anchor="ctr"/>
+          <a:lstStyle/>
+          <a:p>
+            <a:pPr algn="ctr"/>
+            <a:endParaRPr lang="en-US"/>
+          </a:p>
+        </p:txBody>
+      </p:sp>
+      <p:sp>
+        <p:nvSpPr>
+          <p:cNvPr id="7" name="Rectangle 6">
+            <a:extLst>
+              <a:ext uri="{FF2B5EF4-FFF2-40B4-BE49-F238E27FC236}">
+                <a16:creationId xmlns:a16="http://schemas.microsoft.com/office/drawing/2014/main" id="{18BCD94E-7213-489A-B5ED-BBED53F77293}"/>
+              </a:ext>
+            </a:extLst>
+          </p:cNvPr>
+          <p:cNvSpPr/>
+          <p:nvPr/>
+        </p:nvSpPr>
+        <p:spPr>
+          <a:xfrm>
+            <a:off x="1395291" y="2985964"/>
+            <a:ext cx="439616" cy="413239"/>
+          </a:xfrm>
+          <a:prstGeom prst="rect">
+            <a:avLst/>
+          </a:prstGeom>
+          <a:solidFill>
+            <a:srgbClr val="00B050"/>
+          </a:solidFill>
+        </p:spPr>
+        <p:style>
+          <a:lnRef idx="2">
+            <a:schemeClr val="accent6">
+              <a:shade val="50000"/>
+            </a:schemeClr>
+          </a:lnRef>
+          <a:fillRef idx="1">
+            <a:schemeClr val="accent6"/>
+          </a:fillRef>
+          <a:effectRef idx="0">
+            <a:schemeClr val="accent6"/>
+          </a:effectRef>
+          <a:fontRef idx="minor">
+            <a:schemeClr val="lt1"/>
+          </a:fontRef>
+        </p:style>
+        <p:txBody>
+          <a:bodyPr rtlCol="0" anchor="ctr"/>
+          <a:lstStyle/>
+          <a:p>
+            <a:pPr algn="ctr"/>
+            <a:endParaRPr lang="en-US" dirty="0"/>
+          </a:p>
+        </p:txBody>
+      </p:sp>
+      <p:sp>
+        <p:nvSpPr>
+          <p:cNvPr id="8" name="Rectangle 7">
+            <a:extLst>
+              <a:ext uri="{FF2B5EF4-FFF2-40B4-BE49-F238E27FC236}">
+                <a16:creationId xmlns:a16="http://schemas.microsoft.com/office/drawing/2014/main" id="{53EB4EE4-17F8-4967-81F1-70336FFADEAC}"/>
+              </a:ext>
+            </a:extLst>
+          </p:cNvPr>
+          <p:cNvSpPr/>
+          <p:nvPr/>
+        </p:nvSpPr>
+        <p:spPr>
+          <a:xfrm>
+            <a:off x="5816600" y="1123950"/>
+            <a:ext cx="139700" cy="2243503"/>
+          </a:xfrm>
+          <a:prstGeom prst="rect">
+            <a:avLst/>
+          </a:prstGeom>
+        </p:spPr>
+        <p:style>
+          <a:lnRef idx="2">
+            <a:schemeClr val="accent4">
+              <a:shade val="50000"/>
+            </a:schemeClr>
+          </a:lnRef>
+          <a:fillRef idx="1">
+            <a:schemeClr val="accent4"/>
+          </a:fillRef>
+          <a:effectRef idx="0">
+            <a:schemeClr val="accent4"/>
+          </a:effectRef>
+          <a:fontRef idx="minor">
+            <a:schemeClr val="lt1"/>
+          </a:fontRef>
+        </p:style>
+        <p:txBody>
+          <a:bodyPr rtlCol="0" anchor="ctr"/>
+          <a:lstStyle/>
+          <a:p>
+            <a:pPr algn="ctr"/>
+            <a:endParaRPr lang="en-US"/>
+          </a:p>
+        </p:txBody>
+      </p:sp>
+      <p:sp>
+        <p:nvSpPr>
+          <p:cNvPr id="9" name="Rectangle 8">
+            <a:extLst>
+              <a:ext uri="{FF2B5EF4-FFF2-40B4-BE49-F238E27FC236}">
+                <a16:creationId xmlns:a16="http://schemas.microsoft.com/office/drawing/2014/main" id="{ECEEAAEE-DB35-44C1-8EE1-E8E74B29A17D}"/>
+              </a:ext>
+            </a:extLst>
+          </p:cNvPr>
+          <p:cNvSpPr/>
+          <p:nvPr/>
+        </p:nvSpPr>
+        <p:spPr>
+          <a:xfrm>
+            <a:off x="838200" y="3367453"/>
+            <a:ext cx="7631723" cy="211016"/>
+          </a:xfrm>
+          <a:prstGeom prst="rect">
+            <a:avLst/>
+          </a:prstGeom>
+          <a:solidFill>
+            <a:schemeClr val="tx1"/>
+          </a:solidFill>
+        </p:spPr>
+        <p:style>
+          <a:lnRef idx="2">
+            <a:schemeClr val="accent6">
+              <a:shade val="50000"/>
+            </a:schemeClr>
+          </a:lnRef>
+          <a:fillRef idx="1">
+            <a:schemeClr val="accent6"/>
+          </a:fillRef>
+          <a:effectRef idx="0">
+            <a:schemeClr val="accent6"/>
+          </a:effectRef>
+          <a:fontRef idx="minor">
+            <a:schemeClr val="lt1"/>
+          </a:fontRef>
+        </p:style>
+        <p:txBody>
+          <a:bodyPr rtlCol="0" anchor="ctr"/>
+          <a:lstStyle/>
+          <a:p>
+            <a:pPr algn="ctr"/>
+            <a:endParaRPr lang="en-US"/>
+          </a:p>
+        </p:txBody>
+      </p:sp>
+      <p:sp>
+        <p:nvSpPr>
+          <p:cNvPr id="10" name="Rectangle 9">
+            <a:extLst>
+              <a:ext uri="{FF2B5EF4-FFF2-40B4-BE49-F238E27FC236}">
+                <a16:creationId xmlns:a16="http://schemas.microsoft.com/office/drawing/2014/main" id="{E3075DED-CA5A-49B2-8DC7-734E49301565}"/>
+              </a:ext>
+            </a:extLst>
+          </p:cNvPr>
+          <p:cNvSpPr/>
+          <p:nvPr/>
+        </p:nvSpPr>
+        <p:spPr>
+          <a:xfrm>
+            <a:off x="736846" y="1704944"/>
+            <a:ext cx="3068514" cy="2146085"/>
+          </a:xfrm>
+          <a:prstGeom prst="rect">
+            <a:avLst/>
+          </a:prstGeom>
+          <a:solidFill>
+            <a:srgbClr val="00B050">
+              <a:alpha val="20000"/>
+            </a:srgbClr>
+          </a:solidFill>
+        </p:spPr>
+        <p:style>
+          <a:lnRef idx="2">
+            <a:schemeClr val="accent6">
+              <a:shade val="50000"/>
+            </a:schemeClr>
+          </a:lnRef>
+          <a:fillRef idx="1">
+            <a:schemeClr val="accent6"/>
+          </a:fillRef>
+          <a:effectRef idx="0">
+            <a:schemeClr val="accent6"/>
+          </a:effectRef>
+          <a:fontRef idx="minor">
+            <a:schemeClr val="lt1"/>
+          </a:fontRef>
+        </p:style>
+        <p:txBody>
+          <a:bodyPr rtlCol="0" anchor="ctr"/>
+          <a:lstStyle/>
+          <a:p>
+            <a:pPr algn="ctr"/>
+            <a:endParaRPr lang="en-US" dirty="0"/>
+          </a:p>
+        </p:txBody>
+      </p:sp>
+    </p:spTree>
+    <p:extLst>
+      <p:ext uri="{BB962C8B-B14F-4D97-AF65-F5344CB8AC3E}">
+        <p14:creationId xmlns:p14="http://schemas.microsoft.com/office/powerpoint/2010/main" val="2325646076"/>
+      </p:ext>
+    </p:extLst>
+  </p:cSld>
+  <p:clrMapOvr>
+    <a:masterClrMapping/>
+  </p:clrMapOvr>
+</p:sld>
+</file>
+
+<file path=ppt/slides/slide13.xml><?xml version="1.0" encoding="utf-8"?>
+<p:sld xmlns:a="http://schemas.openxmlformats.org/drawingml/2006/main" xmlns:r="http://schemas.openxmlformats.org/officeDocument/2006/relationships" xmlns:p="http://schemas.openxmlformats.org/presentationml/2006/main">
+  <p:cSld>
+    <p:spTree>
+      <p:nvGrpSpPr>
+        <p:cNvPr id="1" name=""/>
+        <p:cNvGrpSpPr/>
+        <p:nvPr/>
+      </p:nvGrpSpPr>
+      <p:grpSpPr>
+        <a:xfrm>
+          <a:off x="0" y="0"/>
+          <a:ext cx="0" cy="0"/>
+          <a:chOff x="0" y="0"/>
+          <a:chExt cx="0" cy="0"/>
+        </a:xfrm>
+      </p:grpSpPr>
+      <p:sp>
+        <p:nvSpPr>
+          <p:cNvPr id="2" name="Title 1">
+            <a:extLst>
+              <a:ext uri="{FF2B5EF4-FFF2-40B4-BE49-F238E27FC236}">
+                <a16:creationId xmlns:a16="http://schemas.microsoft.com/office/drawing/2014/main" id="{43C71F9C-85A5-4A41-9921-793F0369ED46}"/>
+              </a:ext>
+            </a:extLst>
+          </p:cNvPr>
+          <p:cNvSpPr>
+            <a:spLocks noGrp="1"/>
+          </p:cNvSpPr>
+          <p:nvPr>
+            <p:ph type="title"/>
+          </p:nvPr>
+        </p:nvSpPr>
+        <p:spPr/>
+        <p:txBody>
+          <a:bodyPr/>
+          <a:lstStyle/>
+          <a:p>
+            <a:r>
+              <a:rPr lang="en-US" dirty="0"/>
+              <a:t>Enemy structure</a:t>
+            </a:r>
+          </a:p>
+        </p:txBody>
+      </p:sp>
+      <p:sp>
+        <p:nvSpPr>
+          <p:cNvPr id="4" name="Rectangle 3">
+            <a:extLst>
+              <a:ext uri="{FF2B5EF4-FFF2-40B4-BE49-F238E27FC236}">
+                <a16:creationId xmlns:a16="http://schemas.microsoft.com/office/drawing/2014/main" id="{41DE9440-90BC-4D34-AD48-BC26A7C36E98}"/>
+              </a:ext>
+            </a:extLst>
+          </p:cNvPr>
+          <p:cNvSpPr/>
+          <p:nvPr/>
+        </p:nvSpPr>
+        <p:spPr>
+          <a:xfrm>
+            <a:off x="7502647" y="3809363"/>
+            <a:ext cx="1686131" cy="1584963"/>
+          </a:xfrm>
+          <a:prstGeom prst="rect">
+            <a:avLst/>
+          </a:prstGeom>
+          <a:solidFill>
+            <a:srgbClr val="FF0000"/>
+          </a:solidFill>
+        </p:spPr>
+        <p:style>
+          <a:lnRef idx="2">
+            <a:schemeClr val="accent6">
+              <a:shade val="50000"/>
+            </a:schemeClr>
+          </a:lnRef>
+          <a:fillRef idx="1">
+            <a:schemeClr val="accent6"/>
+          </a:fillRef>
+          <a:effectRef idx="0">
+            <a:schemeClr val="accent6"/>
+          </a:effectRef>
+          <a:fontRef idx="minor">
+            <a:schemeClr val="lt1"/>
+          </a:fontRef>
+        </p:style>
+        <p:txBody>
+          <a:bodyPr rtlCol="0" anchor="ctr"/>
+          <a:lstStyle/>
+          <a:p>
+            <a:pPr algn="ctr"/>
+            <a:r>
+              <a:rPr lang="en-US" dirty="0"/>
+              <a:t>Body collider</a:t>
+            </a:r>
+          </a:p>
+        </p:txBody>
+      </p:sp>
+      <p:sp>
+        <p:nvSpPr>
+          <p:cNvPr id="5" name="Rectangle 4">
+            <a:extLst>
+              <a:ext uri="{FF2B5EF4-FFF2-40B4-BE49-F238E27FC236}">
+                <a16:creationId xmlns:a16="http://schemas.microsoft.com/office/drawing/2014/main" id="{2B1152E3-4BBC-46B6-90E7-FC77E1CC8C8A}"/>
+              </a:ext>
+            </a:extLst>
+          </p:cNvPr>
+          <p:cNvSpPr/>
+          <p:nvPr/>
+        </p:nvSpPr>
+        <p:spPr>
+          <a:xfrm>
+            <a:off x="7704199" y="3292930"/>
+            <a:ext cx="1299028" cy="420234"/>
+          </a:xfrm>
+          <a:prstGeom prst="rect">
+            <a:avLst/>
+          </a:prstGeom>
+          <a:solidFill>
+            <a:schemeClr val="accent2"/>
+          </a:solidFill>
+        </p:spPr>
+        <p:style>
+          <a:lnRef idx="2">
+            <a:schemeClr val="accent6">
+              <a:shade val="50000"/>
+            </a:schemeClr>
+          </a:lnRef>
+          <a:fillRef idx="1">
+            <a:schemeClr val="accent6"/>
+          </a:fillRef>
+          <a:effectRef idx="0">
+            <a:schemeClr val="accent6"/>
+          </a:effectRef>
+          <a:fontRef idx="minor">
+            <a:schemeClr val="lt1"/>
+          </a:fontRef>
+        </p:style>
+        <p:txBody>
+          <a:bodyPr rtlCol="0" anchor="ctr"/>
+          <a:lstStyle/>
+          <a:p>
+            <a:pPr algn="ctr"/>
+            <a:r>
+              <a:rPr lang="en-US" dirty="0"/>
+              <a:t>Top collider</a:t>
+            </a:r>
+          </a:p>
+        </p:txBody>
+      </p:sp>
+      <p:sp>
+        <p:nvSpPr>
+          <p:cNvPr id="7" name="Rectangle 6">
+            <a:extLst>
+              <a:ext uri="{FF2B5EF4-FFF2-40B4-BE49-F238E27FC236}">
+                <a16:creationId xmlns:a16="http://schemas.microsoft.com/office/drawing/2014/main" id="{A0DABB58-23AB-4196-BD35-8A68070227A1}"/>
+              </a:ext>
+            </a:extLst>
+          </p:cNvPr>
+          <p:cNvSpPr/>
+          <p:nvPr/>
+        </p:nvSpPr>
+        <p:spPr>
+          <a:xfrm>
+            <a:off x="1035172" y="1957544"/>
+            <a:ext cx="2631953" cy="642781"/>
+          </a:xfrm>
+          <a:prstGeom prst="rect">
+            <a:avLst/>
+          </a:prstGeom>
+          <a:solidFill>
+            <a:srgbClr val="FF0000"/>
+          </a:solidFill>
+        </p:spPr>
+        <p:style>
+          <a:lnRef idx="2">
+            <a:schemeClr val="accent6">
+              <a:shade val="50000"/>
+            </a:schemeClr>
+          </a:lnRef>
+          <a:fillRef idx="1">
+            <a:schemeClr val="accent6"/>
+          </a:fillRef>
+          <a:effectRef idx="0">
+            <a:schemeClr val="accent6"/>
+          </a:effectRef>
+          <a:fontRef idx="minor">
+            <a:schemeClr val="lt1"/>
+          </a:fontRef>
+        </p:style>
+        <p:txBody>
+          <a:bodyPr rtlCol="0" anchor="ctr"/>
+          <a:lstStyle/>
+          <a:p>
+            <a:pPr algn="ctr"/>
+            <a:r>
+              <a:rPr lang="en-US" dirty="0"/>
+              <a:t>Game object : Enemy</a:t>
+            </a:r>
+          </a:p>
+          <a:p>
+            <a:pPr algn="ctr"/>
+            <a:r>
+              <a:rPr lang="en-US" dirty="0"/>
+              <a:t>3d cube</a:t>
+            </a:r>
+          </a:p>
+        </p:txBody>
+      </p:sp>
+      <p:sp>
+        <p:nvSpPr>
+          <p:cNvPr id="8" name="Rectangle 7">
+            <a:extLst>
+              <a:ext uri="{FF2B5EF4-FFF2-40B4-BE49-F238E27FC236}">
+                <a16:creationId xmlns:a16="http://schemas.microsoft.com/office/drawing/2014/main" id="{BC9B3101-750F-4053-B888-4B1FA7999FB1}"/>
+              </a:ext>
+            </a:extLst>
+          </p:cNvPr>
+          <p:cNvSpPr/>
+          <p:nvPr/>
+        </p:nvSpPr>
+        <p:spPr>
+          <a:xfrm>
+            <a:off x="2351148" y="2689609"/>
+            <a:ext cx="2136655" cy="642781"/>
+          </a:xfrm>
+          <a:prstGeom prst="rect">
+            <a:avLst/>
+          </a:prstGeom>
+          <a:solidFill>
+            <a:schemeClr val="accent2"/>
+          </a:solidFill>
+        </p:spPr>
+        <p:style>
+          <a:lnRef idx="2">
+            <a:schemeClr val="accent6">
+              <a:shade val="50000"/>
+            </a:schemeClr>
+          </a:lnRef>
+          <a:fillRef idx="1">
+            <a:schemeClr val="accent6"/>
+          </a:fillRef>
+          <a:effectRef idx="0">
+            <a:schemeClr val="accent6"/>
+          </a:effectRef>
+          <a:fontRef idx="minor">
+            <a:schemeClr val="lt1"/>
+          </a:fontRef>
+        </p:style>
+        <p:txBody>
+          <a:bodyPr rtlCol="0" anchor="ctr"/>
+          <a:lstStyle/>
+          <a:p>
+            <a:pPr algn="ctr"/>
+            <a:r>
+              <a:rPr lang="en-US" dirty="0"/>
+              <a:t>Game object: Head</a:t>
+            </a:r>
+          </a:p>
+        </p:txBody>
+      </p:sp>
+      <p:sp>
+        <p:nvSpPr>
+          <p:cNvPr id="9" name="Rectangle 8">
+            <a:extLst>
+              <a:ext uri="{FF2B5EF4-FFF2-40B4-BE49-F238E27FC236}">
+                <a16:creationId xmlns:a16="http://schemas.microsoft.com/office/drawing/2014/main" id="{AF89C6CB-8711-4F94-90E1-A7B8258723B4}"/>
+              </a:ext>
+            </a:extLst>
+          </p:cNvPr>
+          <p:cNvSpPr/>
+          <p:nvPr/>
+        </p:nvSpPr>
+        <p:spPr>
+          <a:xfrm>
+            <a:off x="2351148" y="3487972"/>
+            <a:ext cx="2136655" cy="642781"/>
+          </a:xfrm>
+          <a:prstGeom prst="rect">
+            <a:avLst/>
+          </a:prstGeom>
+          <a:solidFill>
+            <a:schemeClr val="accent6">
+              <a:lumMod val="75000"/>
+            </a:schemeClr>
+          </a:solidFill>
+        </p:spPr>
+        <p:style>
+          <a:lnRef idx="2">
+            <a:schemeClr val="accent6">
+              <a:shade val="50000"/>
+            </a:schemeClr>
+          </a:lnRef>
+          <a:fillRef idx="1">
+            <a:schemeClr val="accent6"/>
+          </a:fillRef>
+          <a:effectRef idx="0">
+            <a:schemeClr val="accent6"/>
+          </a:effectRef>
+          <a:fontRef idx="minor">
+            <a:schemeClr val="lt1"/>
+          </a:fontRef>
+        </p:style>
+        <p:txBody>
+          <a:bodyPr rtlCol="0" anchor="ctr"/>
+          <a:lstStyle/>
+          <a:p>
+            <a:pPr algn="ctr"/>
+            <a:r>
+              <a:rPr lang="en-US" dirty="0"/>
+              <a:t>Game object: 3d model of </a:t>
+            </a:r>
+            <a:r>
+              <a:rPr lang="en-US" dirty="0" err="1"/>
+              <a:t>goomba</a:t>
+            </a:r>
+            <a:endParaRPr lang="en-US" dirty="0"/>
+          </a:p>
+        </p:txBody>
+      </p:sp>
+    </p:spTree>
+    <p:extLst>
+      <p:ext uri="{BB962C8B-B14F-4D97-AF65-F5344CB8AC3E}">
+        <p14:creationId xmlns:p14="http://schemas.microsoft.com/office/powerpoint/2010/main" val="3435909588"/>
+      </p:ext>
+    </p:extLst>
+  </p:cSld>
+  <p:clrMapOvr>
+    <a:masterClrMapping/>
+  </p:clrMapOvr>
+</p:sld>
+</file>
+
+<file path=ppt/slides/slide14.xml><?xml version="1.0" encoding="utf-8"?>
+<p:sld xmlns:a="http://schemas.openxmlformats.org/drawingml/2006/main" xmlns:r="http://schemas.openxmlformats.org/officeDocument/2006/relationships" xmlns:p="http://schemas.openxmlformats.org/presentationml/2006/main">
+  <p:cSld>
+    <p:spTree>
+      <p:nvGrpSpPr>
+        <p:cNvPr id="1" name=""/>
+        <p:cNvGrpSpPr/>
+        <p:nvPr/>
+      </p:nvGrpSpPr>
+      <p:grpSpPr>
+        <a:xfrm>
+          <a:off x="0" y="0"/>
+          <a:ext cx="0" cy="0"/>
+          <a:chOff x="0" y="0"/>
+          <a:chExt cx="0" cy="0"/>
+        </a:xfrm>
+      </p:grpSpPr>
+      <p:sp>
+        <p:nvSpPr>
+          <p:cNvPr id="2" name="Title 1">
+            <a:extLst>
+              <a:ext uri="{FF2B5EF4-FFF2-40B4-BE49-F238E27FC236}">
+                <a16:creationId xmlns:a16="http://schemas.microsoft.com/office/drawing/2014/main" id="{6E533477-82DE-465C-B6A3-03025912A65F}"/>
+              </a:ext>
+            </a:extLst>
+          </p:cNvPr>
+          <p:cNvSpPr>
+            <a:spLocks noGrp="1"/>
+          </p:cNvSpPr>
+          <p:nvPr>
+            <p:ph type="title"/>
+          </p:nvPr>
+        </p:nvSpPr>
+        <p:spPr/>
+        <p:txBody>
+          <a:bodyPr/>
+          <a:lstStyle/>
+          <a:p>
+            <a:endParaRPr lang="en-US"/>
+          </a:p>
+        </p:txBody>
+      </p:sp>
+      <p:sp>
+        <p:nvSpPr>
+          <p:cNvPr id="3" name="Content Placeholder 2">
+            <a:extLst>
+              <a:ext uri="{FF2B5EF4-FFF2-40B4-BE49-F238E27FC236}">
+                <a16:creationId xmlns:a16="http://schemas.microsoft.com/office/drawing/2014/main" id="{63DD723C-694B-4AA9-9ACC-9A2DB2F3CBC2}"/>
+              </a:ext>
+            </a:extLst>
+          </p:cNvPr>
+          <p:cNvSpPr>
+            <a:spLocks noGrp="1"/>
+          </p:cNvSpPr>
+          <p:nvPr>
+            <p:ph idx="1"/>
+          </p:nvPr>
+        </p:nvSpPr>
+        <p:spPr/>
+        <p:txBody>
+          <a:bodyPr/>
+          <a:lstStyle/>
+          <a:p>
+            <a:endParaRPr lang="en-US"/>
+          </a:p>
+        </p:txBody>
+      </p:sp>
+      <p:pic>
+        <p:nvPicPr>
+          <p:cNvPr id="4" name="Picture 3">
+            <a:extLst>
+              <a:ext uri="{FF2B5EF4-FFF2-40B4-BE49-F238E27FC236}">
+                <a16:creationId xmlns:a16="http://schemas.microsoft.com/office/drawing/2014/main" id="{EDFD4161-622D-4241-A636-5AD3A2924B32}"/>
+              </a:ext>
+            </a:extLst>
+          </p:cNvPr>
+          <p:cNvPicPr>
+            <a:picLocks noChangeAspect="1"/>
+          </p:cNvPicPr>
+          <p:nvPr/>
+        </p:nvPicPr>
+        <p:blipFill>
+          <a:blip r:embed="rId2"/>
+          <a:stretch>
+            <a:fillRect/>
+          </a:stretch>
+        </p:blipFill>
+        <p:spPr>
+          <a:xfrm>
+            <a:off x="0" y="0"/>
+            <a:ext cx="12192000" cy="6858000"/>
+          </a:xfrm>
+          <a:prstGeom prst="rect">
+            <a:avLst/>
+          </a:prstGeom>
+        </p:spPr>
+      </p:pic>
+    </p:spTree>
+    <p:extLst>
+      <p:ext uri="{BB962C8B-B14F-4D97-AF65-F5344CB8AC3E}">
+        <p14:creationId xmlns:p14="http://schemas.microsoft.com/office/powerpoint/2010/main" val="3553364604"/>
+      </p:ext>
+    </p:extLst>
+  </p:cSld>
+  <p:clrMapOvr>
+    <a:masterClrMapping/>
+  </p:clrMapOvr>
+</p:sld>
+</file>
+
+<file path=ppt/slides/slide15.xml><?xml version="1.0" encoding="utf-8"?>
+<p:sld xmlns:a="http://schemas.openxmlformats.org/drawingml/2006/main" xmlns:r="http://schemas.openxmlformats.org/officeDocument/2006/relationships" xmlns:p="http://schemas.openxmlformats.org/presentationml/2006/main">
+  <p:cSld>
+    <p:spTree>
+      <p:nvGrpSpPr>
+        <p:cNvPr id="1" name=""/>
+        <p:cNvGrpSpPr/>
+        <p:nvPr/>
+      </p:nvGrpSpPr>
+      <p:grpSpPr>
+        <a:xfrm>
+          <a:off x="0" y="0"/>
+          <a:ext cx="0" cy="0"/>
+          <a:chOff x="0" y="0"/>
+          <a:chExt cx="0" cy="0"/>
+        </a:xfrm>
+      </p:grpSpPr>
+      <p:sp>
+        <p:nvSpPr>
+          <p:cNvPr id="2" name="Title 1">
+            <a:extLst>
+              <a:ext uri="{FF2B5EF4-FFF2-40B4-BE49-F238E27FC236}">
+                <a16:creationId xmlns:a16="http://schemas.microsoft.com/office/drawing/2014/main" id="{02B9D790-FA8B-44AC-A188-13D48A8FC8BA}"/>
+              </a:ext>
+            </a:extLst>
+          </p:cNvPr>
+          <p:cNvSpPr>
+            <a:spLocks noGrp="1"/>
+          </p:cNvSpPr>
+          <p:nvPr>
+            <p:ph type="title"/>
+          </p:nvPr>
+        </p:nvSpPr>
+        <p:spPr/>
+        <p:txBody>
+          <a:bodyPr/>
+          <a:lstStyle/>
+          <a:p>
+            <a:endParaRPr lang="en-US"/>
+          </a:p>
+        </p:txBody>
+      </p:sp>
+      <p:sp>
+        <p:nvSpPr>
+          <p:cNvPr id="3" name="Content Placeholder 2">
+            <a:extLst>
+              <a:ext uri="{FF2B5EF4-FFF2-40B4-BE49-F238E27FC236}">
+                <a16:creationId xmlns:a16="http://schemas.microsoft.com/office/drawing/2014/main" id="{559550E2-76F4-490B-BF64-EBD77064C7F2}"/>
+              </a:ext>
+            </a:extLst>
+          </p:cNvPr>
+          <p:cNvSpPr>
+            <a:spLocks noGrp="1"/>
+          </p:cNvSpPr>
+          <p:nvPr>
+            <p:ph idx="1"/>
+          </p:nvPr>
+        </p:nvSpPr>
+        <p:spPr/>
+        <p:txBody>
+          <a:bodyPr/>
+          <a:lstStyle/>
+          <a:p>
+            <a:endParaRPr lang="en-US"/>
+          </a:p>
+        </p:txBody>
+      </p:sp>
+      <p:pic>
+        <p:nvPicPr>
+          <p:cNvPr id="1026" name="Picture 2" descr="Top 10 Best Fighting Games for iOS/Android in 2020 - YouTube">
+            <a:extLst>
+              <a:ext uri="{FF2B5EF4-FFF2-40B4-BE49-F238E27FC236}">
+                <a16:creationId xmlns:a16="http://schemas.microsoft.com/office/drawing/2014/main" id="{5C23A19D-14C2-4EE6-A500-49DD75D7F3F6}"/>
+              </a:ext>
+            </a:extLst>
+          </p:cNvPr>
+          <p:cNvPicPr>
+            <a:picLocks noChangeAspect="1" noChangeArrowheads="1"/>
+          </p:cNvPicPr>
+          <p:nvPr/>
+        </p:nvPicPr>
+        <p:blipFill>
+          <a:blip r:embed="rId2">
+            <a:extLst>
+              <a:ext uri="{28A0092B-C50C-407E-A947-70E740481C1C}">
+                <a14:useLocalDpi xmlns:a14="http://schemas.microsoft.com/office/drawing/2010/main" val="0"/>
+              </a:ext>
+            </a:extLst>
+          </a:blip>
+          <a:srcRect/>
+          <a:stretch>
+            <a:fillRect/>
+          </a:stretch>
+        </p:blipFill>
+        <p:spPr bwMode="auto">
+          <a:xfrm>
+            <a:off x="0" y="0"/>
+            <a:ext cx="12192000" cy="6858000"/>
+          </a:xfrm>
+          <a:prstGeom prst="rect">
+            <a:avLst/>
+          </a:prstGeom>
+          <a:noFill/>
+          <a:extLst>
+            <a:ext uri="{909E8E84-426E-40DD-AFC4-6F175D3DCCD1}">
+              <a14:hiddenFill xmlns:a14="http://schemas.microsoft.com/office/drawing/2010/main">
+                <a:solidFill>
+                  <a:srgbClr val="FFFFFF"/>
+                </a:solidFill>
+              </a14:hiddenFill>
+            </a:ext>
+          </a:extLst>
+        </p:spPr>
+      </p:pic>
+      <p:sp>
+        <p:nvSpPr>
+          <p:cNvPr id="5" name="Rectangle 4">
+            <a:extLst>
+              <a:ext uri="{FF2B5EF4-FFF2-40B4-BE49-F238E27FC236}">
+                <a16:creationId xmlns:a16="http://schemas.microsoft.com/office/drawing/2014/main" id="{12BAD77E-E5E0-4E5A-B445-85656C766F0B}"/>
+              </a:ext>
+            </a:extLst>
+          </p:cNvPr>
+          <p:cNvSpPr/>
+          <p:nvPr/>
+        </p:nvSpPr>
+        <p:spPr>
+          <a:xfrm>
+            <a:off x="6361174" y="3912055"/>
+            <a:ext cx="496826" cy="420234"/>
+          </a:xfrm>
+          <a:prstGeom prst="rect">
+            <a:avLst/>
+          </a:prstGeom>
+          <a:solidFill>
+            <a:schemeClr val="accent2"/>
+          </a:solidFill>
+        </p:spPr>
+        <p:style>
+          <a:lnRef idx="2">
+            <a:schemeClr val="accent6">
+              <a:shade val="50000"/>
+            </a:schemeClr>
+          </a:lnRef>
+          <a:fillRef idx="1">
+            <a:schemeClr val="accent6"/>
+          </a:fillRef>
+          <a:effectRef idx="0">
+            <a:schemeClr val="accent6"/>
+          </a:effectRef>
+          <a:fontRef idx="minor">
+            <a:schemeClr val="lt1"/>
+          </a:fontRef>
+        </p:style>
+        <p:txBody>
+          <a:bodyPr rtlCol="0" anchor="ctr"/>
+          <a:lstStyle/>
+          <a:p>
+            <a:pPr algn="ctr"/>
+            <a:endParaRPr lang="en-US" dirty="0"/>
+          </a:p>
+        </p:txBody>
+      </p:sp>
+      <p:sp>
+        <p:nvSpPr>
+          <p:cNvPr id="6" name="Rectangle 5">
+            <a:extLst>
+              <a:ext uri="{FF2B5EF4-FFF2-40B4-BE49-F238E27FC236}">
+                <a16:creationId xmlns:a16="http://schemas.microsoft.com/office/drawing/2014/main" id="{66D9EFD6-1B74-405C-B20D-9111A406FCFE}"/>
+              </a:ext>
+            </a:extLst>
+          </p:cNvPr>
+          <p:cNvSpPr/>
+          <p:nvPr/>
+        </p:nvSpPr>
+        <p:spPr>
+          <a:xfrm>
+            <a:off x="7534275" y="2730955"/>
+            <a:ext cx="496826" cy="420234"/>
+          </a:xfrm>
+          <a:prstGeom prst="rect">
+            <a:avLst/>
+          </a:prstGeom>
+          <a:solidFill>
+            <a:schemeClr val="accent2"/>
+          </a:solidFill>
+        </p:spPr>
+        <p:style>
+          <a:lnRef idx="2">
+            <a:schemeClr val="accent6">
+              <a:shade val="50000"/>
+            </a:schemeClr>
+          </a:lnRef>
+          <a:fillRef idx="1">
+            <a:schemeClr val="accent6"/>
+          </a:fillRef>
+          <a:effectRef idx="0">
+            <a:schemeClr val="accent6"/>
+          </a:effectRef>
+          <a:fontRef idx="minor">
+            <a:schemeClr val="lt1"/>
+          </a:fontRef>
+        </p:style>
+        <p:txBody>
+          <a:bodyPr rtlCol="0" anchor="ctr"/>
+          <a:lstStyle/>
+          <a:p>
+            <a:pPr algn="ctr"/>
+            <a:endParaRPr lang="en-US" dirty="0"/>
+          </a:p>
+        </p:txBody>
+      </p:sp>
+      <p:sp>
+        <p:nvSpPr>
+          <p:cNvPr id="7" name="Rectangle 6">
+            <a:extLst>
+              <a:ext uri="{FF2B5EF4-FFF2-40B4-BE49-F238E27FC236}">
+                <a16:creationId xmlns:a16="http://schemas.microsoft.com/office/drawing/2014/main" id="{4896B1FE-C800-4C56-B712-920515CD84C9}"/>
+              </a:ext>
+            </a:extLst>
+          </p:cNvPr>
+          <p:cNvSpPr/>
+          <p:nvPr/>
+        </p:nvSpPr>
+        <p:spPr>
+          <a:xfrm>
+            <a:off x="6112761" y="5626555"/>
+            <a:ext cx="496826" cy="420234"/>
+          </a:xfrm>
+          <a:prstGeom prst="rect">
+            <a:avLst/>
+          </a:prstGeom>
+          <a:solidFill>
+            <a:schemeClr val="accent2"/>
+          </a:solidFill>
+        </p:spPr>
+        <p:style>
+          <a:lnRef idx="2">
+            <a:schemeClr val="accent6">
+              <a:shade val="50000"/>
+            </a:schemeClr>
+          </a:lnRef>
+          <a:fillRef idx="1">
+            <a:schemeClr val="accent6"/>
+          </a:fillRef>
+          <a:effectRef idx="0">
+            <a:schemeClr val="accent6"/>
+          </a:effectRef>
+          <a:fontRef idx="minor">
+            <a:schemeClr val="lt1"/>
+          </a:fontRef>
+        </p:style>
+        <p:txBody>
+          <a:bodyPr rtlCol="0" anchor="ctr"/>
+          <a:lstStyle/>
+          <a:p>
+            <a:pPr algn="ctr"/>
+            <a:endParaRPr lang="en-US" dirty="0"/>
+          </a:p>
+        </p:txBody>
+      </p:sp>
+      <p:sp>
+        <p:nvSpPr>
+          <p:cNvPr id="8" name="Rectangle 7">
+            <a:extLst>
+              <a:ext uri="{FF2B5EF4-FFF2-40B4-BE49-F238E27FC236}">
+                <a16:creationId xmlns:a16="http://schemas.microsoft.com/office/drawing/2014/main" id="{31DCBC0C-BBE9-4857-A34B-BC5614E9A7AB}"/>
+              </a:ext>
+            </a:extLst>
+          </p:cNvPr>
+          <p:cNvSpPr/>
+          <p:nvPr/>
+        </p:nvSpPr>
+        <p:spPr>
+          <a:xfrm>
+            <a:off x="4629150" y="2162174"/>
+            <a:ext cx="496826" cy="151947"/>
+          </a:xfrm>
+          <a:prstGeom prst="rect">
+            <a:avLst/>
+          </a:prstGeom>
+          <a:solidFill>
+            <a:schemeClr val="accent2"/>
+          </a:solidFill>
+        </p:spPr>
+        <p:style>
+          <a:lnRef idx="2">
+            <a:schemeClr val="accent6">
+              <a:shade val="50000"/>
+            </a:schemeClr>
+          </a:lnRef>
+          <a:fillRef idx="1">
+            <a:schemeClr val="accent6"/>
+          </a:fillRef>
+          <a:effectRef idx="0">
+            <a:schemeClr val="accent6"/>
+          </a:effectRef>
+          <a:fontRef idx="minor">
+            <a:schemeClr val="lt1"/>
+          </a:fontRef>
+        </p:style>
+        <p:txBody>
+          <a:bodyPr rtlCol="0" anchor="ctr"/>
+          <a:lstStyle/>
+          <a:p>
+            <a:pPr algn="ctr"/>
+            <a:endParaRPr lang="en-US" dirty="0"/>
+          </a:p>
+        </p:txBody>
+      </p:sp>
+      <p:sp>
+        <p:nvSpPr>
+          <p:cNvPr id="9" name="Rectangle 8">
+            <a:extLst>
+              <a:ext uri="{FF2B5EF4-FFF2-40B4-BE49-F238E27FC236}">
+                <a16:creationId xmlns:a16="http://schemas.microsoft.com/office/drawing/2014/main" id="{D3B08A89-79C2-4B35-853C-5E8DC32A49E3}"/>
+              </a:ext>
+            </a:extLst>
+          </p:cNvPr>
+          <p:cNvSpPr/>
+          <p:nvPr/>
+        </p:nvSpPr>
+        <p:spPr>
+          <a:xfrm>
+            <a:off x="4629150" y="2865098"/>
+            <a:ext cx="496826" cy="151947"/>
+          </a:xfrm>
+          <a:prstGeom prst="rect">
+            <a:avLst/>
+          </a:prstGeom>
+          <a:solidFill>
+            <a:schemeClr val="accent2"/>
+          </a:solidFill>
+        </p:spPr>
+        <p:style>
+          <a:lnRef idx="2">
+            <a:schemeClr val="accent6">
+              <a:shade val="50000"/>
+            </a:schemeClr>
+          </a:lnRef>
+          <a:fillRef idx="1">
+            <a:schemeClr val="accent6"/>
+          </a:fillRef>
+          <a:effectRef idx="0">
+            <a:schemeClr val="accent6"/>
+          </a:effectRef>
+          <a:fontRef idx="minor">
+            <a:schemeClr val="lt1"/>
+          </a:fontRef>
+        </p:style>
+        <p:txBody>
+          <a:bodyPr rtlCol="0" anchor="ctr"/>
+          <a:lstStyle/>
+          <a:p>
+            <a:pPr algn="ctr"/>
+            <a:endParaRPr lang="en-US" dirty="0"/>
+          </a:p>
+        </p:txBody>
+      </p:sp>
+      <p:sp>
+        <p:nvSpPr>
+          <p:cNvPr id="10" name="Rectangle 9">
+            <a:extLst>
+              <a:ext uri="{FF2B5EF4-FFF2-40B4-BE49-F238E27FC236}">
+                <a16:creationId xmlns:a16="http://schemas.microsoft.com/office/drawing/2014/main" id="{58C57710-2976-41DB-B823-744967AF9AFA}"/>
+              </a:ext>
+            </a:extLst>
+          </p:cNvPr>
+          <p:cNvSpPr/>
+          <p:nvPr/>
+        </p:nvSpPr>
+        <p:spPr>
+          <a:xfrm>
+            <a:off x="5087876" y="2368493"/>
+            <a:ext cx="77726" cy="442232"/>
+          </a:xfrm>
+          <a:prstGeom prst="rect">
+            <a:avLst/>
+          </a:prstGeom>
+          <a:solidFill>
+            <a:schemeClr val="accent2"/>
+          </a:solidFill>
+        </p:spPr>
+        <p:style>
+          <a:lnRef idx="2">
+            <a:schemeClr val="accent6">
+              <a:shade val="50000"/>
+            </a:schemeClr>
+          </a:lnRef>
+          <a:fillRef idx="1">
+            <a:schemeClr val="accent6"/>
+          </a:fillRef>
+          <a:effectRef idx="0">
+            <a:schemeClr val="accent6"/>
+          </a:effectRef>
+          <a:fontRef idx="minor">
+            <a:schemeClr val="lt1"/>
+          </a:fontRef>
+        </p:style>
+        <p:txBody>
+          <a:bodyPr rtlCol="0" anchor="ctr"/>
+          <a:lstStyle/>
+          <a:p>
+            <a:pPr algn="ctr"/>
+            <a:endParaRPr lang="en-US" dirty="0"/>
+          </a:p>
+        </p:txBody>
+      </p:sp>
+    </p:spTree>
+    <p:extLst>
+      <p:ext uri="{BB962C8B-B14F-4D97-AF65-F5344CB8AC3E}">
+        <p14:creationId xmlns:p14="http://schemas.microsoft.com/office/powerpoint/2010/main" val="1117208773"/>
+      </p:ext>
+    </p:extLst>
+  </p:cSld>
+  <p:clrMapOvr>
+    <a:masterClrMapping/>
+  </p:clrMapOvr>
+</p:sld>
+</file>
+
 <file path=ppt/slides/slide2.xml><?xml version="1.0" encoding="utf-8"?>
 <p:sld xmlns:a="http://schemas.openxmlformats.org/drawingml/2006/main" xmlns:r="http://schemas.openxmlformats.org/officeDocument/2006/relationships" xmlns:p="http://schemas.openxmlformats.org/presentationml/2006/main">
   <p:cSld>
@@ -5087,6 +6583,211 @@
     <p:extLst>
       <p:ext uri="{BB962C8B-B14F-4D97-AF65-F5344CB8AC3E}">
         <p14:creationId xmlns:p14="http://schemas.microsoft.com/office/powerpoint/2010/main" val="4077860347"/>
+      </p:ext>
+    </p:extLst>
+  </p:cSld>
+  <p:clrMapOvr>
+    <a:masterClrMapping/>
+  </p:clrMapOvr>
+</p:sld>
+</file>
+
+<file path=ppt/slides/slide9.xml><?xml version="1.0" encoding="utf-8"?>
+<p:sld xmlns:a="http://schemas.openxmlformats.org/drawingml/2006/main" xmlns:r="http://schemas.openxmlformats.org/officeDocument/2006/relationships" xmlns:p="http://schemas.openxmlformats.org/presentationml/2006/main">
+  <p:cSld>
+    <p:spTree>
+      <p:nvGrpSpPr>
+        <p:cNvPr id="1" name=""/>
+        <p:cNvGrpSpPr/>
+        <p:nvPr/>
+      </p:nvGrpSpPr>
+      <p:grpSpPr>
+        <a:xfrm>
+          <a:off x="0" y="0"/>
+          <a:ext cx="0" cy="0"/>
+          <a:chOff x="0" y="0"/>
+          <a:chExt cx="0" cy="0"/>
+        </a:xfrm>
+      </p:grpSpPr>
+      <p:sp>
+        <p:nvSpPr>
+          <p:cNvPr id="2" name="Title 1">
+            <a:extLst>
+              <a:ext uri="{FF2B5EF4-FFF2-40B4-BE49-F238E27FC236}">
+                <a16:creationId xmlns:a16="http://schemas.microsoft.com/office/drawing/2014/main" id="{13A1538D-67C0-4906-B38B-D202C2A1A9E9}"/>
+              </a:ext>
+            </a:extLst>
+          </p:cNvPr>
+          <p:cNvSpPr>
+            <a:spLocks noGrp="1"/>
+          </p:cNvSpPr>
+          <p:nvPr>
+            <p:ph type="title"/>
+          </p:nvPr>
+        </p:nvSpPr>
+        <p:spPr/>
+        <p:txBody>
+          <a:bodyPr/>
+          <a:lstStyle/>
+          <a:p>
+            <a:endParaRPr lang="en-US"/>
+          </a:p>
+        </p:txBody>
+      </p:sp>
+      <p:sp>
+        <p:nvSpPr>
+          <p:cNvPr id="3" name="Content Placeholder 2">
+            <a:extLst>
+              <a:ext uri="{FF2B5EF4-FFF2-40B4-BE49-F238E27FC236}">
+                <a16:creationId xmlns:a16="http://schemas.microsoft.com/office/drawing/2014/main" id="{3497D6AE-D4B7-4D5D-A952-3EF824F172DE}"/>
+              </a:ext>
+            </a:extLst>
+          </p:cNvPr>
+          <p:cNvSpPr>
+            <a:spLocks noGrp="1"/>
+          </p:cNvSpPr>
+          <p:nvPr>
+            <p:ph idx="1"/>
+          </p:nvPr>
+        </p:nvSpPr>
+        <p:spPr>
+          <a:xfrm>
+            <a:off x="9380220" y="1825625"/>
+            <a:ext cx="2529840" cy="4351338"/>
+          </a:xfrm>
+        </p:spPr>
+        <p:txBody>
+          <a:bodyPr/>
+          <a:lstStyle/>
+          <a:p>
+            <a:r>
+              <a:rPr lang="en-US" dirty="0"/>
+              <a:t>If click START GAME button:</a:t>
+            </a:r>
+          </a:p>
+          <a:p>
+            <a:pPr lvl="1"/>
+            <a:r>
+              <a:rPr lang="en-US" dirty="0"/>
+              <a:t>Close start screen</a:t>
+            </a:r>
+          </a:p>
+        </p:txBody>
+      </p:sp>
+      <p:sp>
+        <p:nvSpPr>
+          <p:cNvPr id="4" name="Rectangle: Rounded Corners 3">
+            <a:extLst>
+              <a:ext uri="{FF2B5EF4-FFF2-40B4-BE49-F238E27FC236}">
+                <a16:creationId xmlns:a16="http://schemas.microsoft.com/office/drawing/2014/main" id="{05984947-3055-443A-BAE9-147260E12A4B}"/>
+              </a:ext>
+            </a:extLst>
+          </p:cNvPr>
+          <p:cNvSpPr/>
+          <p:nvPr/>
+        </p:nvSpPr>
+        <p:spPr>
+          <a:xfrm>
+            <a:off x="586740" y="1059180"/>
+            <a:ext cx="8793480" cy="5006340"/>
+          </a:xfrm>
+          <a:prstGeom prst="roundRect">
+            <a:avLst/>
+          </a:prstGeom>
+        </p:spPr>
+        <p:style>
+          <a:lnRef idx="2">
+            <a:schemeClr val="accent1">
+              <a:shade val="50000"/>
+            </a:schemeClr>
+          </a:lnRef>
+          <a:fillRef idx="1">
+            <a:schemeClr val="accent1"/>
+          </a:fillRef>
+          <a:effectRef idx="0">
+            <a:schemeClr val="accent1"/>
+          </a:effectRef>
+          <a:fontRef idx="minor">
+            <a:schemeClr val="lt1"/>
+          </a:fontRef>
+        </p:style>
+        <p:txBody>
+          <a:bodyPr rtlCol="0" anchor="ctr"/>
+          <a:lstStyle/>
+          <a:p>
+            <a:pPr algn="ctr"/>
+            <a:r>
+              <a:rPr lang="en-US" dirty="0"/>
+              <a:t>Welcome to MARIO 2021</a:t>
+            </a:r>
+          </a:p>
+          <a:p>
+            <a:pPr algn="ctr"/>
+            <a:endParaRPr lang="en-US" dirty="0"/>
+          </a:p>
+          <a:p>
+            <a:pPr algn="ctr"/>
+            <a:endParaRPr lang="en-US" dirty="0"/>
+          </a:p>
+          <a:p>
+            <a:pPr algn="ctr"/>
+            <a:endParaRPr lang="en-US" dirty="0"/>
+          </a:p>
+        </p:txBody>
+      </p:sp>
+      <p:sp>
+        <p:nvSpPr>
+          <p:cNvPr id="5" name="Rectangle: Rounded Corners 4">
+            <a:extLst>
+              <a:ext uri="{FF2B5EF4-FFF2-40B4-BE49-F238E27FC236}">
+                <a16:creationId xmlns:a16="http://schemas.microsoft.com/office/drawing/2014/main" id="{A15271DD-1667-43B3-B03E-37EF4379222B}"/>
+              </a:ext>
+            </a:extLst>
+          </p:cNvPr>
+          <p:cNvSpPr/>
+          <p:nvPr/>
+        </p:nvSpPr>
+        <p:spPr>
+          <a:xfrm>
+            <a:off x="3432810" y="4320540"/>
+            <a:ext cx="3101340" cy="967740"/>
+          </a:xfrm>
+          <a:prstGeom prst="roundRect">
+            <a:avLst/>
+          </a:prstGeom>
+        </p:spPr>
+        <p:style>
+          <a:lnRef idx="2">
+            <a:schemeClr val="accent4">
+              <a:shade val="50000"/>
+            </a:schemeClr>
+          </a:lnRef>
+          <a:fillRef idx="1">
+            <a:schemeClr val="accent4"/>
+          </a:fillRef>
+          <a:effectRef idx="0">
+            <a:schemeClr val="accent4"/>
+          </a:effectRef>
+          <a:fontRef idx="minor">
+            <a:schemeClr val="lt1"/>
+          </a:fontRef>
+        </p:style>
+        <p:txBody>
+          <a:bodyPr rtlCol="0" anchor="ctr"/>
+          <a:lstStyle/>
+          <a:p>
+            <a:pPr algn="ctr"/>
+            <a:r>
+              <a:rPr lang="en-US" dirty="0"/>
+              <a:t>START GAME</a:t>
+            </a:r>
+          </a:p>
+        </p:txBody>
+      </p:sp>
+    </p:spTree>
+    <p:extLst>
+      <p:ext uri="{BB962C8B-B14F-4D97-AF65-F5344CB8AC3E}">
+        <p14:creationId xmlns:p14="http://schemas.microsoft.com/office/powerpoint/2010/main" val="368310475"/>
       </p:ext>
     </p:extLst>
   </p:cSld>
@@ -5358,18 +7059,18 @@
 </file>
 
 <file path=customXml/item1.xml><?xml version="1.0" encoding="utf-8"?>
-<p:properties xmlns:p="http://schemas.microsoft.com/office/2006/metadata/properties" xmlns:xsi="http://www.w3.org/2001/XMLSchema-instance" xmlns:pc="http://schemas.microsoft.com/office/infopath/2007/PartnerControls">
-  <documentManagement/>
-</p:properties>
-</file>
-
-<file path=customXml/item2.xml><?xml version="1.0" encoding="utf-8"?>
 <?mso-contentType ?>
 <FormTemplates xmlns="http://schemas.microsoft.com/sharepoint/v3/contenttype/forms">
   <Display>DocumentLibraryForm</Display>
   <Edit>DocumentLibraryForm</Edit>
   <New>DocumentLibraryForm</New>
 </FormTemplates>
+</file>
+
+<file path=customXml/item2.xml><?xml version="1.0" encoding="utf-8"?>
+<p:properties xmlns:p="http://schemas.microsoft.com/office/2006/metadata/properties" xmlns:xsi="http://www.w3.org/2001/XMLSchema-instance" xmlns:pc="http://schemas.microsoft.com/office/infopath/2007/PartnerControls">
+  <documentManagement/>
+</p:properties>
 </file>
 
 <file path=customXml/item3.xml><?xml version="1.0" encoding="utf-8"?>
@@ -5549,18 +7250,18 @@
 </file>
 
 <file path=customXml/itemProps1.xml><?xml version="1.0" encoding="utf-8"?>
-<ds:datastoreItem xmlns:ds="http://schemas.openxmlformats.org/officeDocument/2006/customXml" ds:itemID="{6F99CC6B-3FC4-4611-BB8A-0161C42924D8}">
+<ds:datastoreItem xmlns:ds="http://schemas.openxmlformats.org/officeDocument/2006/customXml" ds:itemID="{C77525A5-9444-4E49-A3A8-9EBC94C17F95}">
   <ds:schemaRefs>
-    <ds:schemaRef ds:uri="http://schemas.microsoft.com/office/2006/metadata/properties"/>
-    <ds:schemaRef ds:uri="http://schemas.microsoft.com/office/infopath/2007/PartnerControls"/>
+    <ds:schemaRef ds:uri="http://schemas.microsoft.com/sharepoint/v3/contenttype/forms"/>
   </ds:schemaRefs>
 </ds:datastoreItem>
 </file>
 
 <file path=customXml/itemProps2.xml><?xml version="1.0" encoding="utf-8"?>
-<ds:datastoreItem xmlns:ds="http://schemas.openxmlformats.org/officeDocument/2006/customXml" ds:itemID="{C77525A5-9444-4E49-A3A8-9EBC94C17F95}">
+<ds:datastoreItem xmlns:ds="http://schemas.openxmlformats.org/officeDocument/2006/customXml" ds:itemID="{6F99CC6B-3FC4-4611-BB8A-0161C42924D8}">
   <ds:schemaRefs>
-    <ds:schemaRef ds:uri="http://schemas.microsoft.com/sharepoint/v3/contenttype/forms"/>
+    <ds:schemaRef ds:uri="http://schemas.microsoft.com/office/2006/metadata/properties"/>
+    <ds:schemaRef ds:uri="http://schemas.microsoft.com/office/infopath/2007/PartnerControls"/>
   </ds:schemaRefs>
 </ds:datastoreItem>
 </file>

</xml_diff>

<commit_message>
mario fix bug in triggers tag names
</commit_message>
<xml_diff>
--- a/Design/Mario Rules.pptx
+++ b/Design/Mario Rules.pptx
@@ -8,18 +8,20 @@
     <p:sldId id="256" r:id="rId5"/>
     <p:sldId id="257" r:id="rId6"/>
     <p:sldId id="258" r:id="rId7"/>
-    <p:sldId id="262" r:id="rId8"/>
-    <p:sldId id="263" r:id="rId9"/>
-    <p:sldId id="259" r:id="rId10"/>
-    <p:sldId id="260" r:id="rId11"/>
-    <p:sldId id="261" r:id="rId12"/>
-    <p:sldId id="265" r:id="rId13"/>
-    <p:sldId id="266" r:id="rId14"/>
-    <p:sldId id="267" r:id="rId15"/>
-    <p:sldId id="268" r:id="rId16"/>
-    <p:sldId id="271" r:id="rId17"/>
-    <p:sldId id="269" r:id="rId18"/>
-    <p:sldId id="270" r:id="rId19"/>
+    <p:sldId id="259" r:id="rId8"/>
+    <p:sldId id="272" r:id="rId9"/>
+    <p:sldId id="273" r:id="rId10"/>
+    <p:sldId id="262" r:id="rId11"/>
+    <p:sldId id="263" r:id="rId12"/>
+    <p:sldId id="260" r:id="rId13"/>
+    <p:sldId id="261" r:id="rId14"/>
+    <p:sldId id="265" r:id="rId15"/>
+    <p:sldId id="266" r:id="rId16"/>
+    <p:sldId id="267" r:id="rId17"/>
+    <p:sldId id="268" r:id="rId18"/>
+    <p:sldId id="269" r:id="rId19"/>
+    <p:sldId id="270" r:id="rId20"/>
+    <p:sldId id="271" r:id="rId21"/>
   </p:sldIdLst>
   <p:sldSz cx="12192000" cy="6858000"/>
   <p:notesSz cx="6858000" cy="9144000"/>
@@ -459,7 +461,7 @@
           <a:p>
             <a:fld id="{846CE7D5-CF57-46EF-B807-FDD0502418D4}" type="datetimeFigureOut">
               <a:rPr lang="en-US" smtClean="0"/>
-              <a:t>5/21/2021</a:t>
+              <a:t>5/25/2021</a:t>
             </a:fld>
             <a:endParaRPr lang="en-US"/>
           </a:p>
@@ -629,7 +631,7 @@
           <a:p>
             <a:fld id="{846CE7D5-CF57-46EF-B807-FDD0502418D4}" type="datetimeFigureOut">
               <a:rPr lang="en-US" smtClean="0"/>
-              <a:t>5/21/2021</a:t>
+              <a:t>5/25/2021</a:t>
             </a:fld>
             <a:endParaRPr lang="en-US"/>
           </a:p>
@@ -809,7 +811,7 @@
           <a:p>
             <a:fld id="{846CE7D5-CF57-46EF-B807-FDD0502418D4}" type="datetimeFigureOut">
               <a:rPr lang="en-US" smtClean="0"/>
-              <a:t>5/21/2021</a:t>
+              <a:t>5/25/2021</a:t>
             </a:fld>
             <a:endParaRPr lang="en-US"/>
           </a:p>
@@ -979,7 +981,7 @@
           <a:p>
             <a:fld id="{846CE7D5-CF57-46EF-B807-FDD0502418D4}" type="datetimeFigureOut">
               <a:rPr lang="en-US" smtClean="0"/>
-              <a:t>5/21/2021</a:t>
+              <a:t>5/25/2021</a:t>
             </a:fld>
             <a:endParaRPr lang="en-US"/>
           </a:p>
@@ -1225,7 +1227,7 @@
           <a:p>
             <a:fld id="{846CE7D5-CF57-46EF-B807-FDD0502418D4}" type="datetimeFigureOut">
               <a:rPr lang="en-US" smtClean="0"/>
-              <a:t>5/21/2021</a:t>
+              <a:t>5/25/2021</a:t>
             </a:fld>
             <a:endParaRPr lang="en-US"/>
           </a:p>
@@ -1457,7 +1459,7 @@
           <a:p>
             <a:fld id="{846CE7D5-CF57-46EF-B807-FDD0502418D4}" type="datetimeFigureOut">
               <a:rPr lang="en-US" smtClean="0"/>
-              <a:t>5/21/2021</a:t>
+              <a:t>5/25/2021</a:t>
             </a:fld>
             <a:endParaRPr lang="en-US"/>
           </a:p>
@@ -1824,7 +1826,7 @@
           <a:p>
             <a:fld id="{846CE7D5-CF57-46EF-B807-FDD0502418D4}" type="datetimeFigureOut">
               <a:rPr lang="en-US" smtClean="0"/>
-              <a:t>5/21/2021</a:t>
+              <a:t>5/25/2021</a:t>
             </a:fld>
             <a:endParaRPr lang="en-US"/>
           </a:p>
@@ -1942,7 +1944,7 @@
           <a:p>
             <a:fld id="{846CE7D5-CF57-46EF-B807-FDD0502418D4}" type="datetimeFigureOut">
               <a:rPr lang="en-US" smtClean="0"/>
-              <a:t>5/21/2021</a:t>
+              <a:t>5/25/2021</a:t>
             </a:fld>
             <a:endParaRPr lang="en-US"/>
           </a:p>
@@ -2037,7 +2039,7 @@
           <a:p>
             <a:fld id="{846CE7D5-CF57-46EF-B807-FDD0502418D4}" type="datetimeFigureOut">
               <a:rPr lang="en-US" smtClean="0"/>
-              <a:t>5/21/2021</a:t>
+              <a:t>5/25/2021</a:t>
             </a:fld>
             <a:endParaRPr lang="en-US"/>
           </a:p>
@@ -2314,7 +2316,7 @@
           <a:p>
             <a:fld id="{846CE7D5-CF57-46EF-B807-FDD0502418D4}" type="datetimeFigureOut">
               <a:rPr lang="en-US" smtClean="0"/>
-              <a:t>5/21/2021</a:t>
+              <a:t>5/25/2021</a:t>
             </a:fld>
             <a:endParaRPr lang="en-US"/>
           </a:p>
@@ -2571,7 +2573,7 @@
           <a:p>
             <a:fld id="{846CE7D5-CF57-46EF-B807-FDD0502418D4}" type="datetimeFigureOut">
               <a:rPr lang="en-US" smtClean="0"/>
-              <a:t>5/21/2021</a:t>
+              <a:t>5/25/2021</a:t>
             </a:fld>
             <a:endParaRPr lang="en-US"/>
           </a:p>
@@ -2784,7 +2786,7 @@
           <a:p>
             <a:fld id="{846CE7D5-CF57-46EF-B807-FDD0502418D4}" type="datetimeFigureOut">
               <a:rPr lang="en-US" smtClean="0"/>
-              <a:t>5/21/2021</a:t>
+              <a:t>5/25/2021</a:t>
             </a:fld>
             <a:endParaRPr lang="en-US"/>
           </a:p>
@@ -3268,7 +3270,7 @@
           <p:cNvPr id="2" name="Title 1">
             <a:extLst>
               <a:ext uri="{FF2B5EF4-FFF2-40B4-BE49-F238E27FC236}">
-                <a16:creationId xmlns:a16="http://schemas.microsoft.com/office/drawing/2014/main" id="{E65736D8-E0BC-49F2-9B64-C240E1FA57AA}"/>
+                <a16:creationId xmlns:a16="http://schemas.microsoft.com/office/drawing/2014/main" id="{45CC1C2F-6FD2-4EC0-9161-74FE6A63B850}"/>
               </a:ext>
             </a:extLst>
           </p:cNvPr>
@@ -3284,7 +3286,13 @@
           <a:bodyPr/>
           <a:lstStyle/>
           <a:p>
-            <a:endParaRPr lang="en-US"/>
+            <a:r>
+              <a:rPr lang="en-US" dirty="0">
+                <a:cs typeface="Calibri Light"/>
+              </a:rPr>
+              <a:t>Plan </a:t>
+            </a:r>
+            <a:endParaRPr lang="en-US" dirty="0"/>
           </a:p>
         </p:txBody>
       </p:sp>
@@ -3293,7 +3301,7 @@
           <p:cNvPr id="3" name="Content Placeholder 2">
             <a:extLst>
               <a:ext uri="{FF2B5EF4-FFF2-40B4-BE49-F238E27FC236}">
-                <a16:creationId xmlns:a16="http://schemas.microsoft.com/office/drawing/2014/main" id="{14B6FC5C-40D2-4ED6-9532-46DBF62A8E1F}"/>
+                <a16:creationId xmlns:a16="http://schemas.microsoft.com/office/drawing/2014/main" id="{BE1D7F04-3294-4E28-A8D4-04DD85FA3276}"/>
               </a:ext>
             </a:extLst>
           </p:cNvPr>
@@ -3306,66 +3314,184 @@
         </p:nvSpPr>
         <p:spPr/>
         <p:txBody>
-          <a:bodyPr/>
-          <a:lstStyle/>
-          <a:p>
-            <a:endParaRPr lang="en-US"/>
-          </a:p>
-        </p:txBody>
-      </p:sp>
-      <p:sp>
-        <p:nvSpPr>
-          <p:cNvPr id="4" name="Rectangle: Rounded Corners 3">
-            <a:extLst>
-              <a:ext uri="{FF2B5EF4-FFF2-40B4-BE49-F238E27FC236}">
-                <a16:creationId xmlns:a16="http://schemas.microsoft.com/office/drawing/2014/main" id="{6581FE13-5EE0-4A7F-BF00-C7B25525C292}"/>
-              </a:ext>
-            </a:extLst>
-          </p:cNvPr>
-          <p:cNvSpPr/>
-          <p:nvPr/>
-        </p:nvSpPr>
-        <p:spPr>
-          <a:xfrm>
-            <a:off x="586740" y="1059180"/>
-            <a:ext cx="8793480" cy="5006340"/>
-          </a:xfrm>
-          <a:prstGeom prst="roundRect">
-            <a:avLst/>
-          </a:prstGeom>
-        </p:spPr>
-        <p:style>
-          <a:lnRef idx="2">
-            <a:schemeClr val="accent1">
-              <a:shade val="50000"/>
-            </a:schemeClr>
-          </a:lnRef>
-          <a:fillRef idx="1">
-            <a:schemeClr val="accent1"/>
-          </a:fillRef>
-          <a:effectRef idx="0">
-            <a:schemeClr val="accent1"/>
-          </a:effectRef>
-          <a:fontRef idx="minor">
-            <a:schemeClr val="lt1"/>
-          </a:fontRef>
-        </p:style>
-        <p:txBody>
-          <a:bodyPr rtlCol="0" anchor="ctr"/>
-          <a:lstStyle/>
-          <a:p>
-            <a:pPr algn="ctr"/>
-            <a:r>
-              <a:rPr lang="en-US" dirty="0"/>
-              <a:t>The actual game……</a:t>
-            </a:r>
+          <a:bodyPr vert="horz" lIns="91440" tIns="45720" rIns="91440" bIns="45720" rtlCol="0" anchor="t">
+            <a:normAutofit fontScale="40000" lnSpcReduction="20000"/>
+          </a:bodyPr>
+          <a:lstStyle/>
+          <a:p>
+            <a:r>
+              <a:rPr lang="en-US" dirty="0">
+                <a:solidFill>
+                  <a:srgbClr val="00B050"/>
+                </a:solidFill>
+                <a:ea typeface="+mn-lt"/>
+                <a:cs typeface="+mn-lt"/>
+              </a:rPr>
+              <a:t>Insert 3d model inside the cube (Filippo)</a:t>
+            </a:r>
+          </a:p>
+          <a:p>
+            <a:endParaRPr lang="en-US" dirty="0">
+              <a:solidFill>
+                <a:srgbClr val="00B050"/>
+              </a:solidFill>
+              <a:cs typeface="Calibri"/>
+            </a:endParaRPr>
+          </a:p>
+          <a:p>
+            <a:r>
+              <a:rPr lang="en-US" dirty="0">
+                <a:solidFill>
+                  <a:srgbClr val="00B050"/>
+                </a:solidFill>
+                <a:cs typeface="Calibri"/>
+              </a:rPr>
+              <a:t>All the big features:</a:t>
+            </a:r>
+            <a:endParaRPr lang="en-US" dirty="0">
+              <a:solidFill>
+                <a:srgbClr val="00B050"/>
+              </a:solidFill>
+            </a:endParaRPr>
+          </a:p>
+          <a:p>
+            <a:pPr lvl="1"/>
+            <a:r>
+              <a:rPr lang="en-US" dirty="0">
+                <a:solidFill>
+                  <a:srgbClr val="00B050"/>
+                </a:solidFill>
+                <a:cs typeface="Calibri"/>
+              </a:rPr>
+              <a:t>Mushroom, star, enemy</a:t>
+            </a:r>
+          </a:p>
+          <a:p>
+            <a:endParaRPr lang="en-US" sz="2400" dirty="0">
+              <a:cs typeface="Calibri"/>
+            </a:endParaRPr>
+          </a:p>
+          <a:p>
+            <a:r>
+              <a:rPr lang="en-US" dirty="0">
+                <a:cs typeface="Calibri" panose="020F0502020204030204"/>
+              </a:rPr>
+              <a:t>Complete game cycle</a:t>
+            </a:r>
+          </a:p>
+          <a:p>
+            <a:r>
+              <a:rPr lang="en-US" dirty="0">
+                <a:cs typeface="Calibri" panose="020F0502020204030204"/>
+              </a:rPr>
+              <a:t>Menu system</a:t>
+            </a:r>
+          </a:p>
+          <a:p>
+            <a:endParaRPr lang="en-US" dirty="0">
+              <a:cs typeface="Calibri" panose="020F0502020204030204"/>
+            </a:endParaRPr>
+          </a:p>
+          <a:p>
+            <a:r>
+              <a:rPr lang="en-US" dirty="0">
+                <a:cs typeface="Calibri" panose="020F0502020204030204"/>
+              </a:rPr>
+              <a:t>Level design (make it fun). </a:t>
+            </a:r>
+          </a:p>
+          <a:p>
+            <a:pPr lvl="1"/>
+            <a:r>
+              <a:rPr lang="en-US" dirty="0">
+                <a:cs typeface="Calibri" panose="020F0502020204030204"/>
+              </a:rPr>
+              <a:t>From Starting point to finish point </a:t>
+            </a:r>
+          </a:p>
+          <a:p>
+            <a:pPr marL="0" indent="0">
+              <a:buNone/>
+            </a:pPr>
+            <a:endParaRPr lang="en-US" dirty="0">
+              <a:cs typeface="Calibri" panose="020F0502020204030204"/>
+            </a:endParaRPr>
+          </a:p>
+          <a:p>
+            <a:r>
+              <a:rPr lang="en-US" dirty="0">
+                <a:cs typeface="Calibri" panose="020F0502020204030204"/>
+              </a:rPr>
+              <a:t>Change rules:</a:t>
+            </a:r>
+          </a:p>
+          <a:p>
+            <a:pPr lvl="1"/>
+            <a:r>
+              <a:rPr lang="en-US" dirty="0">
+                <a:cs typeface="Calibri" panose="020F0502020204030204"/>
+              </a:rPr>
+              <a:t>Health, damage, </a:t>
+            </a:r>
+          </a:p>
+          <a:p>
+            <a:pPr lvl="1"/>
+            <a:r>
+              <a:rPr lang="en-US" dirty="0">
+                <a:cs typeface="Calibri" panose="020F0502020204030204"/>
+              </a:rPr>
+              <a:t>Fire </a:t>
+            </a:r>
+          </a:p>
+          <a:p>
+            <a:pPr lvl="1"/>
+            <a:r>
+              <a:rPr lang="en-US" dirty="0">
+                <a:cs typeface="Calibri" panose="020F0502020204030204"/>
+              </a:rPr>
+              <a:t>Killing stuff</a:t>
+            </a:r>
+          </a:p>
+          <a:p>
+            <a:endParaRPr lang="en-US" dirty="0">
+              <a:cs typeface="Calibri" panose="020F0502020204030204"/>
+            </a:endParaRPr>
+          </a:p>
+          <a:p>
+            <a:r>
+              <a:rPr lang="en-US" dirty="0">
+                <a:cs typeface="Calibri" panose="020F0502020204030204"/>
+              </a:rPr>
+              <a:t>Animations </a:t>
+            </a:r>
+          </a:p>
+          <a:p>
+            <a:r>
+              <a:rPr lang="en-US" dirty="0">
+                <a:cs typeface="Calibri" panose="020F0502020204030204"/>
+              </a:rPr>
+              <a:t>Sound effects</a:t>
+            </a:r>
+          </a:p>
+          <a:p>
+            <a:r>
+              <a:rPr lang="en-US" dirty="0">
+                <a:cs typeface="Calibri" panose="020F0502020204030204"/>
+              </a:rPr>
+              <a:t>Visual effects </a:t>
+            </a:r>
+          </a:p>
+          <a:p>
+            <a:endParaRPr lang="en-US" dirty="0">
+              <a:cs typeface="Calibri" panose="020F0502020204030204"/>
+            </a:endParaRPr>
           </a:p>
         </p:txBody>
       </p:sp>
     </p:spTree>
     <p:extLst>
       <p:ext uri="{BB962C8B-B14F-4D97-AF65-F5344CB8AC3E}">
-        <p14:creationId xmlns:p14="http://schemas.microsoft.com/office/powerpoint/2010/main" val="953294602"/>
+        <p14:creationId xmlns:p14="http://schemas.microsoft.com/office/powerpoint/2010/main" val="4077860347"/>
       </p:ext>
     </p:extLst>
   </p:cSld>
@@ -3408,12 +3534,20 @@
             <p:ph type="title"/>
           </p:nvPr>
         </p:nvSpPr>
-        <p:spPr/>
+        <p:spPr>
+          <a:xfrm>
+            <a:off x="838200" y="116839"/>
+            <a:ext cx="10515600" cy="1325563"/>
+          </a:xfrm>
+        </p:spPr>
         <p:txBody>
           <a:bodyPr/>
           <a:lstStyle/>
           <a:p>
-            <a:endParaRPr lang="en-US"/>
+            <a:r>
+              <a:rPr lang="en-US" dirty="0"/>
+              <a:t>Menu system</a:t>
+            </a:r>
           </a:p>
         </p:txBody>
       </p:sp>
@@ -3436,7 +3570,7 @@
         <p:spPr>
           <a:xfrm>
             <a:off x="9380220" y="1825625"/>
-            <a:ext cx="2811780" cy="4351338"/>
+            <a:ext cx="2529840" cy="4351338"/>
           </a:xfrm>
         </p:spPr>
         <p:txBody>
@@ -3445,26 +3579,15 @@
           <a:p>
             <a:r>
               <a:rPr lang="en-US" dirty="0"/>
-              <a:t>If click RESTART button</a:t>
+              <a:t>If click START GAME button:</a:t>
             </a:r>
           </a:p>
           <a:p>
             <a:pPr lvl="1"/>
             <a:r>
               <a:rPr lang="en-US" dirty="0"/>
-              <a:t>Remove restart screen</a:t>
-            </a:r>
-          </a:p>
-          <a:p>
-            <a:pPr lvl="1"/>
-            <a:r>
-              <a:rPr lang="en-US" dirty="0"/>
-              <a:t>Restart level()</a:t>
-            </a:r>
-          </a:p>
-          <a:p>
-            <a:pPr lvl="1"/>
-            <a:endParaRPr lang="en-US" dirty="0"/>
+              <a:t>Close start screen</a:t>
+            </a:r>
           </a:p>
         </p:txBody>
       </p:sp>
@@ -3511,20 +3634,13 @@
           <a:p>
             <a:pPr algn="ctr"/>
             <a:r>
-              <a:rPr lang="en-US" dirty="0" err="1"/>
-              <a:t>Ohhhhh</a:t>
-            </a:r>
-            <a:r>
               <a:rPr lang="en-US" dirty="0"/>
-              <a:t>, too bad…</a:t>
+              <a:t>Welcome to MARIO 2021</a:t>
             </a:r>
           </a:p>
           <a:p>
             <a:pPr algn="ctr"/>
-            <a:r>
-              <a:rPr lang="en-US" dirty="0"/>
-              <a:t>game over</a:t>
-            </a:r>
+            <a:endParaRPr lang="en-US" dirty="0"/>
           </a:p>
           <a:p>
             <a:pPr algn="ctr"/>
@@ -3580,7 +3696,7 @@
             <a:pPr algn="ctr"/>
             <a:r>
               <a:rPr lang="en-US" dirty="0"/>
-              <a:t>RETRY</a:t>
+              <a:t>START GAME</a:t>
             </a:r>
           </a:p>
         </p:txBody>
@@ -3588,7 +3704,7 @@
     </p:spTree>
     <p:extLst>
       <p:ext uri="{BB962C8B-B14F-4D97-AF65-F5344CB8AC3E}">
-        <p14:creationId xmlns:p14="http://schemas.microsoft.com/office/powerpoint/2010/main" val="2127941822"/>
+        <p14:creationId xmlns:p14="http://schemas.microsoft.com/office/powerpoint/2010/main" val="368310475"/>
       </p:ext>
     </p:extLst>
   </p:cSld>
@@ -3617,6 +3733,358 @@
       </p:grpSpPr>
       <p:sp>
         <p:nvSpPr>
+          <p:cNvPr id="2" name="Title 1">
+            <a:extLst>
+              <a:ext uri="{FF2B5EF4-FFF2-40B4-BE49-F238E27FC236}">
+                <a16:creationId xmlns:a16="http://schemas.microsoft.com/office/drawing/2014/main" id="{E65736D8-E0BC-49F2-9B64-C240E1FA57AA}"/>
+              </a:ext>
+            </a:extLst>
+          </p:cNvPr>
+          <p:cNvSpPr>
+            <a:spLocks noGrp="1"/>
+          </p:cNvSpPr>
+          <p:nvPr>
+            <p:ph type="title"/>
+          </p:nvPr>
+        </p:nvSpPr>
+        <p:spPr/>
+        <p:txBody>
+          <a:bodyPr/>
+          <a:lstStyle/>
+          <a:p>
+            <a:endParaRPr lang="en-US"/>
+          </a:p>
+        </p:txBody>
+      </p:sp>
+      <p:sp>
+        <p:nvSpPr>
+          <p:cNvPr id="3" name="Content Placeholder 2">
+            <a:extLst>
+              <a:ext uri="{FF2B5EF4-FFF2-40B4-BE49-F238E27FC236}">
+                <a16:creationId xmlns:a16="http://schemas.microsoft.com/office/drawing/2014/main" id="{14B6FC5C-40D2-4ED6-9532-46DBF62A8E1F}"/>
+              </a:ext>
+            </a:extLst>
+          </p:cNvPr>
+          <p:cNvSpPr>
+            <a:spLocks noGrp="1"/>
+          </p:cNvSpPr>
+          <p:nvPr>
+            <p:ph idx="1"/>
+          </p:nvPr>
+        </p:nvSpPr>
+        <p:spPr/>
+        <p:txBody>
+          <a:bodyPr/>
+          <a:lstStyle/>
+          <a:p>
+            <a:endParaRPr lang="en-US"/>
+          </a:p>
+        </p:txBody>
+      </p:sp>
+      <p:sp>
+        <p:nvSpPr>
+          <p:cNvPr id="4" name="Rectangle: Rounded Corners 3">
+            <a:extLst>
+              <a:ext uri="{FF2B5EF4-FFF2-40B4-BE49-F238E27FC236}">
+                <a16:creationId xmlns:a16="http://schemas.microsoft.com/office/drawing/2014/main" id="{6581FE13-5EE0-4A7F-BF00-C7B25525C292}"/>
+              </a:ext>
+            </a:extLst>
+          </p:cNvPr>
+          <p:cNvSpPr/>
+          <p:nvPr/>
+        </p:nvSpPr>
+        <p:spPr>
+          <a:xfrm>
+            <a:off x="586740" y="1059180"/>
+            <a:ext cx="8793480" cy="5006340"/>
+          </a:xfrm>
+          <a:prstGeom prst="roundRect">
+            <a:avLst/>
+          </a:prstGeom>
+        </p:spPr>
+        <p:style>
+          <a:lnRef idx="2">
+            <a:schemeClr val="accent1">
+              <a:shade val="50000"/>
+            </a:schemeClr>
+          </a:lnRef>
+          <a:fillRef idx="1">
+            <a:schemeClr val="accent1"/>
+          </a:fillRef>
+          <a:effectRef idx="0">
+            <a:schemeClr val="accent1"/>
+          </a:effectRef>
+          <a:fontRef idx="minor">
+            <a:schemeClr val="lt1"/>
+          </a:fontRef>
+        </p:style>
+        <p:txBody>
+          <a:bodyPr rtlCol="0" anchor="ctr"/>
+          <a:lstStyle/>
+          <a:p>
+            <a:pPr algn="ctr"/>
+            <a:r>
+              <a:rPr lang="en-US" dirty="0"/>
+              <a:t>The actual game……</a:t>
+            </a:r>
+          </a:p>
+        </p:txBody>
+      </p:sp>
+    </p:spTree>
+    <p:extLst>
+      <p:ext uri="{BB962C8B-B14F-4D97-AF65-F5344CB8AC3E}">
+        <p14:creationId xmlns:p14="http://schemas.microsoft.com/office/powerpoint/2010/main" val="953294602"/>
+      </p:ext>
+    </p:extLst>
+  </p:cSld>
+  <p:clrMapOvr>
+    <a:masterClrMapping/>
+  </p:clrMapOvr>
+</p:sld>
+</file>
+
+<file path=ppt/slides/slide13.xml><?xml version="1.0" encoding="utf-8"?>
+<p:sld xmlns:a="http://schemas.openxmlformats.org/drawingml/2006/main" xmlns:r="http://schemas.openxmlformats.org/officeDocument/2006/relationships" xmlns:p="http://schemas.openxmlformats.org/presentationml/2006/main">
+  <p:cSld>
+    <p:spTree>
+      <p:nvGrpSpPr>
+        <p:cNvPr id="1" name=""/>
+        <p:cNvGrpSpPr/>
+        <p:nvPr/>
+      </p:nvGrpSpPr>
+      <p:grpSpPr>
+        <a:xfrm>
+          <a:off x="0" y="0"/>
+          <a:ext cx="0" cy="0"/>
+          <a:chOff x="0" y="0"/>
+          <a:chExt cx="0" cy="0"/>
+        </a:xfrm>
+      </p:grpSpPr>
+      <p:sp>
+        <p:nvSpPr>
+          <p:cNvPr id="2" name="Title 1">
+            <a:extLst>
+              <a:ext uri="{FF2B5EF4-FFF2-40B4-BE49-F238E27FC236}">
+                <a16:creationId xmlns:a16="http://schemas.microsoft.com/office/drawing/2014/main" id="{13A1538D-67C0-4906-B38B-D202C2A1A9E9}"/>
+              </a:ext>
+            </a:extLst>
+          </p:cNvPr>
+          <p:cNvSpPr>
+            <a:spLocks noGrp="1"/>
+          </p:cNvSpPr>
+          <p:nvPr>
+            <p:ph type="title"/>
+          </p:nvPr>
+        </p:nvSpPr>
+        <p:spPr/>
+        <p:txBody>
+          <a:bodyPr/>
+          <a:lstStyle/>
+          <a:p>
+            <a:endParaRPr lang="en-US"/>
+          </a:p>
+        </p:txBody>
+      </p:sp>
+      <p:sp>
+        <p:nvSpPr>
+          <p:cNvPr id="3" name="Content Placeholder 2">
+            <a:extLst>
+              <a:ext uri="{FF2B5EF4-FFF2-40B4-BE49-F238E27FC236}">
+                <a16:creationId xmlns:a16="http://schemas.microsoft.com/office/drawing/2014/main" id="{3497D6AE-D4B7-4D5D-A952-3EF824F172DE}"/>
+              </a:ext>
+            </a:extLst>
+          </p:cNvPr>
+          <p:cNvSpPr>
+            <a:spLocks noGrp="1"/>
+          </p:cNvSpPr>
+          <p:nvPr>
+            <p:ph idx="1"/>
+          </p:nvPr>
+        </p:nvSpPr>
+        <p:spPr>
+          <a:xfrm>
+            <a:off x="9380220" y="1825625"/>
+            <a:ext cx="2811780" cy="4351338"/>
+          </a:xfrm>
+        </p:spPr>
+        <p:txBody>
+          <a:bodyPr/>
+          <a:lstStyle/>
+          <a:p>
+            <a:r>
+              <a:rPr lang="en-US" dirty="0"/>
+              <a:t>If click RESTART button</a:t>
+            </a:r>
+          </a:p>
+          <a:p>
+            <a:pPr lvl="1"/>
+            <a:r>
+              <a:rPr lang="en-US" dirty="0"/>
+              <a:t>Remove restart screen</a:t>
+            </a:r>
+          </a:p>
+          <a:p>
+            <a:pPr lvl="1"/>
+            <a:r>
+              <a:rPr lang="en-US" dirty="0"/>
+              <a:t>Restart level()</a:t>
+            </a:r>
+          </a:p>
+          <a:p>
+            <a:pPr lvl="1"/>
+            <a:endParaRPr lang="en-US" dirty="0"/>
+          </a:p>
+        </p:txBody>
+      </p:sp>
+      <p:sp>
+        <p:nvSpPr>
+          <p:cNvPr id="4" name="Rectangle: Rounded Corners 3">
+            <a:extLst>
+              <a:ext uri="{FF2B5EF4-FFF2-40B4-BE49-F238E27FC236}">
+                <a16:creationId xmlns:a16="http://schemas.microsoft.com/office/drawing/2014/main" id="{05984947-3055-443A-BAE9-147260E12A4B}"/>
+              </a:ext>
+            </a:extLst>
+          </p:cNvPr>
+          <p:cNvSpPr/>
+          <p:nvPr/>
+        </p:nvSpPr>
+        <p:spPr>
+          <a:xfrm>
+            <a:off x="586740" y="1059180"/>
+            <a:ext cx="8793480" cy="5006340"/>
+          </a:xfrm>
+          <a:prstGeom prst="roundRect">
+            <a:avLst/>
+          </a:prstGeom>
+        </p:spPr>
+        <p:style>
+          <a:lnRef idx="2">
+            <a:schemeClr val="accent1">
+              <a:shade val="50000"/>
+            </a:schemeClr>
+          </a:lnRef>
+          <a:fillRef idx="1">
+            <a:schemeClr val="accent1"/>
+          </a:fillRef>
+          <a:effectRef idx="0">
+            <a:schemeClr val="accent1"/>
+          </a:effectRef>
+          <a:fontRef idx="minor">
+            <a:schemeClr val="lt1"/>
+          </a:fontRef>
+        </p:style>
+        <p:txBody>
+          <a:bodyPr rtlCol="0" anchor="ctr"/>
+          <a:lstStyle/>
+          <a:p>
+            <a:pPr algn="ctr"/>
+            <a:r>
+              <a:rPr lang="en-US" dirty="0" err="1"/>
+              <a:t>Ohhhhh</a:t>
+            </a:r>
+            <a:r>
+              <a:rPr lang="en-US" dirty="0"/>
+              <a:t>, too bad…</a:t>
+            </a:r>
+          </a:p>
+          <a:p>
+            <a:pPr algn="ctr"/>
+            <a:r>
+              <a:rPr lang="en-US" dirty="0"/>
+              <a:t>game over</a:t>
+            </a:r>
+          </a:p>
+          <a:p>
+            <a:pPr algn="ctr"/>
+            <a:endParaRPr lang="en-US" dirty="0"/>
+          </a:p>
+          <a:p>
+            <a:pPr algn="ctr"/>
+            <a:endParaRPr lang="en-US" dirty="0"/>
+          </a:p>
+        </p:txBody>
+      </p:sp>
+      <p:sp>
+        <p:nvSpPr>
+          <p:cNvPr id="5" name="Rectangle: Rounded Corners 4">
+            <a:extLst>
+              <a:ext uri="{FF2B5EF4-FFF2-40B4-BE49-F238E27FC236}">
+                <a16:creationId xmlns:a16="http://schemas.microsoft.com/office/drawing/2014/main" id="{A15271DD-1667-43B3-B03E-37EF4379222B}"/>
+              </a:ext>
+            </a:extLst>
+          </p:cNvPr>
+          <p:cNvSpPr/>
+          <p:nvPr/>
+        </p:nvSpPr>
+        <p:spPr>
+          <a:xfrm>
+            <a:off x="3432810" y="4320540"/>
+            <a:ext cx="3101340" cy="967740"/>
+          </a:xfrm>
+          <a:prstGeom prst="roundRect">
+            <a:avLst/>
+          </a:prstGeom>
+        </p:spPr>
+        <p:style>
+          <a:lnRef idx="2">
+            <a:schemeClr val="accent4">
+              <a:shade val="50000"/>
+            </a:schemeClr>
+          </a:lnRef>
+          <a:fillRef idx="1">
+            <a:schemeClr val="accent4"/>
+          </a:fillRef>
+          <a:effectRef idx="0">
+            <a:schemeClr val="accent4"/>
+          </a:effectRef>
+          <a:fontRef idx="minor">
+            <a:schemeClr val="lt1"/>
+          </a:fontRef>
+        </p:style>
+        <p:txBody>
+          <a:bodyPr rtlCol="0" anchor="ctr"/>
+          <a:lstStyle/>
+          <a:p>
+            <a:pPr algn="ctr"/>
+            <a:r>
+              <a:rPr lang="en-US" dirty="0"/>
+              <a:t>RETRY</a:t>
+            </a:r>
+          </a:p>
+        </p:txBody>
+      </p:sp>
+    </p:spTree>
+    <p:extLst>
+      <p:ext uri="{BB962C8B-B14F-4D97-AF65-F5344CB8AC3E}">
+        <p14:creationId xmlns:p14="http://schemas.microsoft.com/office/powerpoint/2010/main" val="2127941822"/>
+      </p:ext>
+    </p:extLst>
+  </p:cSld>
+  <p:clrMapOvr>
+    <a:masterClrMapping/>
+  </p:clrMapOvr>
+</p:sld>
+</file>
+
+<file path=ppt/slides/slide14.xml><?xml version="1.0" encoding="utf-8"?>
+<p:sld xmlns:a="http://schemas.openxmlformats.org/drawingml/2006/main" xmlns:r="http://schemas.openxmlformats.org/officeDocument/2006/relationships" xmlns:p="http://schemas.openxmlformats.org/presentationml/2006/main">
+  <p:cSld>
+    <p:spTree>
+      <p:nvGrpSpPr>
+        <p:cNvPr id="1" name=""/>
+        <p:cNvGrpSpPr/>
+        <p:nvPr/>
+      </p:nvGrpSpPr>
+      <p:grpSpPr>
+        <a:xfrm>
+          <a:off x="0" y="0"/>
+          <a:ext cx="0" cy="0"/>
+          <a:chOff x="0" y="0"/>
+          <a:chExt cx="0" cy="0"/>
+        </a:xfrm>
+      </p:grpSpPr>
+      <p:sp>
+        <p:nvSpPr>
           <p:cNvPr id="6" name="Rectangle 5">
             <a:extLst>
               <a:ext uri="{FF2B5EF4-FFF2-40B4-BE49-F238E27FC236}">
@@ -3629,7 +4097,7 @@
         </p:nvSpPr>
         <p:spPr>
           <a:xfrm>
-            <a:off x="7585441" y="2971797"/>
+            <a:off x="7585441" y="3842236"/>
             <a:ext cx="439616" cy="413239"/>
           </a:xfrm>
           <a:prstGeom prst="rect">
@@ -3678,7 +4146,7 @@
         </p:nvSpPr>
         <p:spPr>
           <a:xfrm>
-            <a:off x="1395291" y="2985964"/>
+            <a:off x="1395291" y="3856403"/>
             <a:ext cx="439616" cy="413239"/>
           </a:xfrm>
           <a:prstGeom prst="rect">
@@ -3727,7 +4195,7 @@
         </p:nvSpPr>
         <p:spPr>
           <a:xfrm>
-            <a:off x="5816600" y="1123950"/>
+            <a:off x="5816600" y="1994389"/>
             <a:ext cx="139700" cy="2243503"/>
           </a:xfrm>
           <a:prstGeom prst="rect">
@@ -3773,7 +4241,7 @@
         </p:nvSpPr>
         <p:spPr>
           <a:xfrm>
-            <a:off x="838200" y="3367453"/>
+            <a:off x="838200" y="4237892"/>
             <a:ext cx="7631723" cy="211016"/>
           </a:xfrm>
           <a:prstGeom prst="rect">
@@ -3822,7 +4290,7 @@
         </p:nvSpPr>
         <p:spPr>
           <a:xfrm>
-            <a:off x="736846" y="1704944"/>
+            <a:off x="736846" y="2575383"/>
             <a:ext cx="3068514" cy="2146085"/>
           </a:xfrm>
           <a:prstGeom prst="rect">
@@ -3859,6 +4327,34 @@
           </a:p>
         </p:txBody>
       </p:sp>
+      <p:sp>
+        <p:nvSpPr>
+          <p:cNvPr id="2" name="Title 1">
+            <a:extLst>
+              <a:ext uri="{FF2B5EF4-FFF2-40B4-BE49-F238E27FC236}">
+                <a16:creationId xmlns:a16="http://schemas.microsoft.com/office/drawing/2014/main" id="{B265C43F-B881-4A4D-B404-8992D5D97B71}"/>
+              </a:ext>
+            </a:extLst>
+          </p:cNvPr>
+          <p:cNvSpPr>
+            <a:spLocks noGrp="1"/>
+          </p:cNvSpPr>
+          <p:nvPr>
+            <p:ph type="title"/>
+          </p:nvPr>
+        </p:nvSpPr>
+        <p:spPr/>
+        <p:txBody>
+          <a:bodyPr/>
+          <a:lstStyle/>
+          <a:p>
+            <a:r>
+              <a:rPr lang="en-US" dirty="0"/>
+              <a:t>Invisible colliders to activate</a:t>
+            </a:r>
+          </a:p>
+        </p:txBody>
+      </p:sp>
     </p:spTree>
     <p:extLst>
       <p:ext uri="{BB962C8B-B14F-4D97-AF65-F5344CB8AC3E}">
@@ -3872,339 +4368,7 @@
 </p:sld>
 </file>
 
-<file path=ppt/slides/slide13.xml><?xml version="1.0" encoding="utf-8"?>
-<p:sld xmlns:a="http://schemas.openxmlformats.org/drawingml/2006/main" xmlns:r="http://schemas.openxmlformats.org/officeDocument/2006/relationships" xmlns:p="http://schemas.openxmlformats.org/presentationml/2006/main">
-  <p:cSld>
-    <p:spTree>
-      <p:nvGrpSpPr>
-        <p:cNvPr id="1" name=""/>
-        <p:cNvGrpSpPr/>
-        <p:nvPr/>
-      </p:nvGrpSpPr>
-      <p:grpSpPr>
-        <a:xfrm>
-          <a:off x="0" y="0"/>
-          <a:ext cx="0" cy="0"/>
-          <a:chOff x="0" y="0"/>
-          <a:chExt cx="0" cy="0"/>
-        </a:xfrm>
-      </p:grpSpPr>
-      <p:sp>
-        <p:nvSpPr>
-          <p:cNvPr id="2" name="Title 1">
-            <a:extLst>
-              <a:ext uri="{FF2B5EF4-FFF2-40B4-BE49-F238E27FC236}">
-                <a16:creationId xmlns:a16="http://schemas.microsoft.com/office/drawing/2014/main" id="{43C71F9C-85A5-4A41-9921-793F0369ED46}"/>
-              </a:ext>
-            </a:extLst>
-          </p:cNvPr>
-          <p:cNvSpPr>
-            <a:spLocks noGrp="1"/>
-          </p:cNvSpPr>
-          <p:nvPr>
-            <p:ph type="title"/>
-          </p:nvPr>
-        </p:nvSpPr>
-        <p:spPr/>
-        <p:txBody>
-          <a:bodyPr/>
-          <a:lstStyle/>
-          <a:p>
-            <a:r>
-              <a:rPr lang="en-US" dirty="0"/>
-              <a:t>Enemy structure</a:t>
-            </a:r>
-          </a:p>
-        </p:txBody>
-      </p:sp>
-      <p:sp>
-        <p:nvSpPr>
-          <p:cNvPr id="4" name="Rectangle 3">
-            <a:extLst>
-              <a:ext uri="{FF2B5EF4-FFF2-40B4-BE49-F238E27FC236}">
-                <a16:creationId xmlns:a16="http://schemas.microsoft.com/office/drawing/2014/main" id="{41DE9440-90BC-4D34-AD48-BC26A7C36E98}"/>
-              </a:ext>
-            </a:extLst>
-          </p:cNvPr>
-          <p:cNvSpPr/>
-          <p:nvPr/>
-        </p:nvSpPr>
-        <p:spPr>
-          <a:xfrm>
-            <a:off x="7502647" y="3809363"/>
-            <a:ext cx="1686131" cy="1584963"/>
-          </a:xfrm>
-          <a:prstGeom prst="rect">
-            <a:avLst/>
-          </a:prstGeom>
-          <a:solidFill>
-            <a:srgbClr val="FF0000"/>
-          </a:solidFill>
-        </p:spPr>
-        <p:style>
-          <a:lnRef idx="2">
-            <a:schemeClr val="accent6">
-              <a:shade val="50000"/>
-            </a:schemeClr>
-          </a:lnRef>
-          <a:fillRef idx="1">
-            <a:schemeClr val="accent6"/>
-          </a:fillRef>
-          <a:effectRef idx="0">
-            <a:schemeClr val="accent6"/>
-          </a:effectRef>
-          <a:fontRef idx="minor">
-            <a:schemeClr val="lt1"/>
-          </a:fontRef>
-        </p:style>
-        <p:txBody>
-          <a:bodyPr rtlCol="0" anchor="ctr"/>
-          <a:lstStyle/>
-          <a:p>
-            <a:pPr algn="ctr"/>
-            <a:r>
-              <a:rPr lang="en-US" dirty="0"/>
-              <a:t>Body collider</a:t>
-            </a:r>
-          </a:p>
-        </p:txBody>
-      </p:sp>
-      <p:sp>
-        <p:nvSpPr>
-          <p:cNvPr id="5" name="Rectangle 4">
-            <a:extLst>
-              <a:ext uri="{FF2B5EF4-FFF2-40B4-BE49-F238E27FC236}">
-                <a16:creationId xmlns:a16="http://schemas.microsoft.com/office/drawing/2014/main" id="{2B1152E3-4BBC-46B6-90E7-FC77E1CC8C8A}"/>
-              </a:ext>
-            </a:extLst>
-          </p:cNvPr>
-          <p:cNvSpPr/>
-          <p:nvPr/>
-        </p:nvSpPr>
-        <p:spPr>
-          <a:xfrm>
-            <a:off x="7704199" y="3292930"/>
-            <a:ext cx="1299028" cy="420234"/>
-          </a:xfrm>
-          <a:prstGeom prst="rect">
-            <a:avLst/>
-          </a:prstGeom>
-          <a:solidFill>
-            <a:schemeClr val="accent2"/>
-          </a:solidFill>
-        </p:spPr>
-        <p:style>
-          <a:lnRef idx="2">
-            <a:schemeClr val="accent6">
-              <a:shade val="50000"/>
-            </a:schemeClr>
-          </a:lnRef>
-          <a:fillRef idx="1">
-            <a:schemeClr val="accent6"/>
-          </a:fillRef>
-          <a:effectRef idx="0">
-            <a:schemeClr val="accent6"/>
-          </a:effectRef>
-          <a:fontRef idx="minor">
-            <a:schemeClr val="lt1"/>
-          </a:fontRef>
-        </p:style>
-        <p:txBody>
-          <a:bodyPr rtlCol="0" anchor="ctr"/>
-          <a:lstStyle/>
-          <a:p>
-            <a:pPr algn="ctr"/>
-            <a:r>
-              <a:rPr lang="en-US" dirty="0"/>
-              <a:t>Top collider</a:t>
-            </a:r>
-          </a:p>
-        </p:txBody>
-      </p:sp>
-      <p:sp>
-        <p:nvSpPr>
-          <p:cNvPr id="7" name="Rectangle 6">
-            <a:extLst>
-              <a:ext uri="{FF2B5EF4-FFF2-40B4-BE49-F238E27FC236}">
-                <a16:creationId xmlns:a16="http://schemas.microsoft.com/office/drawing/2014/main" id="{A0DABB58-23AB-4196-BD35-8A68070227A1}"/>
-              </a:ext>
-            </a:extLst>
-          </p:cNvPr>
-          <p:cNvSpPr/>
-          <p:nvPr/>
-        </p:nvSpPr>
-        <p:spPr>
-          <a:xfrm>
-            <a:off x="1035172" y="1957544"/>
-            <a:ext cx="2631953" cy="642781"/>
-          </a:xfrm>
-          <a:prstGeom prst="rect">
-            <a:avLst/>
-          </a:prstGeom>
-          <a:solidFill>
-            <a:srgbClr val="FF0000"/>
-          </a:solidFill>
-        </p:spPr>
-        <p:style>
-          <a:lnRef idx="2">
-            <a:schemeClr val="accent6">
-              <a:shade val="50000"/>
-            </a:schemeClr>
-          </a:lnRef>
-          <a:fillRef idx="1">
-            <a:schemeClr val="accent6"/>
-          </a:fillRef>
-          <a:effectRef idx="0">
-            <a:schemeClr val="accent6"/>
-          </a:effectRef>
-          <a:fontRef idx="minor">
-            <a:schemeClr val="lt1"/>
-          </a:fontRef>
-        </p:style>
-        <p:txBody>
-          <a:bodyPr rtlCol="0" anchor="ctr"/>
-          <a:lstStyle/>
-          <a:p>
-            <a:pPr algn="ctr"/>
-            <a:r>
-              <a:rPr lang="en-US" dirty="0"/>
-              <a:t>Game object : Enemy</a:t>
-            </a:r>
-          </a:p>
-          <a:p>
-            <a:pPr algn="ctr"/>
-            <a:r>
-              <a:rPr lang="en-US" dirty="0"/>
-              <a:t>3d cube</a:t>
-            </a:r>
-          </a:p>
-        </p:txBody>
-      </p:sp>
-      <p:sp>
-        <p:nvSpPr>
-          <p:cNvPr id="8" name="Rectangle 7">
-            <a:extLst>
-              <a:ext uri="{FF2B5EF4-FFF2-40B4-BE49-F238E27FC236}">
-                <a16:creationId xmlns:a16="http://schemas.microsoft.com/office/drawing/2014/main" id="{BC9B3101-750F-4053-B888-4B1FA7999FB1}"/>
-              </a:ext>
-            </a:extLst>
-          </p:cNvPr>
-          <p:cNvSpPr/>
-          <p:nvPr/>
-        </p:nvSpPr>
-        <p:spPr>
-          <a:xfrm>
-            <a:off x="2351148" y="2689609"/>
-            <a:ext cx="2136655" cy="642781"/>
-          </a:xfrm>
-          <a:prstGeom prst="rect">
-            <a:avLst/>
-          </a:prstGeom>
-          <a:solidFill>
-            <a:schemeClr val="accent2"/>
-          </a:solidFill>
-        </p:spPr>
-        <p:style>
-          <a:lnRef idx="2">
-            <a:schemeClr val="accent6">
-              <a:shade val="50000"/>
-            </a:schemeClr>
-          </a:lnRef>
-          <a:fillRef idx="1">
-            <a:schemeClr val="accent6"/>
-          </a:fillRef>
-          <a:effectRef idx="0">
-            <a:schemeClr val="accent6"/>
-          </a:effectRef>
-          <a:fontRef idx="minor">
-            <a:schemeClr val="lt1"/>
-          </a:fontRef>
-        </p:style>
-        <p:txBody>
-          <a:bodyPr rtlCol="0" anchor="ctr"/>
-          <a:lstStyle/>
-          <a:p>
-            <a:pPr algn="ctr"/>
-            <a:r>
-              <a:rPr lang="en-US" dirty="0"/>
-              <a:t>Game object: Head</a:t>
-            </a:r>
-          </a:p>
-        </p:txBody>
-      </p:sp>
-      <p:sp>
-        <p:nvSpPr>
-          <p:cNvPr id="9" name="Rectangle 8">
-            <a:extLst>
-              <a:ext uri="{FF2B5EF4-FFF2-40B4-BE49-F238E27FC236}">
-                <a16:creationId xmlns:a16="http://schemas.microsoft.com/office/drawing/2014/main" id="{AF89C6CB-8711-4F94-90E1-A7B8258723B4}"/>
-              </a:ext>
-            </a:extLst>
-          </p:cNvPr>
-          <p:cNvSpPr/>
-          <p:nvPr/>
-        </p:nvSpPr>
-        <p:spPr>
-          <a:xfrm>
-            <a:off x="2351148" y="3487972"/>
-            <a:ext cx="2136655" cy="642781"/>
-          </a:xfrm>
-          <a:prstGeom prst="rect">
-            <a:avLst/>
-          </a:prstGeom>
-          <a:solidFill>
-            <a:schemeClr val="accent6">
-              <a:lumMod val="75000"/>
-            </a:schemeClr>
-          </a:solidFill>
-        </p:spPr>
-        <p:style>
-          <a:lnRef idx="2">
-            <a:schemeClr val="accent6">
-              <a:shade val="50000"/>
-            </a:schemeClr>
-          </a:lnRef>
-          <a:fillRef idx="1">
-            <a:schemeClr val="accent6"/>
-          </a:fillRef>
-          <a:effectRef idx="0">
-            <a:schemeClr val="accent6"/>
-          </a:effectRef>
-          <a:fontRef idx="minor">
-            <a:schemeClr val="lt1"/>
-          </a:fontRef>
-        </p:style>
-        <p:txBody>
-          <a:bodyPr rtlCol="0" anchor="ctr"/>
-          <a:lstStyle/>
-          <a:p>
-            <a:pPr algn="ctr"/>
-            <a:r>
-              <a:rPr lang="en-US" dirty="0"/>
-              <a:t>Game object: 3d model of </a:t>
-            </a:r>
-            <a:r>
-              <a:rPr lang="en-US" dirty="0" err="1"/>
-              <a:t>goomba</a:t>
-            </a:r>
-            <a:endParaRPr lang="en-US" dirty="0"/>
-          </a:p>
-        </p:txBody>
-      </p:sp>
-    </p:spTree>
-    <p:extLst>
-      <p:ext uri="{BB962C8B-B14F-4D97-AF65-F5344CB8AC3E}">
-        <p14:creationId xmlns:p14="http://schemas.microsoft.com/office/powerpoint/2010/main" val="3435909588"/>
-      </p:ext>
-    </p:extLst>
-  </p:cSld>
-  <p:clrMapOvr>
-    <a:masterClrMapping/>
-  </p:clrMapOvr>
-</p:sld>
-</file>
-
-<file path=ppt/slides/slide14.xml><?xml version="1.0" encoding="utf-8"?>
+<file path=ppt/slides/slide15.xml><?xml version="1.0" encoding="utf-8"?>
 <p:sld xmlns:a="http://schemas.openxmlformats.org/drawingml/2006/main" xmlns:r="http://schemas.openxmlformats.org/officeDocument/2006/relationships" xmlns:p="http://schemas.openxmlformats.org/presentationml/2006/main">
   <p:cSld>
     <p:spTree>
@@ -4314,7 +4478,7 @@
 </p:sld>
 </file>
 
-<file path=ppt/slides/slide15.xml><?xml version="1.0" encoding="utf-8"?>
+<file path=ppt/slides/slide16.xml><?xml version="1.0" encoding="utf-8"?>
 <p:sld xmlns:a="http://schemas.openxmlformats.org/drawingml/2006/main" xmlns:r="http://schemas.openxmlformats.org/officeDocument/2006/relationships" xmlns:p="http://schemas.openxmlformats.org/presentationml/2006/main">
   <p:cSld>
     <p:spTree>
@@ -4449,7 +4613,7 @@
             <a:avLst/>
           </a:prstGeom>
           <a:solidFill>
-            <a:schemeClr val="accent2"/>
+            <a:srgbClr val="00B0F0"/>
           </a:solidFill>
         </p:spPr>
         <p:style>
@@ -4493,6 +4657,361 @@
           <a:xfrm>
             <a:off x="7534275" y="2730955"/>
             <a:ext cx="496826" cy="420234"/>
+          </a:xfrm>
+          <a:prstGeom prst="rect">
+            <a:avLst/>
+          </a:prstGeom>
+          <a:solidFill>
+            <a:srgbClr val="00B0F0"/>
+          </a:solidFill>
+        </p:spPr>
+        <p:style>
+          <a:lnRef idx="2">
+            <a:schemeClr val="accent6">
+              <a:shade val="50000"/>
+            </a:schemeClr>
+          </a:lnRef>
+          <a:fillRef idx="1">
+            <a:schemeClr val="accent6"/>
+          </a:fillRef>
+          <a:effectRef idx="0">
+            <a:schemeClr val="accent6"/>
+          </a:effectRef>
+          <a:fontRef idx="minor">
+            <a:schemeClr val="lt1"/>
+          </a:fontRef>
+        </p:style>
+        <p:txBody>
+          <a:bodyPr rtlCol="0" anchor="ctr"/>
+          <a:lstStyle/>
+          <a:p>
+            <a:pPr algn="ctr"/>
+            <a:endParaRPr lang="en-US" dirty="0"/>
+          </a:p>
+        </p:txBody>
+      </p:sp>
+      <p:sp>
+        <p:nvSpPr>
+          <p:cNvPr id="7" name="Rectangle 6">
+            <a:extLst>
+              <a:ext uri="{FF2B5EF4-FFF2-40B4-BE49-F238E27FC236}">
+                <a16:creationId xmlns:a16="http://schemas.microsoft.com/office/drawing/2014/main" id="{4896B1FE-C800-4C56-B712-920515CD84C9}"/>
+              </a:ext>
+            </a:extLst>
+          </p:cNvPr>
+          <p:cNvSpPr/>
+          <p:nvPr/>
+        </p:nvSpPr>
+        <p:spPr>
+          <a:xfrm>
+            <a:off x="6112761" y="5626555"/>
+            <a:ext cx="496826" cy="420234"/>
+          </a:xfrm>
+          <a:prstGeom prst="rect">
+            <a:avLst/>
+          </a:prstGeom>
+          <a:solidFill>
+            <a:srgbClr val="00B0F0"/>
+          </a:solidFill>
+        </p:spPr>
+        <p:style>
+          <a:lnRef idx="2">
+            <a:schemeClr val="accent6">
+              <a:shade val="50000"/>
+            </a:schemeClr>
+          </a:lnRef>
+          <a:fillRef idx="1">
+            <a:schemeClr val="accent6"/>
+          </a:fillRef>
+          <a:effectRef idx="0">
+            <a:schemeClr val="accent6"/>
+          </a:effectRef>
+          <a:fontRef idx="minor">
+            <a:schemeClr val="lt1"/>
+          </a:fontRef>
+        </p:style>
+        <p:txBody>
+          <a:bodyPr rtlCol="0" anchor="ctr"/>
+          <a:lstStyle/>
+          <a:p>
+            <a:pPr algn="ctr"/>
+            <a:endParaRPr lang="en-US" dirty="0"/>
+          </a:p>
+        </p:txBody>
+      </p:sp>
+      <p:sp>
+        <p:nvSpPr>
+          <p:cNvPr id="8" name="Rectangle 7">
+            <a:extLst>
+              <a:ext uri="{FF2B5EF4-FFF2-40B4-BE49-F238E27FC236}">
+                <a16:creationId xmlns:a16="http://schemas.microsoft.com/office/drawing/2014/main" id="{31DCBC0C-BBE9-4857-A34B-BC5614E9A7AB}"/>
+              </a:ext>
+            </a:extLst>
+          </p:cNvPr>
+          <p:cNvSpPr/>
+          <p:nvPr/>
+        </p:nvSpPr>
+        <p:spPr>
+          <a:xfrm>
+            <a:off x="4629150" y="2162174"/>
+            <a:ext cx="496826" cy="151947"/>
+          </a:xfrm>
+          <a:prstGeom prst="rect">
+            <a:avLst/>
+          </a:prstGeom>
+          <a:solidFill>
+            <a:srgbClr val="00B0F0"/>
+          </a:solidFill>
+        </p:spPr>
+        <p:style>
+          <a:lnRef idx="2">
+            <a:schemeClr val="accent6">
+              <a:shade val="50000"/>
+            </a:schemeClr>
+          </a:lnRef>
+          <a:fillRef idx="1">
+            <a:schemeClr val="accent6"/>
+          </a:fillRef>
+          <a:effectRef idx="0">
+            <a:schemeClr val="accent6"/>
+          </a:effectRef>
+          <a:fontRef idx="minor">
+            <a:schemeClr val="lt1"/>
+          </a:fontRef>
+        </p:style>
+        <p:txBody>
+          <a:bodyPr rtlCol="0" anchor="ctr"/>
+          <a:lstStyle/>
+          <a:p>
+            <a:pPr algn="ctr"/>
+            <a:endParaRPr lang="en-US" dirty="0"/>
+          </a:p>
+        </p:txBody>
+      </p:sp>
+      <p:sp>
+        <p:nvSpPr>
+          <p:cNvPr id="9" name="Rectangle 8">
+            <a:extLst>
+              <a:ext uri="{FF2B5EF4-FFF2-40B4-BE49-F238E27FC236}">
+                <a16:creationId xmlns:a16="http://schemas.microsoft.com/office/drawing/2014/main" id="{D3B08A89-79C2-4B35-853C-5E8DC32A49E3}"/>
+              </a:ext>
+            </a:extLst>
+          </p:cNvPr>
+          <p:cNvSpPr/>
+          <p:nvPr/>
+        </p:nvSpPr>
+        <p:spPr>
+          <a:xfrm>
+            <a:off x="4629150" y="2865098"/>
+            <a:ext cx="496826" cy="151947"/>
+          </a:xfrm>
+          <a:prstGeom prst="rect">
+            <a:avLst/>
+          </a:prstGeom>
+          <a:solidFill>
+            <a:srgbClr val="00B0F0"/>
+          </a:solidFill>
+        </p:spPr>
+        <p:style>
+          <a:lnRef idx="2">
+            <a:schemeClr val="accent6">
+              <a:shade val="50000"/>
+            </a:schemeClr>
+          </a:lnRef>
+          <a:fillRef idx="1">
+            <a:schemeClr val="accent6"/>
+          </a:fillRef>
+          <a:effectRef idx="0">
+            <a:schemeClr val="accent6"/>
+          </a:effectRef>
+          <a:fontRef idx="minor">
+            <a:schemeClr val="lt1"/>
+          </a:fontRef>
+        </p:style>
+        <p:txBody>
+          <a:bodyPr rtlCol="0" anchor="ctr"/>
+          <a:lstStyle/>
+          <a:p>
+            <a:pPr algn="ctr"/>
+            <a:endParaRPr lang="en-US" dirty="0"/>
+          </a:p>
+        </p:txBody>
+      </p:sp>
+      <p:sp>
+        <p:nvSpPr>
+          <p:cNvPr id="10" name="Rectangle 9">
+            <a:extLst>
+              <a:ext uri="{FF2B5EF4-FFF2-40B4-BE49-F238E27FC236}">
+                <a16:creationId xmlns:a16="http://schemas.microsoft.com/office/drawing/2014/main" id="{58C57710-2976-41DB-B823-744967AF9AFA}"/>
+              </a:ext>
+            </a:extLst>
+          </p:cNvPr>
+          <p:cNvSpPr/>
+          <p:nvPr/>
+        </p:nvSpPr>
+        <p:spPr>
+          <a:xfrm>
+            <a:off x="5087876" y="2368493"/>
+            <a:ext cx="77726" cy="442232"/>
+          </a:xfrm>
+          <a:prstGeom prst="rect">
+            <a:avLst/>
+          </a:prstGeom>
+          <a:solidFill>
+            <a:srgbClr val="00B0F0"/>
+          </a:solidFill>
+        </p:spPr>
+        <p:style>
+          <a:lnRef idx="2">
+            <a:schemeClr val="accent6">
+              <a:shade val="50000"/>
+            </a:schemeClr>
+          </a:lnRef>
+          <a:fillRef idx="1">
+            <a:schemeClr val="accent6"/>
+          </a:fillRef>
+          <a:effectRef idx="0">
+            <a:schemeClr val="accent6"/>
+          </a:effectRef>
+          <a:fontRef idx="minor">
+            <a:schemeClr val="lt1"/>
+          </a:fontRef>
+        </p:style>
+        <p:txBody>
+          <a:bodyPr rtlCol="0" anchor="ctr"/>
+          <a:lstStyle/>
+          <a:p>
+            <a:pPr algn="ctr"/>
+            <a:endParaRPr lang="en-US" dirty="0"/>
+          </a:p>
+        </p:txBody>
+      </p:sp>
+    </p:spTree>
+    <p:extLst>
+      <p:ext uri="{BB962C8B-B14F-4D97-AF65-F5344CB8AC3E}">
+        <p14:creationId xmlns:p14="http://schemas.microsoft.com/office/powerpoint/2010/main" val="1117208773"/>
+      </p:ext>
+    </p:extLst>
+  </p:cSld>
+  <p:clrMapOvr>
+    <a:masterClrMapping/>
+  </p:clrMapOvr>
+</p:sld>
+</file>
+
+<file path=ppt/slides/slide17.xml><?xml version="1.0" encoding="utf-8"?>
+<p:sld xmlns:a="http://schemas.openxmlformats.org/drawingml/2006/main" xmlns:r="http://schemas.openxmlformats.org/officeDocument/2006/relationships" xmlns:p="http://schemas.openxmlformats.org/presentationml/2006/main">
+  <p:cSld>
+    <p:spTree>
+      <p:nvGrpSpPr>
+        <p:cNvPr id="1" name=""/>
+        <p:cNvGrpSpPr/>
+        <p:nvPr/>
+      </p:nvGrpSpPr>
+      <p:grpSpPr>
+        <a:xfrm>
+          <a:off x="0" y="0"/>
+          <a:ext cx="0" cy="0"/>
+          <a:chOff x="0" y="0"/>
+          <a:chExt cx="0" cy="0"/>
+        </a:xfrm>
+      </p:grpSpPr>
+      <p:sp>
+        <p:nvSpPr>
+          <p:cNvPr id="2" name="Title 1">
+            <a:extLst>
+              <a:ext uri="{FF2B5EF4-FFF2-40B4-BE49-F238E27FC236}">
+                <a16:creationId xmlns:a16="http://schemas.microsoft.com/office/drawing/2014/main" id="{43C71F9C-85A5-4A41-9921-793F0369ED46}"/>
+              </a:ext>
+            </a:extLst>
+          </p:cNvPr>
+          <p:cNvSpPr>
+            <a:spLocks noGrp="1"/>
+          </p:cNvSpPr>
+          <p:nvPr>
+            <p:ph type="title"/>
+          </p:nvPr>
+        </p:nvSpPr>
+        <p:spPr/>
+        <p:txBody>
+          <a:bodyPr/>
+          <a:lstStyle/>
+          <a:p>
+            <a:r>
+              <a:rPr lang="en-US" dirty="0"/>
+              <a:t>Enemy structure</a:t>
+            </a:r>
+          </a:p>
+        </p:txBody>
+      </p:sp>
+      <p:sp>
+        <p:nvSpPr>
+          <p:cNvPr id="4" name="Rectangle 3">
+            <a:extLst>
+              <a:ext uri="{FF2B5EF4-FFF2-40B4-BE49-F238E27FC236}">
+                <a16:creationId xmlns:a16="http://schemas.microsoft.com/office/drawing/2014/main" id="{41DE9440-90BC-4D34-AD48-BC26A7C36E98}"/>
+              </a:ext>
+            </a:extLst>
+          </p:cNvPr>
+          <p:cNvSpPr/>
+          <p:nvPr/>
+        </p:nvSpPr>
+        <p:spPr>
+          <a:xfrm>
+            <a:off x="7502647" y="3809363"/>
+            <a:ext cx="1686131" cy="1584963"/>
+          </a:xfrm>
+          <a:prstGeom prst="rect">
+            <a:avLst/>
+          </a:prstGeom>
+          <a:solidFill>
+            <a:srgbClr val="FF0000"/>
+          </a:solidFill>
+        </p:spPr>
+        <p:style>
+          <a:lnRef idx="2">
+            <a:schemeClr val="accent6">
+              <a:shade val="50000"/>
+            </a:schemeClr>
+          </a:lnRef>
+          <a:fillRef idx="1">
+            <a:schemeClr val="accent6"/>
+          </a:fillRef>
+          <a:effectRef idx="0">
+            <a:schemeClr val="accent6"/>
+          </a:effectRef>
+          <a:fontRef idx="minor">
+            <a:schemeClr val="lt1"/>
+          </a:fontRef>
+        </p:style>
+        <p:txBody>
+          <a:bodyPr rtlCol="0" anchor="ctr"/>
+          <a:lstStyle/>
+          <a:p>
+            <a:pPr algn="ctr"/>
+            <a:r>
+              <a:rPr lang="en-US" dirty="0"/>
+              <a:t>Body collider</a:t>
+            </a:r>
+          </a:p>
+        </p:txBody>
+      </p:sp>
+      <p:sp>
+        <p:nvSpPr>
+          <p:cNvPr id="5" name="Rectangle 4">
+            <a:extLst>
+              <a:ext uri="{FF2B5EF4-FFF2-40B4-BE49-F238E27FC236}">
+                <a16:creationId xmlns:a16="http://schemas.microsoft.com/office/drawing/2014/main" id="{2B1152E3-4BBC-46B6-90E7-FC77E1CC8C8A}"/>
+              </a:ext>
+            </a:extLst>
+          </p:cNvPr>
+          <p:cNvSpPr/>
+          <p:nvPr/>
+        </p:nvSpPr>
+        <p:spPr>
+          <a:xfrm>
+            <a:off x="7704199" y="3292930"/>
+            <a:ext cx="1299028" cy="420234"/>
           </a:xfrm>
           <a:prstGeom prst="rect">
             <a:avLst/>
@@ -4522,7 +5041,10 @@
           <a:lstStyle/>
           <a:p>
             <a:pPr algn="ctr"/>
-            <a:endParaRPr lang="en-US" dirty="0"/>
+            <a:r>
+              <a:rPr lang="en-US" dirty="0"/>
+              <a:t>Top collider</a:t>
+            </a:r>
           </a:p>
         </p:txBody>
       </p:sp>
@@ -4531,7 +5053,7 @@
           <p:cNvPr id="7" name="Rectangle 6">
             <a:extLst>
               <a:ext uri="{FF2B5EF4-FFF2-40B4-BE49-F238E27FC236}">
-                <a16:creationId xmlns:a16="http://schemas.microsoft.com/office/drawing/2014/main" id="{4896B1FE-C800-4C56-B712-920515CD84C9}"/>
+                <a16:creationId xmlns:a16="http://schemas.microsoft.com/office/drawing/2014/main" id="{A0DABB58-23AB-4196-BD35-8A68070227A1}"/>
               </a:ext>
             </a:extLst>
           </p:cNvPr>
@@ -4540,8 +5062,67 @@
         </p:nvSpPr>
         <p:spPr>
           <a:xfrm>
-            <a:off x="6112761" y="5626555"/>
-            <a:ext cx="496826" cy="420234"/>
+            <a:off x="1035172" y="1957544"/>
+            <a:ext cx="2631953" cy="642781"/>
+          </a:xfrm>
+          <a:prstGeom prst="rect">
+            <a:avLst/>
+          </a:prstGeom>
+          <a:solidFill>
+            <a:srgbClr val="FF0000"/>
+          </a:solidFill>
+        </p:spPr>
+        <p:style>
+          <a:lnRef idx="2">
+            <a:schemeClr val="accent6">
+              <a:shade val="50000"/>
+            </a:schemeClr>
+          </a:lnRef>
+          <a:fillRef idx="1">
+            <a:schemeClr val="accent6"/>
+          </a:fillRef>
+          <a:effectRef idx="0">
+            <a:schemeClr val="accent6"/>
+          </a:effectRef>
+          <a:fontRef idx="minor">
+            <a:schemeClr val="lt1"/>
+          </a:fontRef>
+        </p:style>
+        <p:txBody>
+          <a:bodyPr rtlCol="0" anchor="ctr"/>
+          <a:lstStyle/>
+          <a:p>
+            <a:pPr algn="ctr"/>
+            <a:r>
+              <a:rPr lang="en-US" dirty="0"/>
+              <a:t>Game object : Enemy</a:t>
+            </a:r>
+          </a:p>
+          <a:p>
+            <a:pPr algn="ctr"/>
+            <a:r>
+              <a:rPr lang="en-US" dirty="0"/>
+              <a:t>3d cube</a:t>
+            </a:r>
+          </a:p>
+        </p:txBody>
+      </p:sp>
+      <p:sp>
+        <p:nvSpPr>
+          <p:cNvPr id="8" name="Rectangle 7">
+            <a:extLst>
+              <a:ext uri="{FF2B5EF4-FFF2-40B4-BE49-F238E27FC236}">
+                <a16:creationId xmlns:a16="http://schemas.microsoft.com/office/drawing/2014/main" id="{BC9B3101-750F-4053-B888-4B1FA7999FB1}"/>
+              </a:ext>
+            </a:extLst>
+          </p:cNvPr>
+          <p:cNvSpPr/>
+          <p:nvPr/>
+        </p:nvSpPr>
+        <p:spPr>
+          <a:xfrm>
+            <a:off x="2351148" y="2689609"/>
+            <a:ext cx="2136655" cy="642781"/>
           </a:xfrm>
           <a:prstGeom prst="rect">
             <a:avLst/>
@@ -4571,16 +5152,19 @@
           <a:lstStyle/>
           <a:p>
             <a:pPr algn="ctr"/>
-            <a:endParaRPr lang="en-US" dirty="0"/>
-          </a:p>
-        </p:txBody>
-      </p:sp>
-      <p:sp>
-        <p:nvSpPr>
-          <p:cNvPr id="8" name="Rectangle 7">
+            <a:r>
+              <a:rPr lang="en-US" dirty="0"/>
+              <a:t>Game object: Head</a:t>
+            </a:r>
+          </a:p>
+        </p:txBody>
+      </p:sp>
+      <p:sp>
+        <p:nvSpPr>
+          <p:cNvPr id="9" name="Rectangle 8">
             <a:extLst>
               <a:ext uri="{FF2B5EF4-FFF2-40B4-BE49-F238E27FC236}">
-                <a16:creationId xmlns:a16="http://schemas.microsoft.com/office/drawing/2014/main" id="{31DCBC0C-BBE9-4857-A34B-BC5614E9A7AB}"/>
+                <a16:creationId xmlns:a16="http://schemas.microsoft.com/office/drawing/2014/main" id="{AF89C6CB-8711-4F94-90E1-A7B8258723B4}"/>
               </a:ext>
             </a:extLst>
           </p:cNvPr>
@@ -4589,14 +5173,16 @@
         </p:nvSpPr>
         <p:spPr>
           <a:xfrm>
-            <a:off x="4629150" y="2162174"/>
-            <a:ext cx="496826" cy="151947"/>
+            <a:off x="2351148" y="3487972"/>
+            <a:ext cx="2136655" cy="642781"/>
           </a:xfrm>
           <a:prstGeom prst="rect">
             <a:avLst/>
           </a:prstGeom>
           <a:solidFill>
-            <a:schemeClr val="accent2"/>
+            <a:schemeClr val="accent6">
+              <a:lumMod val="75000"/>
+            </a:schemeClr>
           </a:solidFill>
         </p:spPr>
         <p:style>
@@ -4620,104 +5206,14 @@
           <a:lstStyle/>
           <a:p>
             <a:pPr algn="ctr"/>
-            <a:endParaRPr lang="en-US" dirty="0"/>
-          </a:p>
-        </p:txBody>
-      </p:sp>
-      <p:sp>
-        <p:nvSpPr>
-          <p:cNvPr id="9" name="Rectangle 8">
-            <a:extLst>
-              <a:ext uri="{FF2B5EF4-FFF2-40B4-BE49-F238E27FC236}">
-                <a16:creationId xmlns:a16="http://schemas.microsoft.com/office/drawing/2014/main" id="{D3B08A89-79C2-4B35-853C-5E8DC32A49E3}"/>
-              </a:ext>
-            </a:extLst>
-          </p:cNvPr>
-          <p:cNvSpPr/>
-          <p:nvPr/>
-        </p:nvSpPr>
-        <p:spPr>
-          <a:xfrm>
-            <a:off x="4629150" y="2865098"/>
-            <a:ext cx="496826" cy="151947"/>
-          </a:xfrm>
-          <a:prstGeom prst="rect">
-            <a:avLst/>
-          </a:prstGeom>
-          <a:solidFill>
-            <a:schemeClr val="accent2"/>
-          </a:solidFill>
-        </p:spPr>
-        <p:style>
-          <a:lnRef idx="2">
-            <a:schemeClr val="accent6">
-              <a:shade val="50000"/>
-            </a:schemeClr>
-          </a:lnRef>
-          <a:fillRef idx="1">
-            <a:schemeClr val="accent6"/>
-          </a:fillRef>
-          <a:effectRef idx="0">
-            <a:schemeClr val="accent6"/>
-          </a:effectRef>
-          <a:fontRef idx="minor">
-            <a:schemeClr val="lt1"/>
-          </a:fontRef>
-        </p:style>
-        <p:txBody>
-          <a:bodyPr rtlCol="0" anchor="ctr"/>
-          <a:lstStyle/>
-          <a:p>
-            <a:pPr algn="ctr"/>
-            <a:endParaRPr lang="en-US" dirty="0"/>
-          </a:p>
-        </p:txBody>
-      </p:sp>
-      <p:sp>
-        <p:nvSpPr>
-          <p:cNvPr id="10" name="Rectangle 9">
-            <a:extLst>
-              <a:ext uri="{FF2B5EF4-FFF2-40B4-BE49-F238E27FC236}">
-                <a16:creationId xmlns:a16="http://schemas.microsoft.com/office/drawing/2014/main" id="{58C57710-2976-41DB-B823-744967AF9AFA}"/>
-              </a:ext>
-            </a:extLst>
-          </p:cNvPr>
-          <p:cNvSpPr/>
-          <p:nvPr/>
-        </p:nvSpPr>
-        <p:spPr>
-          <a:xfrm>
-            <a:off x="5087876" y="2368493"/>
-            <a:ext cx="77726" cy="442232"/>
-          </a:xfrm>
-          <a:prstGeom prst="rect">
-            <a:avLst/>
-          </a:prstGeom>
-          <a:solidFill>
-            <a:schemeClr val="accent2"/>
-          </a:solidFill>
-        </p:spPr>
-        <p:style>
-          <a:lnRef idx="2">
-            <a:schemeClr val="accent6">
-              <a:shade val="50000"/>
-            </a:schemeClr>
-          </a:lnRef>
-          <a:fillRef idx="1">
-            <a:schemeClr val="accent6"/>
-          </a:fillRef>
-          <a:effectRef idx="0">
-            <a:schemeClr val="accent6"/>
-          </a:effectRef>
-          <a:fontRef idx="minor">
-            <a:schemeClr val="lt1"/>
-          </a:fontRef>
-        </p:style>
-        <p:txBody>
-          <a:bodyPr rtlCol="0" anchor="ctr"/>
-          <a:lstStyle/>
-          <a:p>
-            <a:pPr algn="ctr"/>
+            <a:r>
+              <a:rPr lang="en-US" dirty="0"/>
+              <a:t>Game object: 3d model of </a:t>
+            </a:r>
+            <a:r>
+              <a:rPr lang="en-US" dirty="0" err="1"/>
+              <a:t>goomba</a:t>
+            </a:r>
             <a:endParaRPr lang="en-US" dirty="0"/>
           </a:p>
         </p:txBody>
@@ -4725,7 +5221,7 @@
     </p:spTree>
     <p:extLst>
       <p:ext uri="{BB962C8B-B14F-4D97-AF65-F5344CB8AC3E}">
-        <p14:creationId xmlns:p14="http://schemas.microsoft.com/office/powerpoint/2010/main" val="1117208773"/>
+        <p14:creationId xmlns:p14="http://schemas.microsoft.com/office/powerpoint/2010/main" val="3435909588"/>
       </p:ext>
     </p:extLst>
   </p:cSld>
@@ -4964,23 +5460,36 @@
           <a:p>
             <a:r>
               <a:rPr lang="en-US" dirty="0">
+                <a:solidFill>
+                  <a:srgbClr val="00B050"/>
+                </a:solidFill>
                 <a:ea typeface="+mn-lt"/>
                 <a:cs typeface="+mn-lt"/>
               </a:rPr>
               <a:t>STAR: give invulnerable </a:t>
             </a:r>
-            <a:endParaRPr lang="en-US" dirty="0"/>
+            <a:endParaRPr lang="en-US" dirty="0">
+              <a:solidFill>
+                <a:srgbClr val="00B050"/>
+              </a:solidFill>
+            </a:endParaRPr>
           </a:p>
           <a:p>
             <a:pPr lvl="1"/>
             <a:r>
               <a:rPr lang="en-US" b="1" dirty="0">
+                <a:solidFill>
+                  <a:srgbClr val="00B050"/>
+                </a:solidFill>
                 <a:ea typeface="+mn-lt"/>
                 <a:cs typeface="+mn-lt"/>
               </a:rPr>
               <a:t>If I hit with Mario = I disappear.</a:t>
             </a:r>
             <a:endParaRPr lang="en-US" dirty="0">
+              <a:solidFill>
+                <a:srgbClr val="00B050"/>
+              </a:solidFill>
               <a:cs typeface="Calibri"/>
             </a:endParaRPr>
           </a:p>
@@ -5058,23 +5567,36 @@
           <a:p>
             <a:r>
               <a:rPr lang="en-US" dirty="0">
+                <a:solidFill>
+                  <a:srgbClr val="00B050"/>
+                </a:solidFill>
                 <a:ea typeface="+mn-lt"/>
                 <a:cs typeface="+mn-lt"/>
               </a:rPr>
               <a:t>ENEMY</a:t>
             </a:r>
-            <a:endParaRPr lang="en-US" dirty="0"/>
+            <a:endParaRPr lang="en-US" dirty="0">
+              <a:solidFill>
+                <a:srgbClr val="00B050"/>
+              </a:solidFill>
+            </a:endParaRPr>
           </a:p>
           <a:p>
             <a:pPr lvl="1"/>
             <a:r>
               <a:rPr lang="en-US" b="1" dirty="0">
+                <a:solidFill>
+                  <a:srgbClr val="00B050"/>
+                </a:solidFill>
                 <a:ea typeface="+mn-lt"/>
                 <a:cs typeface="+mn-lt"/>
               </a:rPr>
               <a:t>If Mario hit me on the top = I will die.</a:t>
             </a:r>
             <a:endParaRPr lang="en-US" dirty="0">
+              <a:solidFill>
+                <a:srgbClr val="00B050"/>
+              </a:solidFill>
               <a:cs typeface="Calibri" panose="020F0502020204030204"/>
             </a:endParaRPr>
           </a:p>
@@ -5082,12 +5604,18 @@
             <a:pPr lvl="1"/>
             <a:r>
               <a:rPr lang="en-US" b="1" dirty="0">
+                <a:solidFill>
+                  <a:srgbClr val="00B050"/>
+                </a:solidFill>
                 <a:ea typeface="+mn-lt"/>
                 <a:cs typeface="+mn-lt"/>
               </a:rPr>
               <a:t>If Mario hit me but Mario has the STAR = I will die.</a:t>
             </a:r>
             <a:endParaRPr lang="en-US" dirty="0">
+              <a:solidFill>
+                <a:srgbClr val="00B050"/>
+              </a:solidFill>
               <a:cs typeface="Calibri"/>
             </a:endParaRPr>
           </a:p>
@@ -5112,6 +5640,491 @@
 </file>
 
 <file path=ppt/slides/slide4.xml><?xml version="1.0" encoding="utf-8"?>
+<p:sld xmlns:a="http://schemas.openxmlformats.org/drawingml/2006/main" xmlns:r="http://schemas.openxmlformats.org/officeDocument/2006/relationships" xmlns:p="http://schemas.openxmlformats.org/presentationml/2006/main">
+  <p:cSld>
+    <p:spTree>
+      <p:nvGrpSpPr>
+        <p:cNvPr id="1" name=""/>
+        <p:cNvGrpSpPr/>
+        <p:nvPr/>
+      </p:nvGrpSpPr>
+      <p:grpSpPr>
+        <a:xfrm>
+          <a:off x="0" y="0"/>
+          <a:ext cx="0" cy="0"/>
+          <a:chOff x="0" y="0"/>
+          <a:chExt cx="0" cy="0"/>
+        </a:xfrm>
+      </p:grpSpPr>
+      <p:sp>
+        <p:nvSpPr>
+          <p:cNvPr id="2" name="Title 1">
+            <a:extLst>
+              <a:ext uri="{FF2B5EF4-FFF2-40B4-BE49-F238E27FC236}">
+                <a16:creationId xmlns:a16="http://schemas.microsoft.com/office/drawing/2014/main" id="{27AA82D6-B06B-497F-8FDA-A096C7DE6B68}"/>
+              </a:ext>
+            </a:extLst>
+          </p:cNvPr>
+          <p:cNvSpPr>
+            <a:spLocks noGrp="1"/>
+          </p:cNvSpPr>
+          <p:nvPr>
+            <p:ph type="title"/>
+          </p:nvPr>
+        </p:nvSpPr>
+        <p:spPr/>
+        <p:txBody>
+          <a:bodyPr/>
+          <a:lstStyle/>
+          <a:p>
+            <a:r>
+              <a:rPr lang="en-US" dirty="0">
+                <a:cs typeface="Calibri Light"/>
+              </a:rPr>
+              <a:t>MARIO rules</a:t>
+            </a:r>
+            <a:endParaRPr lang="en-US" dirty="0"/>
+          </a:p>
+        </p:txBody>
+      </p:sp>
+      <p:sp>
+        <p:nvSpPr>
+          <p:cNvPr id="3" name="Content Placeholder 2">
+            <a:extLst>
+              <a:ext uri="{FF2B5EF4-FFF2-40B4-BE49-F238E27FC236}">
+                <a16:creationId xmlns:a16="http://schemas.microsoft.com/office/drawing/2014/main" id="{535B9031-DE08-4180-895C-A6EFF319555B}"/>
+              </a:ext>
+            </a:extLst>
+          </p:cNvPr>
+          <p:cNvSpPr>
+            <a:spLocks noGrp="1"/>
+          </p:cNvSpPr>
+          <p:nvPr>
+            <p:ph idx="1"/>
+          </p:nvPr>
+        </p:nvSpPr>
+        <p:spPr/>
+        <p:txBody>
+          <a:bodyPr vert="horz" lIns="91440" tIns="45720" rIns="91440" bIns="45720" rtlCol="0" anchor="t">
+            <a:normAutofit fontScale="70000" lnSpcReduction="20000"/>
+          </a:bodyPr>
+          <a:lstStyle/>
+          <a:p>
+            <a:r>
+              <a:rPr lang="en-US" dirty="0">
+                <a:cs typeface="Calibri"/>
+              </a:rPr>
+              <a:t>If I hit the star, I become invincible for XXX seconds</a:t>
+            </a:r>
+          </a:p>
+          <a:p>
+            <a:r>
+              <a:rPr lang="en-US" dirty="0">
+                <a:solidFill>
+                  <a:srgbClr val="00B050"/>
+                </a:solidFill>
+                <a:cs typeface="Calibri"/>
+              </a:rPr>
+              <a:t>If I hit the mushroom, </a:t>
+            </a:r>
+          </a:p>
+          <a:p>
+            <a:pPr lvl="1"/>
+            <a:r>
+              <a:rPr lang="en-US" dirty="0">
+                <a:solidFill>
+                  <a:srgbClr val="00B050"/>
+                </a:solidFill>
+                <a:cs typeface="Calibri"/>
+              </a:rPr>
+              <a:t>I become XXX scale </a:t>
+            </a:r>
+            <a:endParaRPr lang="en-US" dirty="0">
+              <a:solidFill>
+                <a:srgbClr val="00B050"/>
+              </a:solidFill>
+            </a:endParaRPr>
+          </a:p>
+          <a:p>
+            <a:r>
+              <a:rPr lang="en-US" dirty="0">
+                <a:solidFill>
+                  <a:srgbClr val="00B050"/>
+                </a:solidFill>
+                <a:cs typeface="Calibri"/>
+              </a:rPr>
+              <a:t>If I hit an enemy:</a:t>
+            </a:r>
+          </a:p>
+          <a:p>
+            <a:pPr lvl="1"/>
+            <a:r>
+              <a:rPr lang="en-US" dirty="0">
+                <a:solidFill>
+                  <a:srgbClr val="00B050"/>
+                </a:solidFill>
+                <a:cs typeface="Calibri"/>
+              </a:rPr>
+              <a:t>If I am big, I become small</a:t>
+            </a:r>
+          </a:p>
+          <a:p>
+            <a:pPr lvl="1"/>
+            <a:r>
+              <a:rPr lang="en-US" dirty="0">
+                <a:cs typeface="Calibri"/>
+              </a:rPr>
+              <a:t>If I am small: </a:t>
+            </a:r>
+          </a:p>
+          <a:p>
+            <a:pPr lvl="2"/>
+            <a:r>
+              <a:rPr lang="en-US" dirty="0">
+                <a:cs typeface="Calibri"/>
+              </a:rPr>
+              <a:t>minus 1 life. </a:t>
+            </a:r>
+            <a:endParaRPr lang="en-US" dirty="0"/>
+          </a:p>
+          <a:p>
+            <a:pPr lvl="2"/>
+            <a:r>
+              <a:rPr lang="en-US" dirty="0">
+                <a:ea typeface="+mn-lt"/>
+                <a:cs typeface="+mn-lt"/>
+              </a:rPr>
+              <a:t>If I have 0 life, I die</a:t>
+            </a:r>
+          </a:p>
+          <a:p>
+            <a:pPr lvl="1"/>
+            <a:r>
+              <a:rPr lang="en-US" dirty="0">
+                <a:solidFill>
+                  <a:srgbClr val="00B050"/>
+                </a:solidFill>
+                <a:cs typeface="Calibri"/>
+              </a:rPr>
+              <a:t>If I am </a:t>
+            </a:r>
+            <a:r>
+              <a:rPr lang="en-US" dirty="0">
+                <a:solidFill>
+                  <a:srgbClr val="00B050"/>
+                </a:solidFill>
+                <a:ea typeface="+mn-lt"/>
+                <a:cs typeface="+mn-lt"/>
+              </a:rPr>
+              <a:t>invincible, enemy die</a:t>
+            </a:r>
+          </a:p>
+          <a:p>
+            <a:r>
+              <a:rPr lang="en-US" dirty="0">
+                <a:ea typeface="+mn-lt"/>
+                <a:cs typeface="+mn-lt"/>
+              </a:rPr>
+              <a:t>If I hit green mushroom, I get 1 life</a:t>
+            </a:r>
+          </a:p>
+          <a:p>
+            <a:r>
+              <a:rPr lang="en-US" dirty="0">
+                <a:solidFill>
+                  <a:srgbClr val="00B050"/>
+                </a:solidFill>
+                <a:ea typeface="+mn-lt"/>
+                <a:cs typeface="+mn-lt"/>
+              </a:rPr>
+              <a:t>If I hit checkpoint, save the location of the checkpoint</a:t>
+            </a:r>
+          </a:p>
+          <a:p>
+            <a:r>
+              <a:rPr lang="en-US" dirty="0">
+                <a:ea typeface="+mn-lt"/>
+                <a:cs typeface="+mn-lt"/>
+              </a:rPr>
+              <a:t>If I die, restart from last checkpoint</a:t>
+            </a:r>
+            <a:endParaRPr lang="en-US" dirty="0"/>
+          </a:p>
+          <a:p>
+            <a:r>
+              <a:rPr lang="en-US" dirty="0">
+                <a:cs typeface="Calibri"/>
+              </a:rPr>
+              <a:t>on start of game:</a:t>
+            </a:r>
+          </a:p>
+          <a:p>
+            <a:pPr lvl="1"/>
+            <a:r>
+              <a:rPr lang="en-US" dirty="0">
+                <a:cs typeface="Calibri"/>
+              </a:rPr>
+              <a:t>Give </a:t>
+            </a:r>
+            <a:r>
+              <a:rPr lang="en-US" dirty="0" err="1">
+                <a:cs typeface="Calibri"/>
+              </a:rPr>
+              <a:t>mario</a:t>
+            </a:r>
+            <a:r>
+              <a:rPr lang="en-US" dirty="0">
+                <a:cs typeface="Calibri"/>
+              </a:rPr>
+              <a:t> 2 life</a:t>
+            </a:r>
+            <a:endParaRPr lang="en-US" dirty="0"/>
+          </a:p>
+          <a:p>
+            <a:pPr lvl="1"/>
+            <a:r>
+              <a:rPr lang="en-US" dirty="0">
+                <a:cs typeface="Calibri"/>
+              </a:rPr>
+              <a:t>Save start as checkpoint</a:t>
+            </a:r>
+          </a:p>
+          <a:p>
+            <a:endParaRPr lang="en-US" dirty="0">
+              <a:cs typeface="Calibri"/>
+            </a:endParaRPr>
+          </a:p>
+          <a:p>
+            <a:endParaRPr lang="en-US" dirty="0">
+              <a:cs typeface="Calibri"/>
+            </a:endParaRPr>
+          </a:p>
+          <a:p>
+            <a:endParaRPr lang="en-US" dirty="0">
+              <a:cs typeface="Calibri"/>
+            </a:endParaRPr>
+          </a:p>
+        </p:txBody>
+      </p:sp>
+    </p:spTree>
+    <p:extLst>
+      <p:ext uri="{BB962C8B-B14F-4D97-AF65-F5344CB8AC3E}">
+        <p14:creationId xmlns:p14="http://schemas.microsoft.com/office/powerpoint/2010/main" val="1903990095"/>
+      </p:ext>
+    </p:extLst>
+  </p:cSld>
+  <p:clrMapOvr>
+    <a:masterClrMapping/>
+  </p:clrMapOvr>
+</p:sld>
+</file>
+
+<file path=ppt/slides/slide5.xml><?xml version="1.0" encoding="utf-8"?>
+<p:sld xmlns:a="http://schemas.openxmlformats.org/drawingml/2006/main" xmlns:r="http://schemas.openxmlformats.org/officeDocument/2006/relationships" xmlns:p="http://schemas.openxmlformats.org/presentationml/2006/main">
+  <p:cSld>
+    <p:spTree>
+      <p:nvGrpSpPr>
+        <p:cNvPr id="1" name=""/>
+        <p:cNvGrpSpPr/>
+        <p:nvPr/>
+      </p:nvGrpSpPr>
+      <p:grpSpPr>
+        <a:xfrm>
+          <a:off x="0" y="0"/>
+          <a:ext cx="0" cy="0"/>
+          <a:chOff x="0" y="0"/>
+          <a:chExt cx="0" cy="0"/>
+        </a:xfrm>
+      </p:grpSpPr>
+      <p:sp>
+        <p:nvSpPr>
+          <p:cNvPr id="2" name="Title 1">
+            <a:extLst>
+              <a:ext uri="{FF2B5EF4-FFF2-40B4-BE49-F238E27FC236}">
+                <a16:creationId xmlns:a16="http://schemas.microsoft.com/office/drawing/2014/main" id="{A333FE23-DFC1-4CC7-89FD-1B83B4E9C090}"/>
+              </a:ext>
+            </a:extLst>
+          </p:cNvPr>
+          <p:cNvSpPr>
+            <a:spLocks noGrp="1"/>
+          </p:cNvSpPr>
+          <p:nvPr>
+            <p:ph type="title"/>
+          </p:nvPr>
+        </p:nvSpPr>
+        <p:spPr/>
+        <p:txBody>
+          <a:bodyPr/>
+          <a:lstStyle/>
+          <a:p>
+            <a:endParaRPr lang="en-US"/>
+          </a:p>
+        </p:txBody>
+      </p:sp>
+      <p:sp>
+        <p:nvSpPr>
+          <p:cNvPr id="3" name="Content Placeholder 2">
+            <a:extLst>
+              <a:ext uri="{FF2B5EF4-FFF2-40B4-BE49-F238E27FC236}">
+                <a16:creationId xmlns:a16="http://schemas.microsoft.com/office/drawing/2014/main" id="{434E58D6-7245-4DE7-AF9E-DA724BAD78B0}"/>
+              </a:ext>
+            </a:extLst>
+          </p:cNvPr>
+          <p:cNvSpPr>
+            <a:spLocks noGrp="1"/>
+          </p:cNvSpPr>
+          <p:nvPr>
+            <p:ph idx="1"/>
+          </p:nvPr>
+        </p:nvSpPr>
+        <p:spPr/>
+        <p:txBody>
+          <a:bodyPr/>
+          <a:lstStyle/>
+          <a:p>
+            <a:r>
+              <a:rPr lang="en-US" dirty="0"/>
+              <a:t>Until 10:30 everybody work</a:t>
+            </a:r>
+          </a:p>
+          <a:p>
+            <a:r>
+              <a:rPr lang="en-US" dirty="0"/>
+              <a:t>10:30 we all come back to the main room.</a:t>
+            </a:r>
+          </a:p>
+          <a:p>
+            <a:r>
+              <a:rPr lang="en-US" dirty="0"/>
+              <a:t>Every mini team shows his result.</a:t>
+            </a:r>
+          </a:p>
+        </p:txBody>
+      </p:sp>
+    </p:spTree>
+    <p:extLst>
+      <p:ext uri="{BB962C8B-B14F-4D97-AF65-F5344CB8AC3E}">
+        <p14:creationId xmlns:p14="http://schemas.microsoft.com/office/powerpoint/2010/main" val="1434088944"/>
+      </p:ext>
+    </p:extLst>
+  </p:cSld>
+  <p:clrMapOvr>
+    <a:masterClrMapping/>
+  </p:clrMapOvr>
+</p:sld>
+</file>
+
+<file path=ppt/slides/slide6.xml><?xml version="1.0" encoding="utf-8"?>
+<p:sld xmlns:a="http://schemas.openxmlformats.org/drawingml/2006/main" xmlns:r="http://schemas.openxmlformats.org/officeDocument/2006/relationships" xmlns:p="http://schemas.openxmlformats.org/presentationml/2006/main">
+  <p:cSld>
+    <p:spTree>
+      <p:nvGrpSpPr>
+        <p:cNvPr id="1" name=""/>
+        <p:cNvGrpSpPr/>
+        <p:nvPr/>
+      </p:nvGrpSpPr>
+      <p:grpSpPr>
+        <a:xfrm>
+          <a:off x="0" y="0"/>
+          <a:ext cx="0" cy="0"/>
+          <a:chOff x="0" y="0"/>
+          <a:chExt cx="0" cy="0"/>
+        </a:xfrm>
+      </p:grpSpPr>
+      <p:sp>
+        <p:nvSpPr>
+          <p:cNvPr id="2" name="Title 1">
+            <a:extLst>
+              <a:ext uri="{FF2B5EF4-FFF2-40B4-BE49-F238E27FC236}">
+                <a16:creationId xmlns:a16="http://schemas.microsoft.com/office/drawing/2014/main" id="{3DA697A1-05E0-434E-888B-3046DB262426}"/>
+              </a:ext>
+            </a:extLst>
+          </p:cNvPr>
+          <p:cNvSpPr>
+            <a:spLocks noGrp="1"/>
+          </p:cNvSpPr>
+          <p:nvPr>
+            <p:ph type="title"/>
+          </p:nvPr>
+        </p:nvSpPr>
+        <p:spPr/>
+        <p:txBody>
+          <a:bodyPr/>
+          <a:lstStyle/>
+          <a:p>
+            <a:endParaRPr lang="en-US"/>
+          </a:p>
+        </p:txBody>
+      </p:sp>
+      <p:sp>
+        <p:nvSpPr>
+          <p:cNvPr id="3" name="Content Placeholder 2">
+            <a:extLst>
+              <a:ext uri="{FF2B5EF4-FFF2-40B4-BE49-F238E27FC236}">
+                <a16:creationId xmlns:a16="http://schemas.microsoft.com/office/drawing/2014/main" id="{3BC43553-329E-493E-A66E-7647899D65F2}"/>
+              </a:ext>
+            </a:extLst>
+          </p:cNvPr>
+          <p:cNvSpPr>
+            <a:spLocks noGrp="1"/>
+          </p:cNvSpPr>
+          <p:nvPr>
+            <p:ph idx="1"/>
+          </p:nvPr>
+        </p:nvSpPr>
+        <p:spPr/>
+        <p:txBody>
+          <a:bodyPr/>
+          <a:lstStyle/>
+          <a:p>
+            <a:endParaRPr lang="en-US"/>
+          </a:p>
+        </p:txBody>
+      </p:sp>
+      <p:pic>
+        <p:nvPicPr>
+          <p:cNvPr id="5" name="Picture 4">
+            <a:extLst>
+              <a:ext uri="{FF2B5EF4-FFF2-40B4-BE49-F238E27FC236}">
+                <a16:creationId xmlns:a16="http://schemas.microsoft.com/office/drawing/2014/main" id="{0C8439C6-4E5D-4660-92CF-8E4FB1C0E73E}"/>
+              </a:ext>
+            </a:extLst>
+          </p:cNvPr>
+          <p:cNvPicPr>
+            <a:picLocks noChangeAspect="1"/>
+          </p:cNvPicPr>
+          <p:nvPr/>
+        </p:nvPicPr>
+        <p:blipFill>
+          <a:blip r:embed="rId2"/>
+          <a:stretch>
+            <a:fillRect/>
+          </a:stretch>
+        </p:blipFill>
+        <p:spPr>
+          <a:xfrm>
+            <a:off x="0" y="0"/>
+            <a:ext cx="12192000" cy="6858000"/>
+          </a:xfrm>
+          <a:prstGeom prst="rect">
+            <a:avLst/>
+          </a:prstGeom>
+        </p:spPr>
+      </p:pic>
+    </p:spTree>
+    <p:extLst>
+      <p:ext uri="{BB962C8B-B14F-4D97-AF65-F5344CB8AC3E}">
+        <p14:creationId xmlns:p14="http://schemas.microsoft.com/office/powerpoint/2010/main" val="2618863988"/>
+      </p:ext>
+    </p:extLst>
+  </p:cSld>
+  <p:clrMapOvr>
+    <a:masterClrMapping/>
+  </p:clrMapOvr>
+</p:sld>
+</file>
+
+<file path=ppt/slides/slide7.xml><?xml version="1.0" encoding="utf-8"?>
 <p:sld xmlns:a="http://schemas.openxmlformats.org/drawingml/2006/main" xmlns:r="http://schemas.openxmlformats.org/officeDocument/2006/relationships" xmlns:p="http://schemas.openxmlformats.org/presentationml/2006/main">
   <p:cSld>
     <p:spTree>
@@ -5705,7 +6718,7 @@
 </p:sld>
 </file>
 
-<file path=ppt/slides/slide5.xml><?xml version="1.0" encoding="utf-8"?>
+<file path=ppt/slides/slide8.xml><?xml version="1.0" encoding="utf-8"?>
 <p:sld xmlns:a="http://schemas.openxmlformats.org/drawingml/2006/main" xmlns:r="http://schemas.openxmlformats.org/officeDocument/2006/relationships" xmlns:p="http://schemas.openxmlformats.org/presentationml/2006/main">
   <p:cSld>
     <p:spTree>
@@ -5913,685 +6926,6 @@
 </p:sld>
 </file>
 
-<file path=ppt/slides/slide6.xml><?xml version="1.0" encoding="utf-8"?>
-<p:sld xmlns:a="http://schemas.openxmlformats.org/drawingml/2006/main" xmlns:r="http://schemas.openxmlformats.org/officeDocument/2006/relationships" xmlns:p="http://schemas.openxmlformats.org/presentationml/2006/main">
-  <p:cSld>
-    <p:spTree>
-      <p:nvGrpSpPr>
-        <p:cNvPr id="1" name=""/>
-        <p:cNvGrpSpPr/>
-        <p:nvPr/>
-      </p:nvGrpSpPr>
-      <p:grpSpPr>
-        <a:xfrm>
-          <a:off x="0" y="0"/>
-          <a:ext cx="0" cy="0"/>
-          <a:chOff x="0" y="0"/>
-          <a:chExt cx="0" cy="0"/>
-        </a:xfrm>
-      </p:grpSpPr>
-      <p:sp>
-        <p:nvSpPr>
-          <p:cNvPr id="2" name="Title 1">
-            <a:extLst>
-              <a:ext uri="{FF2B5EF4-FFF2-40B4-BE49-F238E27FC236}">
-                <a16:creationId xmlns:a16="http://schemas.microsoft.com/office/drawing/2014/main" id="{27AA82D6-B06B-497F-8FDA-A096C7DE6B68}"/>
-              </a:ext>
-            </a:extLst>
-          </p:cNvPr>
-          <p:cNvSpPr>
-            <a:spLocks noGrp="1"/>
-          </p:cNvSpPr>
-          <p:nvPr>
-            <p:ph type="title"/>
-          </p:nvPr>
-        </p:nvSpPr>
-        <p:spPr/>
-        <p:txBody>
-          <a:bodyPr/>
-          <a:lstStyle/>
-          <a:p>
-            <a:r>
-              <a:rPr lang="en-US" dirty="0">
-                <a:cs typeface="Calibri Light"/>
-              </a:rPr>
-              <a:t>MARIO rules</a:t>
-            </a:r>
-            <a:endParaRPr lang="en-US" dirty="0"/>
-          </a:p>
-        </p:txBody>
-      </p:sp>
-      <p:sp>
-        <p:nvSpPr>
-          <p:cNvPr id="3" name="Content Placeholder 2">
-            <a:extLst>
-              <a:ext uri="{FF2B5EF4-FFF2-40B4-BE49-F238E27FC236}">
-                <a16:creationId xmlns:a16="http://schemas.microsoft.com/office/drawing/2014/main" id="{535B9031-DE08-4180-895C-A6EFF319555B}"/>
-              </a:ext>
-            </a:extLst>
-          </p:cNvPr>
-          <p:cNvSpPr>
-            <a:spLocks noGrp="1"/>
-          </p:cNvSpPr>
-          <p:nvPr>
-            <p:ph idx="1"/>
-          </p:nvPr>
-        </p:nvSpPr>
-        <p:spPr/>
-        <p:txBody>
-          <a:bodyPr vert="horz" lIns="91440" tIns="45720" rIns="91440" bIns="45720" rtlCol="0" anchor="t">
-            <a:normAutofit fontScale="70000" lnSpcReduction="20000"/>
-          </a:bodyPr>
-          <a:lstStyle/>
-          <a:p>
-            <a:r>
-              <a:rPr lang="en-US" dirty="0">
-                <a:cs typeface="Calibri"/>
-              </a:rPr>
-              <a:t>If I hit the star, I become invincible for XXX seconds</a:t>
-            </a:r>
-          </a:p>
-          <a:p>
-            <a:r>
-              <a:rPr lang="en-US" dirty="0">
-                <a:solidFill>
-                  <a:srgbClr val="00B050"/>
-                </a:solidFill>
-                <a:cs typeface="Calibri"/>
-              </a:rPr>
-              <a:t>If I hit the mushroom, </a:t>
-            </a:r>
-          </a:p>
-          <a:p>
-            <a:pPr lvl="1"/>
-            <a:r>
-              <a:rPr lang="en-US" dirty="0">
-                <a:solidFill>
-                  <a:srgbClr val="00B050"/>
-                </a:solidFill>
-                <a:cs typeface="Calibri"/>
-              </a:rPr>
-              <a:t>I become XXX scale </a:t>
-            </a:r>
-            <a:endParaRPr lang="en-US" dirty="0">
-              <a:solidFill>
-                <a:srgbClr val="00B050"/>
-              </a:solidFill>
-            </a:endParaRPr>
-          </a:p>
-          <a:p>
-            <a:r>
-              <a:rPr lang="en-US" dirty="0">
-                <a:cs typeface="Calibri"/>
-              </a:rPr>
-              <a:t>If I hit an enemy:</a:t>
-            </a:r>
-          </a:p>
-          <a:p>
-            <a:pPr lvl="1"/>
-            <a:r>
-              <a:rPr lang="en-US" dirty="0">
-                <a:cs typeface="Calibri"/>
-              </a:rPr>
-              <a:t>If I am big, I become small</a:t>
-            </a:r>
-          </a:p>
-          <a:p>
-            <a:pPr lvl="1"/>
-            <a:r>
-              <a:rPr lang="en-US" dirty="0">
-                <a:cs typeface="Calibri"/>
-              </a:rPr>
-              <a:t>If I am small: </a:t>
-            </a:r>
-          </a:p>
-          <a:p>
-            <a:pPr lvl="2"/>
-            <a:r>
-              <a:rPr lang="en-US" dirty="0">
-                <a:cs typeface="Calibri"/>
-              </a:rPr>
-              <a:t>minus 1 life. </a:t>
-            </a:r>
-            <a:endParaRPr lang="en-US" dirty="0"/>
-          </a:p>
-          <a:p>
-            <a:pPr lvl="2"/>
-            <a:r>
-              <a:rPr lang="en-US" dirty="0">
-                <a:ea typeface="+mn-lt"/>
-                <a:cs typeface="+mn-lt"/>
-              </a:rPr>
-              <a:t>If I have 0 life, I die</a:t>
-            </a:r>
-          </a:p>
-          <a:p>
-            <a:pPr lvl="1"/>
-            <a:r>
-              <a:rPr lang="en-US" dirty="0">
-                <a:cs typeface="Calibri"/>
-              </a:rPr>
-              <a:t>If I am </a:t>
-            </a:r>
-            <a:r>
-              <a:rPr lang="en-US" dirty="0">
-                <a:ea typeface="+mn-lt"/>
-                <a:cs typeface="+mn-lt"/>
-              </a:rPr>
-              <a:t>invincible, enemy die</a:t>
-            </a:r>
-          </a:p>
-          <a:p>
-            <a:r>
-              <a:rPr lang="en-US" dirty="0">
-                <a:ea typeface="+mn-lt"/>
-                <a:cs typeface="+mn-lt"/>
-              </a:rPr>
-              <a:t>If I hit green mushroom, I get 1 life</a:t>
-            </a:r>
-          </a:p>
-          <a:p>
-            <a:r>
-              <a:rPr lang="en-US" dirty="0">
-                <a:ea typeface="+mn-lt"/>
-                <a:cs typeface="+mn-lt"/>
-              </a:rPr>
-              <a:t>If I hit checkpoint, save the location of the checkpoint</a:t>
-            </a:r>
-          </a:p>
-          <a:p>
-            <a:r>
-              <a:rPr lang="en-US" dirty="0">
-                <a:ea typeface="+mn-lt"/>
-                <a:cs typeface="+mn-lt"/>
-              </a:rPr>
-              <a:t>If I die, restart from last checkpoint</a:t>
-            </a:r>
-            <a:endParaRPr lang="en-US" dirty="0"/>
-          </a:p>
-          <a:p>
-            <a:r>
-              <a:rPr lang="en-US" dirty="0">
-                <a:cs typeface="Calibri"/>
-              </a:rPr>
-              <a:t>on start of game:</a:t>
-            </a:r>
-          </a:p>
-          <a:p>
-            <a:pPr lvl="1"/>
-            <a:r>
-              <a:rPr lang="en-US" dirty="0">
-                <a:cs typeface="Calibri"/>
-              </a:rPr>
-              <a:t>Give </a:t>
-            </a:r>
-            <a:r>
-              <a:rPr lang="en-US" dirty="0" err="1">
-                <a:cs typeface="Calibri"/>
-              </a:rPr>
-              <a:t>mario</a:t>
-            </a:r>
-            <a:r>
-              <a:rPr lang="en-US" dirty="0">
-                <a:cs typeface="Calibri"/>
-              </a:rPr>
-              <a:t> 2 life</a:t>
-            </a:r>
-            <a:endParaRPr lang="en-US" dirty="0"/>
-          </a:p>
-          <a:p>
-            <a:pPr lvl="1"/>
-            <a:r>
-              <a:rPr lang="en-US" dirty="0">
-                <a:cs typeface="Calibri"/>
-              </a:rPr>
-              <a:t>Save start as checkpoint</a:t>
-            </a:r>
-          </a:p>
-          <a:p>
-            <a:endParaRPr lang="en-US" dirty="0">
-              <a:cs typeface="Calibri"/>
-            </a:endParaRPr>
-          </a:p>
-          <a:p>
-            <a:endParaRPr lang="en-US" dirty="0">
-              <a:cs typeface="Calibri"/>
-            </a:endParaRPr>
-          </a:p>
-          <a:p>
-            <a:endParaRPr lang="en-US" dirty="0">
-              <a:cs typeface="Calibri"/>
-            </a:endParaRPr>
-          </a:p>
-        </p:txBody>
-      </p:sp>
-    </p:spTree>
-    <p:extLst>
-      <p:ext uri="{BB962C8B-B14F-4D97-AF65-F5344CB8AC3E}">
-        <p14:creationId xmlns:p14="http://schemas.microsoft.com/office/powerpoint/2010/main" val="1903990095"/>
-      </p:ext>
-    </p:extLst>
-  </p:cSld>
-  <p:clrMapOvr>
-    <a:masterClrMapping/>
-  </p:clrMapOvr>
-</p:sld>
-</file>
-
-<file path=ppt/slides/slide7.xml><?xml version="1.0" encoding="utf-8"?>
-<p:sld xmlns:a="http://schemas.openxmlformats.org/drawingml/2006/main" xmlns:r="http://schemas.openxmlformats.org/officeDocument/2006/relationships" xmlns:p="http://schemas.openxmlformats.org/presentationml/2006/main">
-  <p:cSld>
-    <p:spTree>
-      <p:nvGrpSpPr>
-        <p:cNvPr id="1" name=""/>
-        <p:cNvGrpSpPr/>
-        <p:nvPr/>
-      </p:nvGrpSpPr>
-      <p:grpSpPr>
-        <a:xfrm>
-          <a:off x="0" y="0"/>
-          <a:ext cx="0" cy="0"/>
-          <a:chOff x="0" y="0"/>
-          <a:chExt cx="0" cy="0"/>
-        </a:xfrm>
-      </p:grpSpPr>
-      <p:sp>
-        <p:nvSpPr>
-          <p:cNvPr id="2" name="Title 1">
-            <a:extLst>
-              <a:ext uri="{FF2B5EF4-FFF2-40B4-BE49-F238E27FC236}">
-                <a16:creationId xmlns:a16="http://schemas.microsoft.com/office/drawing/2014/main" id="{EE01A759-C4E4-4F6D-BA7A-693BD7ADE4F6}"/>
-              </a:ext>
-            </a:extLst>
-          </p:cNvPr>
-          <p:cNvSpPr>
-            <a:spLocks noGrp="1"/>
-          </p:cNvSpPr>
-          <p:nvPr>
-            <p:ph type="title"/>
-          </p:nvPr>
-        </p:nvSpPr>
-        <p:spPr/>
-        <p:txBody>
-          <a:bodyPr/>
-          <a:lstStyle/>
-          <a:p>
-            <a:r>
-              <a:rPr lang="en-US" dirty="0">
-                <a:cs typeface="Calibri Light"/>
-              </a:rPr>
-              <a:t>How to start developing the game</a:t>
-            </a:r>
-            <a:endParaRPr lang="en-US" dirty="0"/>
-          </a:p>
-        </p:txBody>
-      </p:sp>
-      <p:sp>
-        <p:nvSpPr>
-          <p:cNvPr id="3" name="Content Placeholder 2">
-            <a:extLst>
-              <a:ext uri="{FF2B5EF4-FFF2-40B4-BE49-F238E27FC236}">
-                <a16:creationId xmlns:a16="http://schemas.microsoft.com/office/drawing/2014/main" id="{8E1B27CB-58E4-4E58-989E-05EDF35E3D88}"/>
-              </a:ext>
-            </a:extLst>
-          </p:cNvPr>
-          <p:cNvSpPr>
-            <a:spLocks noGrp="1"/>
-          </p:cNvSpPr>
-          <p:nvPr>
-            <p:ph idx="1"/>
-          </p:nvPr>
-        </p:nvSpPr>
-        <p:spPr/>
-        <p:txBody>
-          <a:bodyPr vert="horz" lIns="91440" tIns="45720" rIns="91440" bIns="45720" rtlCol="0" anchor="t">
-            <a:normAutofit/>
-          </a:bodyPr>
-          <a:lstStyle/>
-          <a:p>
-            <a:r>
-              <a:rPr lang="en-US" dirty="0">
-                <a:cs typeface="Calibri"/>
-              </a:rPr>
-              <a:t>Make the avatar move</a:t>
-            </a:r>
-          </a:p>
-          <a:p>
-            <a:pPr lvl="1"/>
-            <a:r>
-              <a:rPr lang="en-US" err="1">
-                <a:solidFill>
-                  <a:srgbClr val="00B050"/>
-                </a:solidFill>
-                <a:ea typeface="+mn-lt"/>
-                <a:cs typeface="+mn-lt"/>
-              </a:rPr>
-              <a:t>OnKey</a:t>
-            </a:r>
-            <a:r>
-              <a:rPr lang="en-US" dirty="0">
-                <a:solidFill>
-                  <a:srgbClr val="00B050"/>
-                </a:solidFill>
-                <a:ea typeface="+mn-lt"/>
-                <a:cs typeface="+mn-lt"/>
-              </a:rPr>
-              <a:t> </a:t>
-            </a:r>
-            <a:r>
-              <a:rPr lang="en-US" dirty="0">
-                <a:solidFill>
-                  <a:srgbClr val="00B050"/>
-                </a:solidFill>
-                <a:cs typeface="Calibri"/>
-              </a:rPr>
-              <a:t>RIGHT , go right</a:t>
-            </a:r>
-          </a:p>
-          <a:p>
-            <a:pPr lvl="1"/>
-            <a:r>
-              <a:rPr lang="en-US" err="1">
-                <a:solidFill>
-                  <a:srgbClr val="00B050"/>
-                </a:solidFill>
-                <a:cs typeface="Calibri"/>
-              </a:rPr>
-              <a:t>OnKey</a:t>
-            </a:r>
-            <a:r>
-              <a:rPr lang="en-US" dirty="0">
-                <a:solidFill>
-                  <a:srgbClr val="00B050"/>
-                </a:solidFill>
-                <a:cs typeface="Calibri"/>
-              </a:rPr>
-              <a:t> LEFT, …</a:t>
-            </a:r>
-          </a:p>
-          <a:p>
-            <a:pPr lvl="1"/>
-            <a:r>
-              <a:rPr lang="en-US" err="1">
-                <a:solidFill>
-                  <a:srgbClr val="00B050"/>
-                </a:solidFill>
-                <a:ea typeface="+mn-lt"/>
-                <a:cs typeface="+mn-lt"/>
-              </a:rPr>
-              <a:t>OnKeyDown</a:t>
-            </a:r>
-            <a:r>
-              <a:rPr lang="en-US" dirty="0">
-                <a:solidFill>
-                  <a:srgbClr val="00B050"/>
-                </a:solidFill>
-                <a:ea typeface="+mn-lt"/>
-                <a:cs typeface="+mn-lt"/>
-              </a:rPr>
-              <a:t> </a:t>
-            </a:r>
-            <a:r>
-              <a:rPr lang="en-US" dirty="0">
-                <a:solidFill>
-                  <a:srgbClr val="00B050"/>
-                </a:solidFill>
-                <a:cs typeface="Calibri"/>
-              </a:rPr>
-              <a:t>Press UP</a:t>
-            </a:r>
-            <a:r>
-              <a:rPr lang="en-US" dirty="0">
-                <a:cs typeface="Calibri"/>
-              </a:rPr>
-              <a:t>, </a:t>
-            </a:r>
-            <a:r>
-              <a:rPr lang="en-US">
-                <a:solidFill>
-                  <a:srgbClr val="FF0000"/>
-                </a:solidFill>
-                <a:cs typeface="Calibri"/>
-              </a:rPr>
-              <a:t>jump (animation...)</a:t>
-            </a:r>
-            <a:r>
-              <a:rPr lang="en-US" dirty="0">
-                <a:cs typeface="Calibri"/>
-              </a:rPr>
-              <a:t>. </a:t>
-            </a:r>
-          </a:p>
-        </p:txBody>
-      </p:sp>
-    </p:spTree>
-    <p:extLst>
-      <p:ext uri="{BB962C8B-B14F-4D97-AF65-F5344CB8AC3E}">
-        <p14:creationId xmlns:p14="http://schemas.microsoft.com/office/powerpoint/2010/main" val="2050108797"/>
-      </p:ext>
-    </p:extLst>
-  </p:cSld>
-  <p:clrMapOvr>
-    <a:masterClrMapping/>
-  </p:clrMapOvr>
-</p:sld>
-</file>
-
-<file path=ppt/slides/slide8.xml><?xml version="1.0" encoding="utf-8"?>
-<p:sld xmlns:a="http://schemas.openxmlformats.org/drawingml/2006/main" xmlns:r="http://schemas.openxmlformats.org/officeDocument/2006/relationships" xmlns:p="http://schemas.openxmlformats.org/presentationml/2006/main">
-  <p:cSld>
-    <p:spTree>
-      <p:nvGrpSpPr>
-        <p:cNvPr id="1" name=""/>
-        <p:cNvGrpSpPr/>
-        <p:nvPr/>
-      </p:nvGrpSpPr>
-      <p:grpSpPr>
-        <a:xfrm>
-          <a:off x="0" y="0"/>
-          <a:ext cx="0" cy="0"/>
-          <a:chOff x="0" y="0"/>
-          <a:chExt cx="0" cy="0"/>
-        </a:xfrm>
-      </p:grpSpPr>
-      <p:sp>
-        <p:nvSpPr>
-          <p:cNvPr id="2" name="Title 1">
-            <a:extLst>
-              <a:ext uri="{FF2B5EF4-FFF2-40B4-BE49-F238E27FC236}">
-                <a16:creationId xmlns:a16="http://schemas.microsoft.com/office/drawing/2014/main" id="{45CC1C2F-6FD2-4EC0-9161-74FE6A63B850}"/>
-              </a:ext>
-            </a:extLst>
-          </p:cNvPr>
-          <p:cNvSpPr>
-            <a:spLocks noGrp="1"/>
-          </p:cNvSpPr>
-          <p:nvPr>
-            <p:ph type="title"/>
-          </p:nvPr>
-        </p:nvSpPr>
-        <p:spPr/>
-        <p:txBody>
-          <a:bodyPr/>
-          <a:lstStyle/>
-          <a:p>
-            <a:r>
-              <a:rPr lang="en-US" dirty="0">
-                <a:cs typeface="Calibri Light"/>
-              </a:rPr>
-              <a:t>Plan </a:t>
-            </a:r>
-            <a:endParaRPr lang="en-US" dirty="0"/>
-          </a:p>
-        </p:txBody>
-      </p:sp>
-      <p:sp>
-        <p:nvSpPr>
-          <p:cNvPr id="3" name="Content Placeholder 2">
-            <a:extLst>
-              <a:ext uri="{FF2B5EF4-FFF2-40B4-BE49-F238E27FC236}">
-                <a16:creationId xmlns:a16="http://schemas.microsoft.com/office/drawing/2014/main" id="{BE1D7F04-3294-4E28-A8D4-04DD85FA3276}"/>
-              </a:ext>
-            </a:extLst>
-          </p:cNvPr>
-          <p:cNvSpPr>
-            <a:spLocks noGrp="1"/>
-          </p:cNvSpPr>
-          <p:nvPr>
-            <p:ph idx="1"/>
-          </p:nvPr>
-        </p:nvSpPr>
-        <p:spPr/>
-        <p:txBody>
-          <a:bodyPr vert="horz" lIns="91440" tIns="45720" rIns="91440" bIns="45720" rtlCol="0" anchor="t">
-            <a:normAutofit fontScale="70000" lnSpcReduction="20000"/>
-          </a:bodyPr>
-          <a:lstStyle/>
-          <a:p>
-            <a:r>
-              <a:rPr lang="en-US">
-                <a:ea typeface="+mn-lt"/>
-                <a:cs typeface="+mn-lt"/>
-              </a:rPr>
-              <a:t>Insert 3d model inside the cube (Filippo)</a:t>
-            </a:r>
-          </a:p>
-          <a:p>
-            <a:endParaRPr lang="en-US" dirty="0">
-              <a:cs typeface="Calibri"/>
-            </a:endParaRPr>
-          </a:p>
-          <a:p>
-            <a:r>
-              <a:rPr lang="en-US">
-                <a:cs typeface="Calibri"/>
-              </a:rPr>
-              <a:t>All the big features:</a:t>
-            </a:r>
-            <a:endParaRPr lang="en-US"/>
-          </a:p>
-          <a:p>
-            <a:pPr lvl="1"/>
-            <a:r>
-              <a:rPr lang="en-US">
-                <a:cs typeface="Calibri"/>
-              </a:rPr>
-              <a:t>Mushroom, star, enemy</a:t>
-            </a:r>
-          </a:p>
-          <a:p>
-            <a:endParaRPr lang="en-US" sz="2400">
-              <a:cs typeface="Calibri"/>
-            </a:endParaRPr>
-          </a:p>
-          <a:p>
-            <a:r>
-              <a:rPr lang="en-US" dirty="0">
-                <a:cs typeface="Calibri" panose="020F0502020204030204"/>
-              </a:rPr>
-              <a:t>Level design. </a:t>
-            </a:r>
-          </a:p>
-          <a:p>
-            <a:pPr lvl="1"/>
-            <a:r>
-              <a:rPr lang="en-US">
-                <a:cs typeface="Calibri" panose="020F0502020204030204"/>
-              </a:rPr>
-              <a:t>From Starting point to finish point </a:t>
-            </a:r>
-          </a:p>
-          <a:p>
-            <a:pPr lvl="1"/>
-            <a:endParaRPr lang="en-US" dirty="0">
-              <a:cs typeface="Calibri" panose="020F0502020204030204"/>
-            </a:endParaRPr>
-          </a:p>
-          <a:p>
-            <a:r>
-              <a:rPr lang="en-US">
-                <a:cs typeface="Calibri" panose="020F0502020204030204"/>
-              </a:rPr>
-              <a:t>Rules:</a:t>
-            </a:r>
-            <a:endParaRPr lang="en-US" dirty="0">
-              <a:cs typeface="Calibri" panose="020F0502020204030204"/>
-            </a:endParaRPr>
-          </a:p>
-          <a:p>
-            <a:pPr lvl="1"/>
-            <a:r>
-              <a:rPr lang="en-US">
-                <a:cs typeface="Calibri" panose="020F0502020204030204"/>
-              </a:rPr>
-              <a:t>Health, damage, </a:t>
-            </a:r>
-            <a:endParaRPr lang="en-US" dirty="0">
-              <a:cs typeface="Calibri" panose="020F0502020204030204"/>
-            </a:endParaRPr>
-          </a:p>
-          <a:p>
-            <a:pPr lvl="1"/>
-            <a:r>
-              <a:rPr lang="en-US">
-                <a:cs typeface="Calibri" panose="020F0502020204030204"/>
-              </a:rPr>
-              <a:t>Fire </a:t>
-            </a:r>
-            <a:endParaRPr lang="en-US" dirty="0">
-              <a:cs typeface="Calibri" panose="020F0502020204030204"/>
-            </a:endParaRPr>
-          </a:p>
-          <a:p>
-            <a:pPr lvl="1"/>
-            <a:r>
-              <a:rPr lang="en-US">
-                <a:cs typeface="Calibri" panose="020F0502020204030204"/>
-              </a:rPr>
-              <a:t>Killing stuff</a:t>
-            </a:r>
-            <a:endParaRPr lang="en-US" dirty="0">
-              <a:cs typeface="Calibri" panose="020F0502020204030204"/>
-            </a:endParaRPr>
-          </a:p>
-          <a:p>
-            <a:endParaRPr lang="en-US" dirty="0">
-              <a:cs typeface="Calibri" panose="020F0502020204030204"/>
-            </a:endParaRPr>
-          </a:p>
-          <a:p>
-            <a:r>
-              <a:rPr lang="en-US">
-                <a:cs typeface="Calibri" panose="020F0502020204030204"/>
-              </a:rPr>
-              <a:t>Animations </a:t>
-            </a:r>
-          </a:p>
-          <a:p>
-            <a:endParaRPr lang="en-US" dirty="0">
-              <a:cs typeface="Calibri" panose="020F0502020204030204"/>
-            </a:endParaRPr>
-          </a:p>
-          <a:p>
-            <a:endParaRPr lang="en-US" dirty="0">
-              <a:cs typeface="Calibri" panose="020F0502020204030204"/>
-            </a:endParaRPr>
-          </a:p>
-        </p:txBody>
-      </p:sp>
-    </p:spTree>
-    <p:extLst>
-      <p:ext uri="{BB962C8B-B14F-4D97-AF65-F5344CB8AC3E}">
-        <p14:creationId xmlns:p14="http://schemas.microsoft.com/office/powerpoint/2010/main" val="4077860347"/>
-      </p:ext>
-    </p:extLst>
-  </p:cSld>
-  <p:clrMapOvr>
-    <a:masterClrMapping/>
-  </p:clrMapOvr>
-</p:sld>
-</file>
-
 <file path=ppt/slides/slide9.xml><?xml version="1.0" encoding="utf-8"?>
 <p:sld xmlns:a="http://schemas.openxmlformats.org/drawingml/2006/main" xmlns:r="http://schemas.openxmlformats.org/officeDocument/2006/relationships" xmlns:p="http://schemas.openxmlformats.org/presentationml/2006/main">
   <p:cSld>
@@ -6614,7 +6948,7 @@
           <p:cNvPr id="2" name="Title 1">
             <a:extLst>
               <a:ext uri="{FF2B5EF4-FFF2-40B4-BE49-F238E27FC236}">
-                <a16:creationId xmlns:a16="http://schemas.microsoft.com/office/drawing/2014/main" id="{13A1538D-67C0-4906-B38B-D202C2A1A9E9}"/>
+                <a16:creationId xmlns:a16="http://schemas.microsoft.com/office/drawing/2014/main" id="{EE01A759-C4E4-4F6D-BA7A-693BD7ADE4F6}"/>
               </a:ext>
             </a:extLst>
           </p:cNvPr>
@@ -6630,7 +6964,13 @@
           <a:bodyPr/>
           <a:lstStyle/>
           <a:p>
-            <a:endParaRPr lang="en-US"/>
+            <a:r>
+              <a:rPr lang="en-US" dirty="0">
+                <a:cs typeface="Calibri Light"/>
+              </a:rPr>
+              <a:t>How to start developing the game</a:t>
+            </a:r>
+            <a:endParaRPr lang="en-US" dirty="0"/>
           </a:p>
         </p:txBody>
       </p:sp>
@@ -6639,7 +6979,7 @@
           <p:cNvPr id="3" name="Content Placeholder 2">
             <a:extLst>
               <a:ext uri="{FF2B5EF4-FFF2-40B4-BE49-F238E27FC236}">
-                <a16:creationId xmlns:a16="http://schemas.microsoft.com/office/drawing/2014/main" id="{3497D6AE-D4B7-4D5D-A952-3EF824F172DE}"/>
+                <a16:creationId xmlns:a16="http://schemas.microsoft.com/office/drawing/2014/main" id="{8E1B27CB-58E4-4E58-989E-05EDF35E3D88}"/>
               </a:ext>
             </a:extLst>
           </p:cNvPr>
@@ -6650,136 +6990,121 @@
             <p:ph idx="1"/>
           </p:nvPr>
         </p:nvSpPr>
-        <p:spPr>
-          <a:xfrm>
-            <a:off x="9380220" y="1825625"/>
-            <a:ext cx="2529840" cy="4351338"/>
-          </a:xfrm>
-        </p:spPr>
-        <p:txBody>
-          <a:bodyPr/>
-          <a:lstStyle/>
-          <a:p>
-            <a:r>
-              <a:rPr lang="en-US" dirty="0"/>
-              <a:t>If click START GAME button:</a:t>
+        <p:spPr/>
+        <p:txBody>
+          <a:bodyPr vert="horz" lIns="91440" tIns="45720" rIns="91440" bIns="45720" rtlCol="0" anchor="t">
+            <a:normAutofit/>
+          </a:bodyPr>
+          <a:lstStyle/>
+          <a:p>
+            <a:r>
+              <a:rPr lang="en-US" dirty="0">
+                <a:cs typeface="Calibri"/>
+              </a:rPr>
+              <a:t>Make the avatar move</a:t>
             </a:r>
           </a:p>
           <a:p>
             <a:pPr lvl="1"/>
             <a:r>
-              <a:rPr lang="en-US" dirty="0"/>
-              <a:t>Close start screen</a:t>
-            </a:r>
-          </a:p>
-        </p:txBody>
-      </p:sp>
-      <p:sp>
-        <p:nvSpPr>
-          <p:cNvPr id="4" name="Rectangle: Rounded Corners 3">
-            <a:extLst>
-              <a:ext uri="{FF2B5EF4-FFF2-40B4-BE49-F238E27FC236}">
-                <a16:creationId xmlns:a16="http://schemas.microsoft.com/office/drawing/2014/main" id="{05984947-3055-443A-BAE9-147260E12A4B}"/>
-              </a:ext>
-            </a:extLst>
-          </p:cNvPr>
-          <p:cNvSpPr/>
-          <p:nvPr/>
-        </p:nvSpPr>
-        <p:spPr>
-          <a:xfrm>
-            <a:off x="586740" y="1059180"/>
-            <a:ext cx="8793480" cy="5006340"/>
-          </a:xfrm>
-          <a:prstGeom prst="roundRect">
-            <a:avLst/>
-          </a:prstGeom>
-        </p:spPr>
-        <p:style>
-          <a:lnRef idx="2">
-            <a:schemeClr val="accent1">
-              <a:shade val="50000"/>
-            </a:schemeClr>
-          </a:lnRef>
-          <a:fillRef idx="1">
-            <a:schemeClr val="accent1"/>
-          </a:fillRef>
-          <a:effectRef idx="0">
-            <a:schemeClr val="accent1"/>
-          </a:effectRef>
-          <a:fontRef idx="minor">
-            <a:schemeClr val="lt1"/>
-          </a:fontRef>
-        </p:style>
-        <p:txBody>
-          <a:bodyPr rtlCol="0" anchor="ctr"/>
-          <a:lstStyle/>
-          <a:p>
-            <a:pPr algn="ctr"/>
-            <a:r>
-              <a:rPr lang="en-US" dirty="0"/>
-              <a:t>Welcome to MARIO 2021</a:t>
-            </a:r>
-          </a:p>
-          <a:p>
-            <a:pPr algn="ctr"/>
-            <a:endParaRPr lang="en-US" dirty="0"/>
-          </a:p>
-          <a:p>
-            <a:pPr algn="ctr"/>
-            <a:endParaRPr lang="en-US" dirty="0"/>
-          </a:p>
-          <a:p>
-            <a:pPr algn="ctr"/>
-            <a:endParaRPr lang="en-US" dirty="0"/>
-          </a:p>
-        </p:txBody>
-      </p:sp>
-      <p:sp>
-        <p:nvSpPr>
-          <p:cNvPr id="5" name="Rectangle: Rounded Corners 4">
-            <a:extLst>
-              <a:ext uri="{FF2B5EF4-FFF2-40B4-BE49-F238E27FC236}">
-                <a16:creationId xmlns:a16="http://schemas.microsoft.com/office/drawing/2014/main" id="{A15271DD-1667-43B3-B03E-37EF4379222B}"/>
-              </a:ext>
-            </a:extLst>
-          </p:cNvPr>
-          <p:cNvSpPr/>
-          <p:nvPr/>
-        </p:nvSpPr>
-        <p:spPr>
-          <a:xfrm>
-            <a:off x="3432810" y="4320540"/>
-            <a:ext cx="3101340" cy="967740"/>
-          </a:xfrm>
-          <a:prstGeom prst="roundRect">
-            <a:avLst/>
-          </a:prstGeom>
-        </p:spPr>
-        <p:style>
-          <a:lnRef idx="2">
-            <a:schemeClr val="accent4">
-              <a:shade val="50000"/>
-            </a:schemeClr>
-          </a:lnRef>
-          <a:fillRef idx="1">
-            <a:schemeClr val="accent4"/>
-          </a:fillRef>
-          <a:effectRef idx="0">
-            <a:schemeClr val="accent4"/>
-          </a:effectRef>
-          <a:fontRef idx="minor">
-            <a:schemeClr val="lt1"/>
-          </a:fontRef>
-        </p:style>
-        <p:txBody>
-          <a:bodyPr rtlCol="0" anchor="ctr"/>
-          <a:lstStyle/>
-          <a:p>
-            <a:pPr algn="ctr"/>
-            <a:r>
-              <a:rPr lang="en-US" dirty="0"/>
-              <a:t>START GAME</a:t>
+              <a:rPr lang="en-US" dirty="0" err="1">
+                <a:solidFill>
+                  <a:srgbClr val="00B050"/>
+                </a:solidFill>
+                <a:ea typeface="+mn-lt"/>
+                <a:cs typeface="+mn-lt"/>
+              </a:rPr>
+              <a:t>OnKey</a:t>
+            </a:r>
+            <a:r>
+              <a:rPr lang="en-US" dirty="0">
+                <a:solidFill>
+                  <a:srgbClr val="00B050"/>
+                </a:solidFill>
+                <a:ea typeface="+mn-lt"/>
+                <a:cs typeface="+mn-lt"/>
+              </a:rPr>
+              <a:t> </a:t>
+            </a:r>
+            <a:r>
+              <a:rPr lang="en-US" dirty="0">
+                <a:solidFill>
+                  <a:srgbClr val="00B050"/>
+                </a:solidFill>
+                <a:cs typeface="Calibri"/>
+              </a:rPr>
+              <a:t>RIGHT , go right</a:t>
+            </a:r>
+          </a:p>
+          <a:p>
+            <a:pPr lvl="1"/>
+            <a:r>
+              <a:rPr lang="en-US" dirty="0" err="1">
+                <a:solidFill>
+                  <a:srgbClr val="00B050"/>
+                </a:solidFill>
+                <a:cs typeface="Calibri"/>
+              </a:rPr>
+              <a:t>OnKey</a:t>
+            </a:r>
+            <a:r>
+              <a:rPr lang="en-US" dirty="0">
+                <a:solidFill>
+                  <a:srgbClr val="00B050"/>
+                </a:solidFill>
+                <a:cs typeface="Calibri"/>
+              </a:rPr>
+              <a:t> LEFT, …</a:t>
+            </a:r>
+          </a:p>
+          <a:p>
+            <a:pPr lvl="1"/>
+            <a:r>
+              <a:rPr lang="en-US" dirty="0" err="1">
+                <a:solidFill>
+                  <a:srgbClr val="00B050"/>
+                </a:solidFill>
+                <a:ea typeface="+mn-lt"/>
+                <a:cs typeface="+mn-lt"/>
+              </a:rPr>
+              <a:t>OnKeyDown</a:t>
+            </a:r>
+            <a:r>
+              <a:rPr lang="en-US" dirty="0">
+                <a:solidFill>
+                  <a:srgbClr val="00B050"/>
+                </a:solidFill>
+                <a:ea typeface="+mn-lt"/>
+                <a:cs typeface="+mn-lt"/>
+              </a:rPr>
+              <a:t> </a:t>
+            </a:r>
+            <a:r>
+              <a:rPr lang="en-US" dirty="0">
+                <a:solidFill>
+                  <a:srgbClr val="00B050"/>
+                </a:solidFill>
+                <a:cs typeface="Calibri"/>
+              </a:rPr>
+              <a:t>Press UP, jump (physics or </a:t>
+            </a:r>
+            <a:r>
+              <a:rPr lang="en-US" dirty="0">
+                <a:solidFill>
+                  <a:srgbClr val="FF0000"/>
+                </a:solidFill>
+                <a:cs typeface="Calibri"/>
+              </a:rPr>
+              <a:t>animation..</a:t>
+            </a:r>
+            <a:r>
+              <a:rPr lang="en-US" dirty="0">
+                <a:solidFill>
+                  <a:srgbClr val="00B050"/>
+                </a:solidFill>
+                <a:cs typeface="Calibri"/>
+              </a:rPr>
+              <a:t>.). </a:t>
             </a:r>
           </a:p>
         </p:txBody>
@@ -6787,7 +7112,7 @@
     </p:spTree>
     <p:extLst>
       <p:ext uri="{BB962C8B-B14F-4D97-AF65-F5344CB8AC3E}">
-        <p14:creationId xmlns:p14="http://schemas.microsoft.com/office/powerpoint/2010/main" val="368310475"/>
+        <p14:creationId xmlns:p14="http://schemas.microsoft.com/office/powerpoint/2010/main" val="2050108797"/>
       </p:ext>
     </p:extLst>
   </p:cSld>
@@ -7059,21 +7384,6 @@
 </file>
 
 <file path=customXml/item1.xml><?xml version="1.0" encoding="utf-8"?>
-<?mso-contentType ?>
-<FormTemplates xmlns="http://schemas.microsoft.com/sharepoint/v3/contenttype/forms">
-  <Display>DocumentLibraryForm</Display>
-  <Edit>DocumentLibraryForm</Edit>
-  <New>DocumentLibraryForm</New>
-</FormTemplates>
-</file>
-
-<file path=customXml/item2.xml><?xml version="1.0" encoding="utf-8"?>
-<p:properties xmlns:p="http://schemas.microsoft.com/office/2006/metadata/properties" xmlns:xsi="http://www.w3.org/2001/XMLSchema-instance" xmlns:pc="http://schemas.microsoft.com/office/infopath/2007/PartnerControls">
-  <documentManagement/>
-</p:properties>
-</file>
-
-<file path=customXml/item3.xml><?xml version="1.0" encoding="utf-8"?>
 <ct:contentTypeSchema xmlns:ct="http://schemas.microsoft.com/office/2006/metadata/contentType" xmlns:ma="http://schemas.microsoft.com/office/2006/metadata/properties/metaAttributes" ct:_="" ma:_="" ma:contentTypeName="Documento" ma:contentTypeID="0x010100A1E9F1B842402C4B978E599175A9CC2F" ma:contentTypeVersion="9" ma:contentTypeDescription="Creare un nuovo documento." ma:contentTypeScope="" ma:versionID="c7719b27c111f0394d42d44072dff4b4">
   <xsd:schema xmlns:xsd="http://www.w3.org/2001/XMLSchema" xmlns:xs="http://www.w3.org/2001/XMLSchema" xmlns:p="http://schemas.microsoft.com/office/2006/metadata/properties" xmlns:ns2="74bdbfcc-7011-488f-9302-f3f90946f977" targetNamespace="http://schemas.microsoft.com/office/2006/metadata/properties" ma:root="true" ma:fieldsID="b9e0f31806f3447edbda3facc4895caa" ns2:_="">
     <xsd:import namespace="74bdbfcc-7011-488f-9302-f3f90946f977"/>
@@ -7249,24 +7559,22 @@
 </ct:contentTypeSchema>
 </file>
 
-<file path=customXml/itemProps1.xml><?xml version="1.0" encoding="utf-8"?>
-<ds:datastoreItem xmlns:ds="http://schemas.openxmlformats.org/officeDocument/2006/customXml" ds:itemID="{C77525A5-9444-4E49-A3A8-9EBC94C17F95}">
-  <ds:schemaRefs>
-    <ds:schemaRef ds:uri="http://schemas.microsoft.com/sharepoint/v3/contenttype/forms"/>
-  </ds:schemaRefs>
-</ds:datastoreItem>
+<file path=customXml/item2.xml><?xml version="1.0" encoding="utf-8"?>
+<?mso-contentType ?>
+<FormTemplates xmlns="http://schemas.microsoft.com/sharepoint/v3/contenttype/forms">
+  <Display>DocumentLibraryForm</Display>
+  <Edit>DocumentLibraryForm</Edit>
+  <New>DocumentLibraryForm</New>
+</FormTemplates>
 </file>
 
-<file path=customXml/itemProps2.xml><?xml version="1.0" encoding="utf-8"?>
-<ds:datastoreItem xmlns:ds="http://schemas.openxmlformats.org/officeDocument/2006/customXml" ds:itemID="{6F99CC6B-3FC4-4611-BB8A-0161C42924D8}">
-  <ds:schemaRefs>
-    <ds:schemaRef ds:uri="http://schemas.microsoft.com/office/2006/metadata/properties"/>
-    <ds:schemaRef ds:uri="http://schemas.microsoft.com/office/infopath/2007/PartnerControls"/>
-  </ds:schemaRefs>
-</ds:datastoreItem>
+<file path=customXml/item3.xml><?xml version="1.0" encoding="utf-8"?>
+<p:properties xmlns:p="http://schemas.microsoft.com/office/2006/metadata/properties" xmlns:xsi="http://www.w3.org/2001/XMLSchema-instance" xmlns:pc="http://schemas.microsoft.com/office/infopath/2007/PartnerControls">
+  <documentManagement/>
+</p:properties>
 </file>
 
-<file path=customXml/itemProps3.xml><?xml version="1.0" encoding="utf-8"?>
+<file path=customXml/itemProps1.xml><?xml version="1.0" encoding="utf-8"?>
 <ds:datastoreItem xmlns:ds="http://schemas.openxmlformats.org/officeDocument/2006/customXml" ds:itemID="{59F38C61-2F2D-4D29-A732-9575E29CCC7A}">
   <ds:schemaRefs>
     <ds:schemaRef ds:uri="http://schemas.microsoft.com/office/2006/metadata/contentType"/>
@@ -7282,4 +7590,21 @@
     <ds:schemaRef ds:uri="http://schemas.microsoft.com/internal/obd"/>
   </ds:schemaRefs>
 </ds:datastoreItem>
+</file>
+
+<file path=customXml/itemProps2.xml><?xml version="1.0" encoding="utf-8"?>
+<ds:datastoreItem xmlns:ds="http://schemas.openxmlformats.org/officeDocument/2006/customXml" ds:itemID="{C77525A5-9444-4E49-A3A8-9EBC94C17F95}">
+  <ds:schemaRefs>
+    <ds:schemaRef ds:uri="http://schemas.microsoft.com/sharepoint/v3/contenttype/forms"/>
+  </ds:schemaRefs>
+</ds:datastoreItem>
+</file>
+
+<file path=customXml/itemProps3.xml><?xml version="1.0" encoding="utf-8"?>
+<ds:datastoreItem xmlns:ds="http://schemas.openxmlformats.org/officeDocument/2006/customXml" ds:itemID="{6F99CC6B-3FC4-4611-BB8A-0161C42924D8}">
+  <ds:schemaRefs>
+    <ds:schemaRef ds:uri="http://schemas.microsoft.com/office/2006/metadata/properties"/>
+    <ds:schemaRef ds:uri="http://schemas.microsoft.com/office/infopath/2007/PartnerControls"/>
+  </ds:schemaRefs>
+</ds:datastoreItem>
 </file>
</xml_diff>